<commit_message>
Add next lecture slides.
</commit_message>
<xml_diff>
--- a/bishops/cs321/resources/CS321_Lecture_15A.pptx
+++ b/bishops/cs321/resources/CS321_Lecture_15A.pptx
@@ -135,7 +135,7 @@
   </p:defaultTextStyle>
   <p:extLst>
     <p:ext uri="{EFAFB233-063F-42B5-8137-9DF3F51BA10A}">
-      <p15:sldGuideLst xmlns:p15="http://schemas.microsoft.com/office/powerpoint/2012/main" xmlns=""/>
+      <p15:sldGuideLst xmlns="" xmlns:p15="http://schemas.microsoft.com/office/powerpoint/2012/main"/>
     </p:ext>
   </p:extLst>
 </p:presentation>
@@ -146,7 +146,7 @@
   <p:cmAuthor id="1" name="Gregory" initials="G" lastIdx="1" clrIdx="0">
     <p:extLst>
       <p:ext uri="{19B8F6BF-5375-455C-9EA6-DF929625EA0E}">
-        <p15:presenceInfo xmlns:p15="http://schemas.microsoft.com/office/powerpoint/2012/main" xmlns="" userId="Gregory" providerId="None"/>
+        <p15:presenceInfo xmlns="" xmlns:p15="http://schemas.microsoft.com/office/powerpoint/2012/main" userId="Gregory" providerId="None"/>
       </p:ext>
     </p:extLst>
   </p:cmAuthor>
@@ -236,7 +236,7 @@
             <a:fld id="{A6583E9D-07AB-4C6D-BFD0-47E805C6B3D4}" type="datetimeFigureOut">
               <a:rPr lang="en-CA" smtClean="0"/>
               <a:pPr/>
-              <a:t>2024-03-08</a:t>
+              <a:t>2024-03-16</a:t>
             </a:fld>
             <a:endParaRPr lang="en-CA"/>
           </a:p>
@@ -405,7 +405,7 @@
     </p:spTree>
     <p:extLst>
       <p:ext uri="{BB962C8B-B14F-4D97-AF65-F5344CB8AC3E}">
-        <p14:creationId xmlns:p14="http://schemas.microsoft.com/office/powerpoint/2010/main" xmlns="" val="4237529172"/>
+        <p14:creationId xmlns="" xmlns:p14="http://schemas.microsoft.com/office/powerpoint/2010/main" val="4237529172"/>
       </p:ext>
     </p:extLst>
   </p:cSld>
@@ -580,7 +580,7 @@
     </p:spTree>
     <p:extLst>
       <p:ext uri="{BB962C8B-B14F-4D97-AF65-F5344CB8AC3E}">
-        <p14:creationId xmlns:p14="http://schemas.microsoft.com/office/powerpoint/2010/main" xmlns="" val="2340334442"/>
+        <p14:creationId xmlns="" xmlns:p14="http://schemas.microsoft.com/office/powerpoint/2010/main" val="2340334442"/>
       </p:ext>
     </p:extLst>
   </p:cSld>
@@ -665,7 +665,7 @@
     </p:spTree>
     <p:extLst>
       <p:ext uri="{BB962C8B-B14F-4D97-AF65-F5344CB8AC3E}">
-        <p14:creationId xmlns:p14="http://schemas.microsoft.com/office/powerpoint/2010/main" xmlns="" val="140748055"/>
+        <p14:creationId xmlns="" xmlns:p14="http://schemas.microsoft.com/office/powerpoint/2010/main" val="140748055"/>
       </p:ext>
     </p:extLst>
   </p:cSld>
@@ -750,7 +750,7 @@
     </p:spTree>
     <p:extLst>
       <p:ext uri="{BB962C8B-B14F-4D97-AF65-F5344CB8AC3E}">
-        <p14:creationId xmlns:p14="http://schemas.microsoft.com/office/powerpoint/2010/main" xmlns="" val="1630193089"/>
+        <p14:creationId xmlns="" xmlns:p14="http://schemas.microsoft.com/office/powerpoint/2010/main" val="1630193089"/>
       </p:ext>
     </p:extLst>
   </p:cSld>
@@ -835,7 +835,7 @@
     </p:spTree>
     <p:extLst>
       <p:ext uri="{BB962C8B-B14F-4D97-AF65-F5344CB8AC3E}">
-        <p14:creationId xmlns:p14="http://schemas.microsoft.com/office/powerpoint/2010/main" xmlns="" val="660049239"/>
+        <p14:creationId xmlns="" xmlns:p14="http://schemas.microsoft.com/office/powerpoint/2010/main" val="660049239"/>
       </p:ext>
     </p:extLst>
   </p:cSld>
@@ -1039,7 +1039,7 @@
     </p:spTree>
     <p:extLst>
       <p:ext uri="{BB962C8B-B14F-4D97-AF65-F5344CB8AC3E}">
-        <p14:creationId xmlns:p14="http://schemas.microsoft.com/office/powerpoint/2010/main" xmlns="" val="1900560834"/>
+        <p14:creationId xmlns="" xmlns:p14="http://schemas.microsoft.com/office/powerpoint/2010/main" val="1900560834"/>
       </p:ext>
     </p:extLst>
   </p:cSld>
@@ -1213,7 +1213,7 @@
     </p:spTree>
     <p:extLst>
       <p:ext uri="{BB962C8B-B14F-4D97-AF65-F5344CB8AC3E}">
-        <p14:creationId xmlns:p14="http://schemas.microsoft.com/office/powerpoint/2010/main" xmlns="" val="3722958745"/>
+        <p14:creationId xmlns="" xmlns:p14="http://schemas.microsoft.com/office/powerpoint/2010/main" val="3722958745"/>
       </p:ext>
     </p:extLst>
   </p:cSld>
@@ -1449,7 +1449,7 @@
     </p:spTree>
     <p:extLst>
       <p:ext uri="{BB962C8B-B14F-4D97-AF65-F5344CB8AC3E}">
-        <p14:creationId xmlns:p14="http://schemas.microsoft.com/office/powerpoint/2010/main" xmlns="" val="1822376042"/>
+        <p14:creationId xmlns="" xmlns:p14="http://schemas.microsoft.com/office/powerpoint/2010/main" val="1822376042"/>
       </p:ext>
     </p:extLst>
   </p:cSld>
@@ -1699,7 +1699,7 @@
     </p:spTree>
     <p:extLst>
       <p:ext uri="{BB962C8B-B14F-4D97-AF65-F5344CB8AC3E}">
-        <p14:creationId xmlns:p14="http://schemas.microsoft.com/office/powerpoint/2010/main" xmlns="" val="3411672561"/>
+        <p14:creationId xmlns="" xmlns:p14="http://schemas.microsoft.com/office/powerpoint/2010/main" val="3411672561"/>
       </p:ext>
     </p:extLst>
   </p:cSld>
@@ -1935,7 +1935,7 @@
     </p:spTree>
     <p:extLst>
       <p:ext uri="{BB962C8B-B14F-4D97-AF65-F5344CB8AC3E}">
-        <p14:creationId xmlns:p14="http://schemas.microsoft.com/office/powerpoint/2010/main" xmlns="" val="1093008526"/>
+        <p14:creationId xmlns="" xmlns:p14="http://schemas.microsoft.com/office/powerpoint/2010/main" val="1093008526"/>
       </p:ext>
     </p:extLst>
   </p:cSld>
@@ -2306,7 +2306,7 @@
     </p:spTree>
     <p:extLst>
       <p:ext uri="{BB962C8B-B14F-4D97-AF65-F5344CB8AC3E}">
-        <p14:creationId xmlns:p14="http://schemas.microsoft.com/office/powerpoint/2010/main" xmlns="" val="1087924878"/>
+        <p14:creationId xmlns="" xmlns:p14="http://schemas.microsoft.com/office/powerpoint/2010/main" val="1087924878"/>
       </p:ext>
     </p:extLst>
   </p:cSld>
@@ -2428,7 +2428,7 @@
     </p:spTree>
     <p:extLst>
       <p:ext uri="{BB962C8B-B14F-4D97-AF65-F5344CB8AC3E}">
-        <p14:creationId xmlns:p14="http://schemas.microsoft.com/office/powerpoint/2010/main" xmlns="" val="3802387408"/>
+        <p14:creationId xmlns="" xmlns:p14="http://schemas.microsoft.com/office/powerpoint/2010/main" val="3802387408"/>
       </p:ext>
     </p:extLst>
   </p:cSld>
@@ -2527,7 +2527,7 @@
     </p:spTree>
     <p:extLst>
       <p:ext uri="{BB962C8B-B14F-4D97-AF65-F5344CB8AC3E}">
-        <p14:creationId xmlns:p14="http://schemas.microsoft.com/office/powerpoint/2010/main" xmlns="" val="4234091411"/>
+        <p14:creationId xmlns="" xmlns:p14="http://schemas.microsoft.com/office/powerpoint/2010/main" val="4234091411"/>
       </p:ext>
     </p:extLst>
   </p:cSld>
@@ -2808,7 +2808,7 @@
     </p:spTree>
     <p:extLst>
       <p:ext uri="{BB962C8B-B14F-4D97-AF65-F5344CB8AC3E}">
-        <p14:creationId xmlns:p14="http://schemas.microsoft.com/office/powerpoint/2010/main" xmlns="" val="4189422420"/>
+        <p14:creationId xmlns="" xmlns:p14="http://schemas.microsoft.com/office/powerpoint/2010/main" val="4189422420"/>
       </p:ext>
     </p:extLst>
   </p:cSld>
@@ -3065,7 +3065,7 @@
     </p:spTree>
     <p:extLst>
       <p:ext uri="{BB962C8B-B14F-4D97-AF65-F5344CB8AC3E}">
-        <p14:creationId xmlns:p14="http://schemas.microsoft.com/office/powerpoint/2010/main" xmlns="" val="3252977898"/>
+        <p14:creationId xmlns="" xmlns:p14="http://schemas.microsoft.com/office/powerpoint/2010/main" val="3252977898"/>
       </p:ext>
     </p:extLst>
   </p:cSld>
@@ -3334,7 +3334,7 @@
           <a:blip r:embed="rId13" cstate="print">
             <a:extLst>
               <a:ext uri="{28A0092B-C50C-407E-A947-70E740481C1C}">
-                <a14:useLocalDpi xmlns:a14="http://schemas.microsoft.com/office/drawing/2010/main" xmlns="" val="0"/>
+                <a14:useLocalDpi xmlns="" xmlns:a14="http://schemas.microsoft.com/office/drawing/2010/main" val="0"/>
               </a:ext>
             </a:extLst>
           </a:blip>
@@ -3355,7 +3355,7 @@
     </p:spTree>
     <p:extLst>
       <p:ext uri="{BB962C8B-B14F-4D97-AF65-F5344CB8AC3E}">
-        <p14:creationId xmlns:p14="http://schemas.microsoft.com/office/powerpoint/2010/main" xmlns="" val="4230061028"/>
+        <p14:creationId xmlns="" xmlns:p14="http://schemas.microsoft.com/office/powerpoint/2010/main" val="4230061028"/>
       </p:ext>
     </p:extLst>
   </p:cSld>
@@ -3797,7 +3797,7 @@
           <p:cNvPr id="13" name="Picture 8" descr="http://osiris.ubishops.ca/~alussier/images/transparentlogo_bu.png">
             <a:extLst>
               <a:ext uri="{FF2B5EF4-FFF2-40B4-BE49-F238E27FC236}">
-                <a16:creationId xmlns:a16="http://schemas.microsoft.com/office/drawing/2014/main" xmlns="" id="{CCB9A035-2F1C-4B96-A5DB-70B72D6E4AD8}"/>
+                <a16:creationId xmlns="" xmlns:a16="http://schemas.microsoft.com/office/drawing/2014/main" id="{CCB9A035-2F1C-4B96-A5DB-70B72D6E4AD8}"/>
               </a:ext>
             </a:extLst>
           </p:cNvPr>
@@ -3810,7 +3810,7 @@
           <a:blip r:embed="rId3" cstate="print">
             <a:extLst>
               <a:ext uri="{28A0092B-C50C-407E-A947-70E740481C1C}">
-                <a14:useLocalDpi xmlns:a14="http://schemas.microsoft.com/office/drawing/2010/main" xmlns="" val="0"/>
+                <a14:useLocalDpi xmlns="" xmlns:a14="http://schemas.microsoft.com/office/drawing/2010/main" val="0"/>
               </a:ext>
             </a:extLst>
           </a:blip>
@@ -3830,7 +3830,7 @@
           <a:noFill/>
           <a:extLst>
             <a:ext uri="{909E8E84-426E-40DD-AFC4-6F175D3DCCD1}">
-              <a14:hiddenFill xmlns:a14="http://schemas.microsoft.com/office/drawing/2010/main" xmlns="">
+              <a14:hiddenFill xmlns="" xmlns:a14="http://schemas.microsoft.com/office/drawing/2010/main">
                 <a:solidFill>
                   <a:srgbClr val="FFFFFF"/>
                 </a:solidFill>
@@ -3842,7 +3842,7 @@
     </p:spTree>
     <p:extLst>
       <p:ext uri="{BB962C8B-B14F-4D97-AF65-F5344CB8AC3E}">
-        <p14:creationId xmlns:p14="http://schemas.microsoft.com/office/powerpoint/2010/main" xmlns="" val="4177077622"/>
+        <p14:creationId xmlns="" xmlns:p14="http://schemas.microsoft.com/office/powerpoint/2010/main" val="4177077622"/>
       </p:ext>
     </p:extLst>
   </p:cSld>
@@ -4229,7 +4229,7 @@
     </p:spTree>
     <p:extLst>
       <p:ext uri="{BB962C8B-B14F-4D97-AF65-F5344CB8AC3E}">
-        <p14:creationId xmlns:p14="http://schemas.microsoft.com/office/powerpoint/2010/main" xmlns="" val="481467708"/>
+        <p14:creationId xmlns="" xmlns:p14="http://schemas.microsoft.com/office/powerpoint/2010/main" val="481467708"/>
       </p:ext>
     </p:extLst>
   </p:cSld>
@@ -4765,7 +4765,7 @@
     </p:spTree>
     <p:extLst>
       <p:ext uri="{BB962C8B-B14F-4D97-AF65-F5344CB8AC3E}">
-        <p14:creationId xmlns:p14="http://schemas.microsoft.com/office/powerpoint/2010/main" xmlns="" val="3830296394"/>
+        <p14:creationId xmlns="" xmlns:p14="http://schemas.microsoft.com/office/powerpoint/2010/main" val="3830296394"/>
       </p:ext>
     </p:extLst>
   </p:cSld>
@@ -5112,7 +5112,7 @@
     </p:spTree>
     <p:extLst>
       <p:ext uri="{BB962C8B-B14F-4D97-AF65-F5344CB8AC3E}">
-        <p14:creationId xmlns:p14="http://schemas.microsoft.com/office/powerpoint/2010/main" xmlns="" val="272650853"/>
+        <p14:creationId xmlns="" xmlns:p14="http://schemas.microsoft.com/office/powerpoint/2010/main" val="272650853"/>
       </p:ext>
     </p:extLst>
   </p:cSld>
@@ -5263,7 +5263,7 @@
     </p:spTree>
     <p:extLst>
       <p:ext uri="{BB962C8B-B14F-4D97-AF65-F5344CB8AC3E}">
-        <p14:creationId xmlns:p14="http://schemas.microsoft.com/office/powerpoint/2010/main" xmlns="" val="312691650"/>
+        <p14:creationId xmlns="" xmlns:p14="http://schemas.microsoft.com/office/powerpoint/2010/main" val="312691650"/>
       </p:ext>
     </p:extLst>
   </p:cSld>
@@ -5399,7 +5399,7 @@
           <p:cNvPr id="7" name="Picture 3" descr="obspict2b">
             <a:extLst>
               <a:ext uri="{FF2B5EF4-FFF2-40B4-BE49-F238E27FC236}">
-                <a16:creationId xmlns:a16="http://schemas.microsoft.com/office/drawing/2014/main" xmlns="" id="{E7E2DE83-9A5C-4A4C-9497-BD25A4EA4CF9}"/>
+                <a16:creationId xmlns="" xmlns:a16="http://schemas.microsoft.com/office/drawing/2014/main" id="{E7E2DE83-9A5C-4A4C-9497-BD25A4EA4CF9}"/>
               </a:ext>
             </a:extLst>
           </p:cNvPr>
@@ -5412,7 +5412,7 @@
           <a:blip r:embed="rId2">
             <a:extLst>
               <a:ext uri="{28A0092B-C50C-407E-A947-70E740481C1C}">
-                <a14:useLocalDpi xmlns:a14="http://schemas.microsoft.com/office/drawing/2010/main" xmlns="" val="0"/>
+                <a14:useLocalDpi xmlns="" xmlns:a14="http://schemas.microsoft.com/office/drawing/2010/main" val="0"/>
               </a:ext>
             </a:extLst>
           </a:blip>
@@ -5435,14 +5435,14 @@
           </a:ln>
           <a:extLst>
             <a:ext uri="{909E8E84-426E-40DD-AFC4-6F175D3DCCD1}">
-              <a14:hiddenFill xmlns:a14="http://schemas.microsoft.com/office/drawing/2010/main" xmlns="">
+              <a14:hiddenFill xmlns="" xmlns:a14="http://schemas.microsoft.com/office/drawing/2010/main">
                 <a:solidFill>
                   <a:srgbClr val="FFFFFF"/>
                 </a:solidFill>
               </a14:hiddenFill>
             </a:ext>
             <a:ext uri="{91240B29-F687-4F45-9708-019B960494DF}">
-              <a14:hiddenLine xmlns:a14="http://schemas.microsoft.com/office/drawing/2010/main" xmlns="" w="9525">
+              <a14:hiddenLine xmlns="" xmlns:a14="http://schemas.microsoft.com/office/drawing/2010/main" w="9525">
                 <a:solidFill>
                   <a:srgbClr val="000000"/>
                 </a:solidFill>
@@ -5457,7 +5457,7 @@
     </p:spTree>
     <p:extLst>
       <p:ext uri="{BB962C8B-B14F-4D97-AF65-F5344CB8AC3E}">
-        <p14:creationId xmlns:p14="http://schemas.microsoft.com/office/powerpoint/2010/main" xmlns="" val="1082533113"/>
+        <p14:creationId xmlns="" xmlns:p14="http://schemas.microsoft.com/office/powerpoint/2010/main" val="1082533113"/>
       </p:ext>
     </p:extLst>
   </p:cSld>
@@ -5593,7 +5593,7 @@
           <p:cNvPr id="7" name="Picture 3" descr="obspict2b">
             <a:extLst>
               <a:ext uri="{FF2B5EF4-FFF2-40B4-BE49-F238E27FC236}">
-                <a16:creationId xmlns:a16="http://schemas.microsoft.com/office/drawing/2014/main" xmlns="" id="{E7E2DE83-9A5C-4A4C-9497-BD25A4EA4CF9}"/>
+                <a16:creationId xmlns="" xmlns:a16="http://schemas.microsoft.com/office/drawing/2014/main" id="{E7E2DE83-9A5C-4A4C-9497-BD25A4EA4CF9}"/>
               </a:ext>
             </a:extLst>
           </p:cNvPr>
@@ -5606,7 +5606,7 @@
           <a:blip r:embed="rId2">
             <a:extLst>
               <a:ext uri="{28A0092B-C50C-407E-A947-70E740481C1C}">
-                <a14:useLocalDpi xmlns:a14="http://schemas.microsoft.com/office/drawing/2010/main" xmlns="" val="0"/>
+                <a14:useLocalDpi xmlns="" xmlns:a14="http://schemas.microsoft.com/office/drawing/2010/main" val="0"/>
               </a:ext>
             </a:extLst>
           </a:blip>
@@ -5629,14 +5629,14 @@
           </a:ln>
           <a:extLst>
             <a:ext uri="{909E8E84-426E-40DD-AFC4-6F175D3DCCD1}">
-              <a14:hiddenFill xmlns:a14="http://schemas.microsoft.com/office/drawing/2010/main" xmlns="">
+              <a14:hiddenFill xmlns="" xmlns:a14="http://schemas.microsoft.com/office/drawing/2010/main">
                 <a:solidFill>
                   <a:srgbClr val="FFFFFF"/>
                 </a:solidFill>
               </a14:hiddenFill>
             </a:ext>
             <a:ext uri="{91240B29-F687-4F45-9708-019B960494DF}">
-              <a14:hiddenLine xmlns:a14="http://schemas.microsoft.com/office/drawing/2010/main" xmlns="" w="9525">
+              <a14:hiddenLine xmlns="" xmlns:a14="http://schemas.microsoft.com/office/drawing/2010/main" w="9525">
                 <a:solidFill>
                   <a:srgbClr val="000000"/>
                 </a:solidFill>
@@ -5653,7 +5653,7 @@
           <p:cNvPr id="8" name="Picture 3" descr="obspict">
             <a:extLst>
               <a:ext uri="{FF2B5EF4-FFF2-40B4-BE49-F238E27FC236}">
-                <a16:creationId xmlns:a16="http://schemas.microsoft.com/office/drawing/2014/main" xmlns="" id="{B7C86E43-63D1-4191-BB4C-851D2E5B568D}"/>
+                <a16:creationId xmlns="" xmlns:a16="http://schemas.microsoft.com/office/drawing/2014/main" id="{B7C86E43-63D1-4191-BB4C-851D2E5B568D}"/>
               </a:ext>
             </a:extLst>
           </p:cNvPr>
@@ -5666,7 +5666,7 @@
           <a:blip r:embed="rId3">
             <a:extLst>
               <a:ext uri="{28A0092B-C50C-407E-A947-70E740481C1C}">
-                <a14:useLocalDpi xmlns:a14="http://schemas.microsoft.com/office/drawing/2010/main" xmlns="" val="0"/>
+                <a14:useLocalDpi xmlns="" xmlns:a14="http://schemas.microsoft.com/office/drawing/2010/main" val="0"/>
               </a:ext>
             </a:extLst>
           </a:blip>
@@ -5689,14 +5689,14 @@
           </a:ln>
           <a:extLst>
             <a:ext uri="{909E8E84-426E-40DD-AFC4-6F175D3DCCD1}">
-              <a14:hiddenFill xmlns:a14="http://schemas.microsoft.com/office/drawing/2010/main" xmlns="">
+              <a14:hiddenFill xmlns="" xmlns:a14="http://schemas.microsoft.com/office/drawing/2010/main">
                 <a:solidFill>
                   <a:srgbClr val="FFFFFF"/>
                 </a:solidFill>
               </a14:hiddenFill>
             </a:ext>
             <a:ext uri="{91240B29-F687-4F45-9708-019B960494DF}">
-              <a14:hiddenLine xmlns:a14="http://schemas.microsoft.com/office/drawing/2010/main" xmlns="" w="9525">
+              <a14:hiddenLine xmlns="" xmlns:a14="http://schemas.microsoft.com/office/drawing/2010/main" w="9525">
                 <a:solidFill>
                   <a:srgbClr val="000000"/>
                 </a:solidFill>
@@ -5711,7 +5711,7 @@
     </p:spTree>
     <p:extLst>
       <p:ext uri="{BB962C8B-B14F-4D97-AF65-F5344CB8AC3E}">
-        <p14:creationId xmlns:p14="http://schemas.microsoft.com/office/powerpoint/2010/main" xmlns="" val="730904674"/>
+        <p14:creationId xmlns="" xmlns:p14="http://schemas.microsoft.com/office/powerpoint/2010/main" val="730904674"/>
       </p:ext>
     </p:extLst>
   </p:cSld>
@@ -6482,7 +6482,7 @@
     </p:spTree>
     <p:extLst>
       <p:ext uri="{BB962C8B-B14F-4D97-AF65-F5344CB8AC3E}">
-        <p14:creationId xmlns:p14="http://schemas.microsoft.com/office/powerpoint/2010/main" xmlns="" val="203359294"/>
+        <p14:creationId xmlns="" xmlns:p14="http://schemas.microsoft.com/office/powerpoint/2010/main" val="203359294"/>
       </p:ext>
     </p:extLst>
   </p:cSld>
@@ -7477,7 +7477,7 @@
               <a:defRPr/>
             </a:pPr>
             <a:r>
-              <a:rPr kumimoji="0" lang="en-US" altLang="en-US" sz="1500" b="1" i="0" u="none" strike="noStrike" kern="0" cap="none" spc="0" normalizeH="0" baseline="0" noProof="0" dirty="0">
+              <a:rPr kumimoji="0" lang="en-US" altLang="en-US" sz="1500" b="1" i="0" u="none" strike="noStrike" kern="0" cap="none" spc="0" normalizeH="0" noProof="0" dirty="0" smtClean="0">
                 <a:ln>
                   <a:noFill/>
                 </a:ln>
@@ -7491,27 +7491,64 @@
                 <a:ea typeface="ＭＳ Ｐゴシック" panose="020B0600070205080204" pitchFamily="34" charset="-128"/>
                 <a:cs typeface="+mn-cs"/>
               </a:rPr>
-              <a:t>	if( ! (</a:t>
-            </a:r>
-            <a:r>
-              <a:rPr kumimoji="0" lang="en-US" altLang="en-US" sz="1500" b="1" i="0" u="none" strike="noStrike" kern="0" cap="none" spc="0" normalizeH="0" baseline="0" noProof="0" dirty="0" err="1">
-                <a:ln>
-                  <a:noFill/>
-                </a:ln>
-                <a:solidFill>
-                  <a:srgbClr val="02030E"/>
-                </a:solidFill>
-                <a:effectLst/>
-                <a:uLnTx/>
-                <a:uFillTx/>
+              <a:t> </a:t>
+            </a:r>
+            <a:r>
+              <a:rPr lang="en-US" altLang="en-US" sz="1500" b="1" kern="0" dirty="0" smtClean="0">
+                <a:solidFill>
+                  <a:srgbClr val="02030E"/>
+                </a:solidFill>
                 <a:latin typeface="Optimum"/>
                 <a:ea typeface="ＭＳ Ｐゴシック" panose="020B0600070205080204" pitchFamily="34" charset="-128"/>
+              </a:rPr>
+              <a:t> </a:t>
+            </a:r>
+            <a:r>
+              <a:rPr lang="en-US" altLang="en-US" sz="1500" b="1" kern="0" dirty="0" smtClean="0">
+                <a:solidFill>
+                  <a:srgbClr val="02030E"/>
+                </a:solidFill>
+                <a:latin typeface="Optimum"/>
+                <a:ea typeface="ＭＳ Ｐゴシック" panose="020B0600070205080204" pitchFamily="34" charset="-128"/>
+              </a:rPr>
+              <a:t>        </a:t>
+            </a:r>
+            <a:r>
+              <a:rPr kumimoji="0" lang="en-US" altLang="en-US" sz="1500" b="1" i="0" u="none" strike="noStrike" kern="0" cap="none" spc="0" normalizeH="0" baseline="0" noProof="0" dirty="0" smtClean="0">
+                <a:ln>
+                  <a:noFill/>
+                </a:ln>
+                <a:solidFill>
+                  <a:srgbClr val="02030E"/>
+                </a:solidFill>
+                <a:effectLst/>
+                <a:uLnTx/>
+                <a:uFillTx/>
+                <a:latin typeface="Optimum"/>
+                <a:ea typeface="ＭＳ Ｐゴシック" panose="020B0600070205080204" pitchFamily="34" charset="-128"/>
+                <a:cs typeface="+mn-cs"/>
+              </a:rPr>
+              <a:t>if(</a:t>
+            </a:r>
+            <a:r>
+              <a:rPr kumimoji="0" lang="en-US" altLang="en-US" sz="1500" b="1" i="0" u="none" strike="noStrike" kern="0" cap="none" spc="0" normalizeH="0" baseline="0" noProof="0" dirty="0" err="1" smtClean="0">
+                <a:ln>
+                  <a:noFill/>
+                </a:ln>
+                <a:solidFill>
+                  <a:srgbClr val="02030E"/>
+                </a:solidFill>
+                <a:effectLst/>
+                <a:uLnTx/>
+                <a:uFillTx/>
+                <a:latin typeface="Optimum"/>
+                <a:ea typeface="ＭＳ Ｐゴシック" panose="020B0600070205080204" pitchFamily="34" charset="-128"/>
                 <a:cs typeface="+mn-cs"/>
               </a:rPr>
               <a:t>s.equals</a:t>
             </a:r>
             <a:r>
-              <a:rPr kumimoji="0" lang="en-US" altLang="en-US" sz="1500" b="1" i="0" u="none" strike="noStrike" kern="0" cap="none" spc="0" normalizeH="0" baseline="0" noProof="0" dirty="0">
+              <a:rPr kumimoji="0" lang="en-US" altLang="en-US" sz="1500" b="1" i="0" u="none" strike="noStrike" kern="0" cap="none" spc="0" normalizeH="0" baseline="0" noProof="0" dirty="0" smtClean="0">
                 <a:ln>
                   <a:noFill/>
                 </a:ln>
@@ -7528,7 +7565,7 @@
               <a:t>(</a:t>
             </a:r>
             <a:r>
-              <a:rPr kumimoji="0" lang="en-US" altLang="en-US" sz="1500" b="1" i="0" u="none" strike="noStrike" kern="0" cap="none" spc="0" normalizeH="0" baseline="0" noProof="0" dirty="0" err="1">
+              <a:rPr kumimoji="0" lang="en-US" altLang="en-US" sz="1500" b="1" i="0" u="none" strike="noStrike" kern="0" cap="none" spc="0" normalizeH="0" baseline="0" noProof="0" dirty="0" err="1" smtClean="0">
                 <a:ln>
                   <a:noFill/>
                 </a:ln>
@@ -7545,7 +7582,7 @@
               <a:t>stateString</a:t>
             </a:r>
             <a:r>
-              <a:rPr kumimoji="0" lang="en-US" altLang="en-US" sz="1500" b="1" i="0" u="none" strike="noStrike" kern="0" cap="none" spc="0" normalizeH="0" baseline="0" noProof="0" dirty="0">
+              <a:rPr kumimoji="0" lang="en-US" altLang="en-US" sz="1500" b="1" i="0" u="none" strike="noStrike" kern="0" cap="none" spc="0" normalizeH="0" baseline="0" noProof="0" dirty="0" smtClean="0">
                 <a:ln>
                   <a:noFill/>
                 </a:ln>
@@ -7559,7 +7596,7 @@
                 <a:ea typeface="ＭＳ Ｐゴシック" panose="020B0600070205080204" pitchFamily="34" charset="-128"/>
                 <a:cs typeface="+mn-cs"/>
               </a:rPr>
-              <a:t>) ) ) {</a:t>
+              <a:t>))</a:t>
             </a:r>
           </a:p>
           <a:p>
@@ -7581,56 +7618,122 @@
               <a:defRPr/>
             </a:pPr>
             <a:r>
-              <a:rPr kumimoji="0" lang="en-US" altLang="en-US" sz="1500" b="1" i="0" u="none" strike="noStrike" kern="0" cap="none" spc="0" normalizeH="0" baseline="0" noProof="0" dirty="0">
-                <a:ln>
-                  <a:noFill/>
-                </a:ln>
-                <a:solidFill>
-                  <a:srgbClr val="02030E"/>
-                </a:solidFill>
-                <a:effectLst/>
-                <a:uLnTx/>
-                <a:uFillTx/>
+              <a:rPr lang="en-CA" altLang="en-US" sz="1500" b="1" kern="0" dirty="0" smtClean="0">
+                <a:solidFill>
+                  <a:srgbClr val="02030E"/>
+                </a:solidFill>
                 <a:latin typeface="Optimum"/>
                 <a:ea typeface="ＭＳ Ｐゴシック" panose="020B0600070205080204" pitchFamily="34" charset="-128"/>
-                <a:cs typeface="+mn-cs"/>
-              </a:rPr>
-              <a:t>	    </a:t>
-            </a:r>
-            <a:r>
-              <a:rPr kumimoji="0" lang="en-US" altLang="en-US" sz="1500" b="1" i="0" u="none" strike="noStrike" kern="0" cap="none" spc="0" normalizeH="0" baseline="0" noProof="0" dirty="0" err="1">
-                <a:ln>
-                  <a:noFill/>
-                </a:ln>
-                <a:solidFill>
-                  <a:srgbClr val="02030E"/>
-                </a:solidFill>
-                <a:effectLst/>
-                <a:uLnTx/>
-                <a:uFillTx/>
+              </a:rPr>
+              <a:t>	</a:t>
+            </a:r>
+            <a:r>
+              <a:rPr lang="en-CA" altLang="en-US" sz="1500" b="1" kern="0" dirty="0" smtClean="0">
+                <a:solidFill>
+                  <a:srgbClr val="02030E"/>
+                </a:solidFill>
                 <a:latin typeface="Optimum"/>
                 <a:ea typeface="ＭＳ Ｐゴシック" panose="020B0600070205080204" pitchFamily="34" charset="-128"/>
-                <a:cs typeface="+mn-cs"/>
-              </a:rPr>
-              <a:t>setChanged</a:t>
-            </a:r>
-            <a:r>
-              <a:rPr kumimoji="0" lang="en-US" altLang="en-US" sz="1500" b="1" i="0" u="none" strike="noStrike" kern="0" cap="none" spc="0" normalizeH="0" baseline="0" noProof="0" dirty="0">
-                <a:ln>
-                  <a:noFill/>
-                </a:ln>
-                <a:solidFill>
-                  <a:srgbClr val="02030E"/>
-                </a:solidFill>
-                <a:effectLst/>
-                <a:uLnTx/>
-                <a:uFillTx/>
+              </a:rPr>
+              <a:t>    	return;</a:t>
+            </a:r>
+            <a:endParaRPr lang="en-US" altLang="en-US" sz="1500" b="1" kern="0" dirty="0" smtClean="0">
+              <a:solidFill>
+                <a:srgbClr val="02030E"/>
+              </a:solidFill>
+              <a:latin typeface="Optimum"/>
+              <a:ea typeface="ＭＳ Ｐゴシック" panose="020B0600070205080204" pitchFamily="34" charset="-128"/>
+            </a:endParaRPr>
+          </a:p>
+          <a:p>
+            <a:pPr marL="285750" lvl="0" indent="-285750" eaLnBrk="0" fontAlgn="base" hangingPunct="0">
+              <a:lnSpc>
+                <a:spcPct val="67000"/>
+              </a:lnSpc>
+              <a:spcBef>
+                <a:spcPct val="30000"/>
+              </a:spcBef>
+              <a:spcAft>
+                <a:spcPct val="0"/>
+              </a:spcAft>
+              <a:buSzPct val="100000"/>
+              <a:buNone/>
+              <a:defRPr/>
+            </a:pPr>
+            <a:r>
+              <a:rPr lang="en-US" altLang="en-US" sz="1500" b="1" kern="0" dirty="0" smtClean="0">
+                <a:solidFill>
+                  <a:srgbClr val="02030E"/>
+                </a:solidFill>
                 <a:latin typeface="Optimum"/>
                 <a:ea typeface="ＭＳ Ｐゴシック" panose="020B0600070205080204" pitchFamily="34" charset="-128"/>
-                <a:cs typeface="+mn-cs"/>
-              </a:rPr>
-              <a:t>();</a:t>
-            </a:r>
+              </a:rPr>
+              <a:t>	 </a:t>
+            </a:r>
+            <a:r>
+              <a:rPr lang="en-US" altLang="en-US" sz="1500" b="1" kern="0" dirty="0" smtClean="0">
+                <a:solidFill>
+                  <a:srgbClr val="02030E"/>
+                </a:solidFill>
+                <a:latin typeface="Optimum"/>
+                <a:ea typeface="ＭＳ Ｐゴシック" panose="020B0600070205080204" pitchFamily="34" charset="-128"/>
+              </a:rPr>
+              <a:t>    </a:t>
+            </a:r>
+            <a:r>
+              <a:rPr lang="en-US" altLang="en-US" sz="1500" b="1" kern="0" dirty="0" err="1" smtClean="0">
+                <a:solidFill>
+                  <a:srgbClr val="02030E"/>
+                </a:solidFill>
+                <a:latin typeface="Optimum"/>
+                <a:ea typeface="ＭＳ Ｐゴシック" panose="020B0600070205080204" pitchFamily="34" charset="-128"/>
+              </a:rPr>
+              <a:t>stateString</a:t>
+            </a:r>
+            <a:r>
+              <a:rPr lang="en-US" altLang="en-US" sz="1500" b="1" kern="0" dirty="0" smtClean="0">
+                <a:solidFill>
+                  <a:srgbClr val="02030E"/>
+                </a:solidFill>
+                <a:latin typeface="Optimum"/>
+                <a:ea typeface="ＭＳ Ｐゴシック" panose="020B0600070205080204" pitchFamily="34" charset="-128"/>
+              </a:rPr>
+              <a:t> </a:t>
+            </a:r>
+            <a:r>
+              <a:rPr lang="en-US" altLang="en-US" sz="1500" b="1" kern="0" dirty="0" smtClean="0">
+                <a:solidFill>
+                  <a:srgbClr val="02030E"/>
+                </a:solidFill>
+                <a:latin typeface="Optimum"/>
+                <a:ea typeface="ＭＳ Ｐゴシック" panose="020B0600070205080204" pitchFamily="34" charset="-128"/>
+              </a:rPr>
+              <a:t>= s</a:t>
+            </a:r>
+            <a:r>
+              <a:rPr lang="en-US" altLang="en-US" sz="1500" b="1" kern="0" dirty="0" smtClean="0">
+                <a:solidFill>
+                  <a:srgbClr val="02030E"/>
+                </a:solidFill>
+                <a:latin typeface="Optimum"/>
+                <a:ea typeface="ＭＳ Ｐゴシック" panose="020B0600070205080204" pitchFamily="34" charset="-128"/>
+              </a:rPr>
+              <a:t>;</a:t>
+            </a:r>
+            <a:endParaRPr kumimoji="0" lang="en-US" altLang="en-US" sz="1500" b="1" i="0" u="none" strike="noStrike" kern="0" cap="none" spc="0" normalizeH="0" baseline="0" noProof="0" dirty="0">
+              <a:ln>
+                <a:noFill/>
+              </a:ln>
+              <a:solidFill>
+                <a:srgbClr val="02030E"/>
+              </a:solidFill>
+              <a:effectLst/>
+              <a:uLnTx/>
+              <a:uFillTx/>
+              <a:latin typeface="Optimum"/>
+              <a:ea typeface="ＭＳ Ｐゴシック" panose="020B0600070205080204" pitchFamily="34" charset="-128"/>
+              <a:cs typeface="+mn-cs"/>
+            </a:endParaRPr>
           </a:p>
           <a:p>
             <a:pPr marL="285750" marR="0" lvl="0" indent="-285750" algn="l" defTabSz="914400" rtl="0" eaLnBrk="0" fontAlgn="base" latinLnBrk="0" hangingPunct="0">
@@ -7665,10 +7768,10 @@
                 <a:ea typeface="ＭＳ Ｐゴシック" panose="020B0600070205080204" pitchFamily="34" charset="-128"/>
                 <a:cs typeface="+mn-cs"/>
               </a:rPr>
-              <a:t>	    </a:t>
-            </a:r>
-            <a:r>
-              <a:rPr kumimoji="0" lang="en-US" altLang="en-US" sz="1500" b="1" i="0" u="none" strike="noStrike" kern="0" cap="none" spc="0" normalizeH="0" baseline="0" noProof="0" dirty="0" err="1">
+              <a:t>	</a:t>
+            </a:r>
+            <a:r>
+              <a:rPr kumimoji="0" lang="en-US" altLang="en-US" sz="1500" b="1" i="0" u="none" strike="noStrike" kern="0" cap="none" spc="0" normalizeH="0" baseline="0" noProof="0" dirty="0" smtClean="0">
                 <a:ln>
                   <a:noFill/>
                 </a:ln>
@@ -7682,7 +7785,24 @@
                 <a:ea typeface="ＭＳ Ｐゴシック" panose="020B0600070205080204" pitchFamily="34" charset="-128"/>
                 <a:cs typeface="+mn-cs"/>
               </a:rPr>
-              <a:t>notifyObservers</a:t>
+              <a:t>     </a:t>
+            </a:r>
+            <a:r>
+              <a:rPr kumimoji="0" lang="en-US" altLang="en-US" sz="1500" b="1" i="0" u="none" strike="noStrike" kern="0" cap="none" spc="0" normalizeH="0" baseline="0" noProof="0" dirty="0" err="1" smtClean="0">
+                <a:ln>
+                  <a:noFill/>
+                </a:ln>
+                <a:solidFill>
+                  <a:srgbClr val="02030E"/>
+                </a:solidFill>
+                <a:effectLst/>
+                <a:uLnTx/>
+                <a:uFillTx/>
+                <a:latin typeface="Optimum"/>
+                <a:ea typeface="ＭＳ Ｐゴシック" panose="020B0600070205080204" pitchFamily="34" charset="-128"/>
+                <a:cs typeface="+mn-cs"/>
+              </a:rPr>
+              <a:t>setChanged</a:t>
             </a:r>
             <a:r>
               <a:rPr kumimoji="0" lang="en-US" altLang="en-US" sz="1500" b="1" i="0" u="none" strike="noStrike" kern="0" cap="none" spc="0" normalizeH="0" baseline="0" noProof="0" dirty="0">
@@ -7699,7 +7819,7 @@
                 <a:ea typeface="ＭＳ Ｐゴシック" panose="020B0600070205080204" pitchFamily="34" charset="-128"/>
                 <a:cs typeface="+mn-cs"/>
               </a:rPr>
-              <a:t>("State changed");</a:t>
+              <a:t>();</a:t>
             </a:r>
           </a:p>
           <a:p>
@@ -7735,7 +7855,58 @@
                 <a:ea typeface="ＭＳ Ｐゴシック" panose="020B0600070205080204" pitchFamily="34" charset="-128"/>
                 <a:cs typeface="+mn-cs"/>
               </a:rPr>
-              <a:t>	}</a:t>
+              <a:t>	</a:t>
+            </a:r>
+            <a:r>
+              <a:rPr kumimoji="0" lang="en-US" altLang="en-US" sz="1500" b="1" i="0" u="none" strike="noStrike" kern="0" cap="none" spc="0" normalizeH="0" baseline="0" noProof="0" dirty="0" smtClean="0">
+                <a:ln>
+                  <a:noFill/>
+                </a:ln>
+                <a:solidFill>
+                  <a:srgbClr val="02030E"/>
+                </a:solidFill>
+                <a:effectLst/>
+                <a:uLnTx/>
+                <a:uFillTx/>
+                <a:latin typeface="Optimum"/>
+                <a:ea typeface="ＭＳ Ｐゴシック" panose="020B0600070205080204" pitchFamily="34" charset="-128"/>
+                <a:cs typeface="+mn-cs"/>
+              </a:rPr>
+              <a:t>     </a:t>
+            </a:r>
+            <a:r>
+              <a:rPr kumimoji="0" lang="en-US" altLang="en-US" sz="1500" b="1" i="0" u="none" strike="noStrike" kern="0" cap="none" spc="0" normalizeH="0" baseline="0" noProof="0" dirty="0" err="1" smtClean="0">
+                <a:ln>
+                  <a:noFill/>
+                </a:ln>
+                <a:solidFill>
+                  <a:srgbClr val="02030E"/>
+                </a:solidFill>
+                <a:effectLst/>
+                <a:uLnTx/>
+                <a:uFillTx/>
+                <a:latin typeface="Optimum"/>
+                <a:ea typeface="ＭＳ Ｐゴシック" panose="020B0600070205080204" pitchFamily="34" charset="-128"/>
+                <a:cs typeface="+mn-cs"/>
+              </a:rPr>
+              <a:t>notifyObservers</a:t>
+            </a:r>
+            <a:r>
+              <a:rPr kumimoji="0" lang="en-US" altLang="en-US" sz="1500" b="1" i="0" u="none" strike="noStrike" kern="0" cap="none" spc="0" normalizeH="0" baseline="0" noProof="0" dirty="0">
+                <a:ln>
+                  <a:noFill/>
+                </a:ln>
+                <a:solidFill>
+                  <a:srgbClr val="02030E"/>
+                </a:solidFill>
+                <a:effectLst/>
+                <a:uLnTx/>
+                <a:uFillTx/>
+                <a:latin typeface="Optimum"/>
+                <a:ea typeface="ＭＳ Ｐゴシック" panose="020B0600070205080204" pitchFamily="34" charset="-128"/>
+                <a:cs typeface="+mn-cs"/>
+              </a:rPr>
+              <a:t>("State changed");</a:t>
             </a:r>
           </a:p>
           <a:p>
@@ -7757,41 +7928,27 @@
               <a:defRPr/>
             </a:pPr>
             <a:r>
-              <a:rPr kumimoji="0" lang="en-US" altLang="en-US" sz="1500" b="1" i="0" u="none" strike="noStrike" kern="0" cap="none" spc="0" normalizeH="0" baseline="0" noProof="0" dirty="0">
-                <a:ln>
-                  <a:noFill/>
-                </a:ln>
-                <a:solidFill>
-                  <a:srgbClr val="02030E"/>
-                </a:solidFill>
-                <a:effectLst/>
-                <a:uLnTx/>
-                <a:uFillTx/>
+              <a:rPr lang="en-US" altLang="en-US" sz="1500" b="1" kern="0" dirty="0">
+                <a:solidFill>
+                  <a:srgbClr val="02030E"/>
+                </a:solidFill>
                 <a:latin typeface="Optimum"/>
                 <a:ea typeface="ＭＳ Ｐゴシック" panose="020B0600070205080204" pitchFamily="34" charset="-128"/>
-                <a:cs typeface="+mn-cs"/>
-              </a:rPr>
-              <a:t>	</a:t>
-            </a:r>
-            <a:r>
-              <a:rPr kumimoji="0" lang="en-US" altLang="en-US" sz="1500" b="1" i="0" u="none" strike="noStrike" kern="0" cap="none" spc="0" normalizeH="0" baseline="0" noProof="0" dirty="0" err="1">
-                <a:ln>
-                  <a:noFill/>
-                </a:ln>
-                <a:solidFill>
-                  <a:srgbClr val="02030E"/>
-                </a:solidFill>
-                <a:effectLst/>
-                <a:uLnTx/>
-                <a:uFillTx/>
+              </a:rPr>
+              <a:t> </a:t>
+            </a:r>
+            <a:r>
+              <a:rPr lang="en-US" altLang="en-US" sz="1500" b="1" kern="0" dirty="0" smtClean="0">
+                <a:solidFill>
+                  <a:srgbClr val="02030E"/>
+                </a:solidFill>
                 <a:latin typeface="Optimum"/>
                 <a:ea typeface="ＭＳ Ｐゴシック" panose="020B0600070205080204" pitchFamily="34" charset="-128"/>
-                <a:cs typeface="+mn-cs"/>
-              </a:rPr>
-              <a:t>stateString</a:t>
-            </a:r>
-            <a:r>
-              <a:rPr kumimoji="0" lang="en-US" altLang="en-US" sz="1500" b="1" i="0" u="none" strike="noStrike" kern="0" cap="none" spc="0" normalizeH="0" baseline="0" noProof="0" dirty="0">
+              </a:rPr>
+              <a:t>   </a:t>
+            </a:r>
+            <a:r>
+              <a:rPr kumimoji="0" lang="en-US" altLang="en-US" sz="1500" b="1" i="0" u="none" strike="noStrike" kern="0" cap="none" spc="0" normalizeH="0" baseline="0" noProof="0" dirty="0" smtClean="0">
                 <a:ln>
                   <a:noFill/>
                 </a:ln>
@@ -7805,44 +7962,22 @@
                 <a:ea typeface="ＭＳ Ｐゴシック" panose="020B0600070205080204" pitchFamily="34" charset="-128"/>
                 <a:cs typeface="+mn-cs"/>
               </a:rPr>
-              <a:t> = s;</a:t>
-            </a:r>
-          </a:p>
-          <a:p>
-            <a:pPr marL="285750" marR="0" lvl="0" indent="-285750" algn="l" defTabSz="914400" rtl="0" eaLnBrk="0" fontAlgn="base" latinLnBrk="0" hangingPunct="0">
-              <a:lnSpc>
-                <a:spcPct val="67000"/>
-              </a:lnSpc>
-              <a:spcBef>
-                <a:spcPct val="30000"/>
-              </a:spcBef>
-              <a:spcAft>
-                <a:spcPct val="0"/>
-              </a:spcAft>
-              <a:buClrTx/>
-              <a:buSzPct val="100000"/>
-              <a:buFontTx/>
-              <a:buNone/>
-              <a:tabLst/>
-              <a:defRPr/>
-            </a:pPr>
-            <a:r>
-              <a:rPr kumimoji="0" lang="en-US" altLang="en-US" sz="1500" b="1" i="0" u="none" strike="noStrike" kern="0" cap="none" spc="0" normalizeH="0" baseline="0" noProof="0" dirty="0">
-                <a:ln>
-                  <a:noFill/>
-                </a:ln>
-                <a:solidFill>
-                  <a:srgbClr val="02030E"/>
-                </a:solidFill>
-                <a:effectLst/>
-                <a:uLnTx/>
-                <a:uFillTx/>
-                <a:latin typeface="Optimum"/>
-                <a:ea typeface="ＭＳ Ｐゴシック" panose="020B0600070205080204" pitchFamily="34" charset="-128"/>
-                <a:cs typeface="+mn-cs"/>
-              </a:rPr>
-              <a:t>    }</a:t>
-            </a:r>
+              <a:t>}</a:t>
+            </a:r>
+            <a:endParaRPr kumimoji="0" lang="en-US" altLang="en-US" sz="1500" b="1" i="0" u="none" strike="noStrike" kern="0" cap="none" spc="0" normalizeH="0" baseline="0" noProof="0" dirty="0">
+              <a:ln>
+                <a:noFill/>
+              </a:ln>
+              <a:solidFill>
+                <a:srgbClr val="02030E"/>
+              </a:solidFill>
+              <a:effectLst/>
+              <a:uLnTx/>
+              <a:uFillTx/>
+              <a:latin typeface="Optimum"/>
+              <a:ea typeface="ＭＳ Ｐゴシック" panose="020B0600070205080204" pitchFamily="34" charset="-128"/>
+              <a:cs typeface="+mn-cs"/>
+            </a:endParaRPr>
           </a:p>
           <a:p>
             <a:pPr marL="285750" marR="0" lvl="0" indent="-285750" algn="l" defTabSz="914400" rtl="0" eaLnBrk="0" fontAlgn="base" latinLnBrk="0" hangingPunct="0">
@@ -7934,7 +8069,7 @@
     </p:spTree>
     <p:extLst>
       <p:ext uri="{BB962C8B-B14F-4D97-AF65-F5344CB8AC3E}">
-        <p14:creationId xmlns:p14="http://schemas.microsoft.com/office/powerpoint/2010/main" xmlns="" val="3064902311"/>
+        <p14:creationId xmlns="" xmlns:p14="http://schemas.microsoft.com/office/powerpoint/2010/main" val="3064902311"/>
       </p:ext>
     </p:extLst>
   </p:cSld>
@@ -8545,7 +8680,7 @@
     </p:spTree>
     <p:extLst>
       <p:ext uri="{BB962C8B-B14F-4D97-AF65-F5344CB8AC3E}">
-        <p14:creationId xmlns:p14="http://schemas.microsoft.com/office/powerpoint/2010/main" xmlns="" val="4198276298"/>
+        <p14:creationId xmlns="" xmlns:p14="http://schemas.microsoft.com/office/powerpoint/2010/main" val="4198276298"/>
       </p:ext>
     </p:extLst>
   </p:cSld>
@@ -10137,7 +10272,7 @@
     </p:spTree>
     <p:extLst>
       <p:ext uri="{BB962C8B-B14F-4D97-AF65-F5344CB8AC3E}">
-        <p14:creationId xmlns:p14="http://schemas.microsoft.com/office/powerpoint/2010/main" xmlns="" val="677536238"/>
+        <p14:creationId xmlns="" xmlns:p14="http://schemas.microsoft.com/office/powerpoint/2010/main" val="677536238"/>
       </p:ext>
     </p:extLst>
   </p:cSld>
@@ -10897,7 +11032,7 @@
     </p:spTree>
     <p:extLst>
       <p:ext uri="{BB962C8B-B14F-4D97-AF65-F5344CB8AC3E}">
-        <p14:creationId xmlns:p14="http://schemas.microsoft.com/office/powerpoint/2010/main" xmlns="" val="51204498"/>
+        <p14:creationId xmlns="" xmlns:p14="http://schemas.microsoft.com/office/powerpoint/2010/main" val="51204498"/>
       </p:ext>
     </p:extLst>
   </p:cSld>
@@ -11033,7 +11168,7 @@
           <p:cNvPr id="7" name="Picture 6">
             <a:extLst>
               <a:ext uri="{FF2B5EF4-FFF2-40B4-BE49-F238E27FC236}">
-                <a16:creationId xmlns:a16="http://schemas.microsoft.com/office/drawing/2014/main" xmlns="" id="{9C2B150B-444B-46BD-BBFE-E9E87B53FA13}"/>
+                <a16:creationId xmlns="" xmlns:a16="http://schemas.microsoft.com/office/drawing/2014/main" id="{9C2B150B-444B-46BD-BBFE-E9E87B53FA13}"/>
               </a:ext>
             </a:extLst>
           </p:cNvPr>
@@ -11046,7 +11181,7 @@
           <a:blip r:embed="rId2">
             <a:extLst>
               <a:ext uri="{28A0092B-C50C-407E-A947-70E740481C1C}">
-                <a14:useLocalDpi xmlns:a14="http://schemas.microsoft.com/office/drawing/2010/main" xmlns="" val="0"/>
+                <a14:useLocalDpi xmlns="" xmlns:a14="http://schemas.microsoft.com/office/drawing/2010/main" val="0"/>
               </a:ext>
             </a:extLst>
           </a:blip>
@@ -11069,14 +11204,14 @@
           </a:ln>
           <a:extLst>
             <a:ext uri="{909E8E84-426E-40DD-AFC4-6F175D3DCCD1}">
-              <a14:hiddenFill xmlns:a14="http://schemas.microsoft.com/office/drawing/2010/main" xmlns="">
+              <a14:hiddenFill xmlns="" xmlns:a14="http://schemas.microsoft.com/office/drawing/2010/main">
                 <a:solidFill>
                   <a:srgbClr val="FFFFFF"/>
                 </a:solidFill>
               </a14:hiddenFill>
             </a:ext>
             <a:ext uri="{91240B29-F687-4F45-9708-019B960494DF}">
-              <a14:hiddenLine xmlns:a14="http://schemas.microsoft.com/office/drawing/2010/main" xmlns="" w="12700">
+              <a14:hiddenLine xmlns="" xmlns:a14="http://schemas.microsoft.com/office/drawing/2010/main" w="12700">
                 <a:solidFill>
                   <a:srgbClr val="000000"/>
                 </a:solidFill>
@@ -11093,7 +11228,7 @@
           <p:cNvPr id="8" name="Picture 7">
             <a:extLst>
               <a:ext uri="{FF2B5EF4-FFF2-40B4-BE49-F238E27FC236}">
-                <a16:creationId xmlns:a16="http://schemas.microsoft.com/office/drawing/2014/main" xmlns="" id="{DCCE7B7D-8F45-49A1-8156-387584DEC37B}"/>
+                <a16:creationId xmlns="" xmlns:a16="http://schemas.microsoft.com/office/drawing/2014/main" id="{DCCE7B7D-8F45-49A1-8156-387584DEC37B}"/>
               </a:ext>
             </a:extLst>
           </p:cNvPr>
@@ -11106,7 +11241,7 @@
           <a:blip r:embed="rId3">
             <a:extLst>
               <a:ext uri="{28A0092B-C50C-407E-A947-70E740481C1C}">
-                <a14:useLocalDpi xmlns:a14="http://schemas.microsoft.com/office/drawing/2010/main" xmlns="" val="0"/>
+                <a14:useLocalDpi xmlns="" xmlns:a14="http://schemas.microsoft.com/office/drawing/2010/main" val="0"/>
               </a:ext>
             </a:extLst>
           </a:blip>
@@ -11129,14 +11264,14 @@
           </a:ln>
           <a:extLst>
             <a:ext uri="{909E8E84-426E-40DD-AFC4-6F175D3DCCD1}">
-              <a14:hiddenFill xmlns:a14="http://schemas.microsoft.com/office/drawing/2010/main" xmlns="">
+              <a14:hiddenFill xmlns="" xmlns:a14="http://schemas.microsoft.com/office/drawing/2010/main">
                 <a:solidFill>
                   <a:srgbClr val="FFFFFF"/>
                 </a:solidFill>
               </a14:hiddenFill>
             </a:ext>
             <a:ext uri="{91240B29-F687-4F45-9708-019B960494DF}">
-              <a14:hiddenLine xmlns:a14="http://schemas.microsoft.com/office/drawing/2010/main" xmlns="" w="12700">
+              <a14:hiddenLine xmlns="" xmlns:a14="http://schemas.microsoft.com/office/drawing/2010/main" w="12700">
                 <a:solidFill>
                   <a:srgbClr val="000000"/>
                 </a:solidFill>
@@ -11153,7 +11288,7 @@
           <p:cNvPr id="9" name="Picture 9">
             <a:extLst>
               <a:ext uri="{FF2B5EF4-FFF2-40B4-BE49-F238E27FC236}">
-                <a16:creationId xmlns:a16="http://schemas.microsoft.com/office/drawing/2014/main" xmlns="" id="{3187F495-041D-49E9-BDD3-D818ECFDE7D7}"/>
+                <a16:creationId xmlns="" xmlns:a16="http://schemas.microsoft.com/office/drawing/2014/main" id="{3187F495-041D-49E9-BDD3-D818ECFDE7D7}"/>
               </a:ext>
             </a:extLst>
           </p:cNvPr>
@@ -11166,7 +11301,7 @@
           <a:blip r:embed="rId4" cstate="print">
             <a:extLst>
               <a:ext uri="{28A0092B-C50C-407E-A947-70E740481C1C}">
-                <a14:useLocalDpi xmlns:a14="http://schemas.microsoft.com/office/drawing/2010/main" xmlns="" val="0"/>
+                <a14:useLocalDpi xmlns="" xmlns:a14="http://schemas.microsoft.com/office/drawing/2010/main" val="0"/>
               </a:ext>
             </a:extLst>
           </a:blip>
@@ -11189,14 +11324,14 @@
           </a:ln>
           <a:extLst>
             <a:ext uri="{909E8E84-426E-40DD-AFC4-6F175D3DCCD1}">
-              <a14:hiddenFill xmlns:a14="http://schemas.microsoft.com/office/drawing/2010/main" xmlns="">
+              <a14:hiddenFill xmlns="" xmlns:a14="http://schemas.microsoft.com/office/drawing/2010/main">
                 <a:solidFill>
                   <a:srgbClr val="FFFFFF"/>
                 </a:solidFill>
               </a14:hiddenFill>
             </a:ext>
             <a:ext uri="{91240B29-F687-4F45-9708-019B960494DF}">
-              <a14:hiddenLine xmlns:a14="http://schemas.microsoft.com/office/drawing/2010/main" xmlns="" w="12700">
+              <a14:hiddenLine xmlns="" xmlns:a14="http://schemas.microsoft.com/office/drawing/2010/main" w="12700">
                 <a:solidFill>
                   <a:srgbClr val="000000"/>
                 </a:solidFill>
@@ -11213,7 +11348,7 @@
           <p:cNvPr id="11" name="Picture 10">
             <a:extLst>
               <a:ext uri="{FF2B5EF4-FFF2-40B4-BE49-F238E27FC236}">
-                <a16:creationId xmlns:a16="http://schemas.microsoft.com/office/drawing/2014/main" xmlns="" id="{F68DCEC6-4326-4322-9E8A-A587D3EBFFE7}"/>
+                <a16:creationId xmlns="" xmlns:a16="http://schemas.microsoft.com/office/drawing/2014/main" id="{F68DCEC6-4326-4322-9E8A-A587D3EBFFE7}"/>
               </a:ext>
             </a:extLst>
           </p:cNvPr>
@@ -11226,7 +11361,7 @@
           <a:blip r:embed="rId5">
             <a:extLst>
               <a:ext uri="{28A0092B-C50C-407E-A947-70E740481C1C}">
-                <a14:useLocalDpi xmlns:a14="http://schemas.microsoft.com/office/drawing/2010/main" xmlns="" val="0"/>
+                <a14:useLocalDpi xmlns="" xmlns:a14="http://schemas.microsoft.com/office/drawing/2010/main" val="0"/>
               </a:ext>
             </a:extLst>
           </a:blip>
@@ -11249,14 +11384,14 @@
           </a:ln>
           <a:extLst>
             <a:ext uri="{909E8E84-426E-40DD-AFC4-6F175D3DCCD1}">
-              <a14:hiddenFill xmlns:a14="http://schemas.microsoft.com/office/drawing/2010/main" xmlns="">
+              <a14:hiddenFill xmlns="" xmlns:a14="http://schemas.microsoft.com/office/drawing/2010/main">
                 <a:solidFill>
                   <a:srgbClr val="FFFFFF"/>
                 </a:solidFill>
               </a14:hiddenFill>
             </a:ext>
             <a:ext uri="{91240B29-F687-4F45-9708-019B960494DF}">
-              <a14:hiddenLine xmlns:a14="http://schemas.microsoft.com/office/drawing/2010/main" xmlns="" w="12700">
+              <a14:hiddenLine xmlns="" xmlns:a14="http://schemas.microsoft.com/office/drawing/2010/main" w="12700">
                 <a:solidFill>
                   <a:srgbClr val="000000"/>
                 </a:solidFill>
@@ -11273,7 +11408,7 @@
           <p:cNvPr id="13" name="Picture 11">
             <a:extLst>
               <a:ext uri="{FF2B5EF4-FFF2-40B4-BE49-F238E27FC236}">
-                <a16:creationId xmlns:a16="http://schemas.microsoft.com/office/drawing/2014/main" xmlns="" id="{C66D3B12-35E0-4277-963C-0A544C3D4FA4}"/>
+                <a16:creationId xmlns="" xmlns:a16="http://schemas.microsoft.com/office/drawing/2014/main" id="{C66D3B12-35E0-4277-963C-0A544C3D4FA4}"/>
               </a:ext>
             </a:extLst>
           </p:cNvPr>
@@ -11286,7 +11421,7 @@
           <a:blip r:embed="rId6">
             <a:extLst>
               <a:ext uri="{28A0092B-C50C-407E-A947-70E740481C1C}">
-                <a14:useLocalDpi xmlns:a14="http://schemas.microsoft.com/office/drawing/2010/main" xmlns="" val="0"/>
+                <a14:useLocalDpi xmlns="" xmlns:a14="http://schemas.microsoft.com/office/drawing/2010/main" val="0"/>
               </a:ext>
             </a:extLst>
           </a:blip>
@@ -11309,14 +11444,14 @@
           </a:ln>
           <a:extLst>
             <a:ext uri="{909E8E84-426E-40DD-AFC4-6F175D3DCCD1}">
-              <a14:hiddenFill xmlns:a14="http://schemas.microsoft.com/office/drawing/2010/main" xmlns="">
+              <a14:hiddenFill xmlns="" xmlns:a14="http://schemas.microsoft.com/office/drawing/2010/main">
                 <a:solidFill>
                   <a:srgbClr val="FFFFFF"/>
                 </a:solidFill>
               </a14:hiddenFill>
             </a:ext>
             <a:ext uri="{91240B29-F687-4F45-9708-019B960494DF}">
-              <a14:hiddenLine xmlns:a14="http://schemas.microsoft.com/office/drawing/2010/main" xmlns="" w="12700">
+              <a14:hiddenLine xmlns="" xmlns:a14="http://schemas.microsoft.com/office/drawing/2010/main" w="12700">
                 <a:solidFill>
                   <a:srgbClr val="000000"/>
                 </a:solidFill>
@@ -11333,7 +11468,7 @@
           <p:cNvPr id="14" name="Line 12">
             <a:extLst>
               <a:ext uri="{FF2B5EF4-FFF2-40B4-BE49-F238E27FC236}">
-                <a16:creationId xmlns:a16="http://schemas.microsoft.com/office/drawing/2014/main" xmlns="" id="{BCCE14CC-DFE7-4D23-A28F-4CB13A134799}"/>
+                <a16:creationId xmlns="" xmlns:a16="http://schemas.microsoft.com/office/drawing/2014/main" id="{BCCE14CC-DFE7-4D23-A28F-4CB13A134799}"/>
               </a:ext>
             </a:extLst>
           </p:cNvPr>
@@ -11361,7 +11496,7 @@
           </a:ln>
           <a:extLst>
             <a:ext uri="{909E8E84-426E-40DD-AFC4-6F175D3DCCD1}">
-              <a14:hiddenFill xmlns:a14="http://schemas.microsoft.com/office/drawing/2010/main" xmlns="">
+              <a14:hiddenFill xmlns="" xmlns:a14="http://schemas.microsoft.com/office/drawing/2010/main">
                 <a:noFill/>
               </a14:hiddenFill>
             </a:ext>
@@ -11380,7 +11515,7 @@
           <p:cNvPr id="15" name="Line 13">
             <a:extLst>
               <a:ext uri="{FF2B5EF4-FFF2-40B4-BE49-F238E27FC236}">
-                <a16:creationId xmlns:a16="http://schemas.microsoft.com/office/drawing/2014/main" xmlns="" id="{F303978A-31F8-4DDC-8BF6-DB8DBABEADEB}"/>
+                <a16:creationId xmlns="" xmlns:a16="http://schemas.microsoft.com/office/drawing/2014/main" id="{F303978A-31F8-4DDC-8BF6-DB8DBABEADEB}"/>
               </a:ext>
             </a:extLst>
           </p:cNvPr>
@@ -11408,7 +11543,7 @@
           </a:ln>
           <a:extLst>
             <a:ext uri="{909E8E84-426E-40DD-AFC4-6F175D3DCCD1}">
-              <a14:hiddenFill xmlns:a14="http://schemas.microsoft.com/office/drawing/2010/main" xmlns="">
+              <a14:hiddenFill xmlns="" xmlns:a14="http://schemas.microsoft.com/office/drawing/2010/main">
                 <a:noFill/>
               </a14:hiddenFill>
             </a:ext>
@@ -11427,7 +11562,7 @@
           <p:cNvPr id="16" name="Line 14">
             <a:extLst>
               <a:ext uri="{FF2B5EF4-FFF2-40B4-BE49-F238E27FC236}">
-                <a16:creationId xmlns:a16="http://schemas.microsoft.com/office/drawing/2014/main" xmlns="" id="{193E7C83-C1D5-4017-B883-05869BFFBE7A}"/>
+                <a16:creationId xmlns="" xmlns:a16="http://schemas.microsoft.com/office/drawing/2014/main" id="{193E7C83-C1D5-4017-B883-05869BFFBE7A}"/>
               </a:ext>
             </a:extLst>
           </p:cNvPr>
@@ -11455,7 +11590,7 @@
           </a:ln>
           <a:extLst>
             <a:ext uri="{909E8E84-426E-40DD-AFC4-6F175D3DCCD1}">
-              <a14:hiddenFill xmlns:a14="http://schemas.microsoft.com/office/drawing/2010/main" xmlns="">
+              <a14:hiddenFill xmlns="" xmlns:a14="http://schemas.microsoft.com/office/drawing/2010/main">
                 <a:noFill/>
               </a14:hiddenFill>
             </a:ext>
@@ -11474,7 +11609,7 @@
           <p:cNvPr id="17" name="Line 15">
             <a:extLst>
               <a:ext uri="{FF2B5EF4-FFF2-40B4-BE49-F238E27FC236}">
-                <a16:creationId xmlns:a16="http://schemas.microsoft.com/office/drawing/2014/main" xmlns="" id="{5E00F5B2-7909-423F-AB36-CBA5EADD3306}"/>
+                <a16:creationId xmlns="" xmlns:a16="http://schemas.microsoft.com/office/drawing/2014/main" id="{5E00F5B2-7909-423F-AB36-CBA5EADD3306}"/>
               </a:ext>
             </a:extLst>
           </p:cNvPr>
@@ -11502,7 +11637,7 @@
           </a:ln>
           <a:extLst>
             <a:ext uri="{909E8E84-426E-40DD-AFC4-6F175D3DCCD1}">
-              <a14:hiddenFill xmlns:a14="http://schemas.microsoft.com/office/drawing/2010/main" xmlns="">
+              <a14:hiddenFill xmlns="" xmlns:a14="http://schemas.microsoft.com/office/drawing/2010/main">
                 <a:noFill/>
               </a14:hiddenFill>
             </a:ext>
@@ -11521,7 +11656,7 @@
           <p:cNvPr id="18" name="Line 16">
             <a:extLst>
               <a:ext uri="{FF2B5EF4-FFF2-40B4-BE49-F238E27FC236}">
-                <a16:creationId xmlns:a16="http://schemas.microsoft.com/office/drawing/2014/main" xmlns="" id="{92F7B066-4852-46C8-88E4-52580E10E3BF}"/>
+                <a16:creationId xmlns="" xmlns:a16="http://schemas.microsoft.com/office/drawing/2014/main" id="{92F7B066-4852-46C8-88E4-52580E10E3BF}"/>
               </a:ext>
             </a:extLst>
           </p:cNvPr>
@@ -11549,7 +11684,7 @@
           </a:ln>
           <a:extLst>
             <a:ext uri="{909E8E84-426E-40DD-AFC4-6F175D3DCCD1}">
-              <a14:hiddenFill xmlns:a14="http://schemas.microsoft.com/office/drawing/2010/main" xmlns="">
+              <a14:hiddenFill xmlns="" xmlns:a14="http://schemas.microsoft.com/office/drawing/2010/main">
                 <a:noFill/>
               </a14:hiddenFill>
             </a:ext>
@@ -11568,7 +11703,7 @@
           <p:cNvPr id="19" name="Line 17">
             <a:extLst>
               <a:ext uri="{FF2B5EF4-FFF2-40B4-BE49-F238E27FC236}">
-                <a16:creationId xmlns:a16="http://schemas.microsoft.com/office/drawing/2014/main" xmlns="" id="{D54A0198-E9D6-4A97-BBAC-FDA58BBD7F05}"/>
+                <a16:creationId xmlns="" xmlns:a16="http://schemas.microsoft.com/office/drawing/2014/main" id="{D54A0198-E9D6-4A97-BBAC-FDA58BBD7F05}"/>
               </a:ext>
             </a:extLst>
           </p:cNvPr>
@@ -11597,7 +11732,7 @@
           </a:ln>
           <a:extLst>
             <a:ext uri="{909E8E84-426E-40DD-AFC4-6F175D3DCCD1}">
-              <a14:hiddenFill xmlns:a14="http://schemas.microsoft.com/office/drawing/2010/main" xmlns="">
+              <a14:hiddenFill xmlns="" xmlns:a14="http://schemas.microsoft.com/office/drawing/2010/main">
                 <a:noFill/>
               </a14:hiddenFill>
             </a:ext>
@@ -11616,7 +11751,7 @@
           <p:cNvPr id="20" name="Line 18">
             <a:extLst>
               <a:ext uri="{FF2B5EF4-FFF2-40B4-BE49-F238E27FC236}">
-                <a16:creationId xmlns:a16="http://schemas.microsoft.com/office/drawing/2014/main" xmlns="" id="{44C637BC-5D8D-4413-BC86-3881BD9D07F1}"/>
+                <a16:creationId xmlns="" xmlns:a16="http://schemas.microsoft.com/office/drawing/2014/main" id="{44C637BC-5D8D-4413-BC86-3881BD9D07F1}"/>
               </a:ext>
             </a:extLst>
           </p:cNvPr>
@@ -11645,7 +11780,7 @@
           </a:ln>
           <a:extLst>
             <a:ext uri="{909E8E84-426E-40DD-AFC4-6F175D3DCCD1}">
-              <a14:hiddenFill xmlns:a14="http://schemas.microsoft.com/office/drawing/2010/main" xmlns="">
+              <a14:hiddenFill xmlns="" xmlns:a14="http://schemas.microsoft.com/office/drawing/2010/main">
                 <a:noFill/>
               </a14:hiddenFill>
             </a:ext>
@@ -11664,7 +11799,7 @@
           <p:cNvPr id="21" name="Line 19">
             <a:extLst>
               <a:ext uri="{FF2B5EF4-FFF2-40B4-BE49-F238E27FC236}">
-                <a16:creationId xmlns:a16="http://schemas.microsoft.com/office/drawing/2014/main" xmlns="" id="{9BFF023D-3912-4E13-8976-5429C905D21A}"/>
+                <a16:creationId xmlns="" xmlns:a16="http://schemas.microsoft.com/office/drawing/2014/main" id="{9BFF023D-3912-4E13-8976-5429C905D21A}"/>
               </a:ext>
             </a:extLst>
           </p:cNvPr>
@@ -11693,7 +11828,7 @@
           </a:ln>
           <a:extLst>
             <a:ext uri="{909E8E84-426E-40DD-AFC4-6F175D3DCCD1}">
-              <a14:hiddenFill xmlns:a14="http://schemas.microsoft.com/office/drawing/2010/main" xmlns="">
+              <a14:hiddenFill xmlns="" xmlns:a14="http://schemas.microsoft.com/office/drawing/2010/main">
                 <a:noFill/>
               </a14:hiddenFill>
             </a:ext>
@@ -11712,7 +11847,7 @@
           <p:cNvPr id="22" name="Line 20">
             <a:extLst>
               <a:ext uri="{FF2B5EF4-FFF2-40B4-BE49-F238E27FC236}">
-                <a16:creationId xmlns:a16="http://schemas.microsoft.com/office/drawing/2014/main" xmlns="" id="{55C9EE8B-FD92-4EEA-BD6D-E15BC1FEA926}"/>
+                <a16:creationId xmlns="" xmlns:a16="http://schemas.microsoft.com/office/drawing/2014/main" id="{55C9EE8B-FD92-4EEA-BD6D-E15BC1FEA926}"/>
               </a:ext>
             </a:extLst>
           </p:cNvPr>
@@ -11741,7 +11876,7 @@
           </a:ln>
           <a:extLst>
             <a:ext uri="{909E8E84-426E-40DD-AFC4-6F175D3DCCD1}">
-              <a14:hiddenFill xmlns:a14="http://schemas.microsoft.com/office/drawing/2010/main" xmlns="">
+              <a14:hiddenFill xmlns="" xmlns:a14="http://schemas.microsoft.com/office/drawing/2010/main">
                 <a:noFill/>
               </a14:hiddenFill>
             </a:ext>
@@ -11760,7 +11895,7 @@
           <p:cNvPr id="23" name="Text Box 21">
             <a:extLst>
               <a:ext uri="{FF2B5EF4-FFF2-40B4-BE49-F238E27FC236}">
-                <a16:creationId xmlns:a16="http://schemas.microsoft.com/office/drawing/2014/main" xmlns="" id="{B3E84F8E-3C8C-455D-8EF2-9919E5F63C43}"/>
+                <a16:creationId xmlns="" xmlns:a16="http://schemas.microsoft.com/office/drawing/2014/main" id="{B3E84F8E-3C8C-455D-8EF2-9919E5F63C43}"/>
               </a:ext>
             </a:extLst>
           </p:cNvPr>
@@ -11783,14 +11918,14 @@
           </a:ln>
           <a:extLst>
             <a:ext uri="{909E8E84-426E-40DD-AFC4-6F175D3DCCD1}">
-              <a14:hiddenFill xmlns:a14="http://schemas.microsoft.com/office/drawing/2010/main" xmlns="">
+              <a14:hiddenFill xmlns="" xmlns:a14="http://schemas.microsoft.com/office/drawing/2010/main">
                 <a:solidFill>
                   <a:srgbClr val="FFFFFF"/>
                 </a:solidFill>
               </a14:hiddenFill>
             </a:ext>
             <a:ext uri="{91240B29-F687-4F45-9708-019B960494DF}">
-              <a14:hiddenLine xmlns:a14="http://schemas.microsoft.com/office/drawing/2010/main" xmlns="" w="12700">
+              <a14:hiddenLine xmlns="" xmlns:a14="http://schemas.microsoft.com/office/drawing/2010/main" w="12700">
                 <a:solidFill>
                   <a:srgbClr val="000000"/>
                 </a:solidFill>
@@ -11936,7 +12071,7 @@
           <p:cNvPr id="24" name="Text Box 22">
             <a:extLst>
               <a:ext uri="{FF2B5EF4-FFF2-40B4-BE49-F238E27FC236}">
-                <a16:creationId xmlns:a16="http://schemas.microsoft.com/office/drawing/2014/main" xmlns="" id="{7157654E-A0FB-4E0A-9101-804BA6728988}"/>
+                <a16:creationId xmlns="" xmlns:a16="http://schemas.microsoft.com/office/drawing/2014/main" id="{7157654E-A0FB-4E0A-9101-804BA6728988}"/>
               </a:ext>
             </a:extLst>
           </p:cNvPr>
@@ -11959,14 +12094,14 @@
           </a:ln>
           <a:extLst>
             <a:ext uri="{909E8E84-426E-40DD-AFC4-6F175D3DCCD1}">
-              <a14:hiddenFill xmlns:a14="http://schemas.microsoft.com/office/drawing/2010/main" xmlns="">
+              <a14:hiddenFill xmlns="" xmlns:a14="http://schemas.microsoft.com/office/drawing/2010/main">
                 <a:solidFill>
                   <a:srgbClr val="FFFFFF"/>
                 </a:solidFill>
               </a14:hiddenFill>
             </a:ext>
             <a:ext uri="{91240B29-F687-4F45-9708-019B960494DF}">
-              <a14:hiddenLine xmlns:a14="http://schemas.microsoft.com/office/drawing/2010/main" xmlns="" w="12700">
+              <a14:hiddenLine xmlns="" xmlns:a14="http://schemas.microsoft.com/office/drawing/2010/main" w="12700">
                 <a:solidFill>
                   <a:srgbClr val="000000"/>
                 </a:solidFill>
@@ -12112,7 +12247,7 @@
           <p:cNvPr id="25" name="Text Box 23">
             <a:extLst>
               <a:ext uri="{FF2B5EF4-FFF2-40B4-BE49-F238E27FC236}">
-                <a16:creationId xmlns:a16="http://schemas.microsoft.com/office/drawing/2014/main" xmlns="" id="{2B78C549-4DA6-4798-9EEA-7D1D29395F6C}"/>
+                <a16:creationId xmlns="" xmlns:a16="http://schemas.microsoft.com/office/drawing/2014/main" id="{2B78C549-4DA6-4798-9EEA-7D1D29395F6C}"/>
               </a:ext>
             </a:extLst>
           </p:cNvPr>
@@ -12135,14 +12270,14 @@
           </a:ln>
           <a:extLst>
             <a:ext uri="{909E8E84-426E-40DD-AFC4-6F175D3DCCD1}">
-              <a14:hiddenFill xmlns:a14="http://schemas.microsoft.com/office/drawing/2010/main" xmlns="">
+              <a14:hiddenFill xmlns="" xmlns:a14="http://schemas.microsoft.com/office/drawing/2010/main">
                 <a:solidFill>
                   <a:srgbClr val="FFFFFF"/>
                 </a:solidFill>
               </a14:hiddenFill>
             </a:ext>
             <a:ext uri="{91240B29-F687-4F45-9708-019B960494DF}">
-              <a14:hiddenLine xmlns:a14="http://schemas.microsoft.com/office/drawing/2010/main" xmlns="" w="12700">
+              <a14:hiddenLine xmlns="" xmlns:a14="http://schemas.microsoft.com/office/drawing/2010/main" w="12700">
                 <a:solidFill>
                   <a:srgbClr val="000000"/>
                 </a:solidFill>
@@ -12288,7 +12423,7 @@
           <p:cNvPr id="26" name="Text Box 24">
             <a:extLst>
               <a:ext uri="{FF2B5EF4-FFF2-40B4-BE49-F238E27FC236}">
-                <a16:creationId xmlns:a16="http://schemas.microsoft.com/office/drawing/2014/main" xmlns="" id="{C63BACB7-3350-4819-A51C-47026C59BEA4}"/>
+                <a16:creationId xmlns="" xmlns:a16="http://schemas.microsoft.com/office/drawing/2014/main" id="{C63BACB7-3350-4819-A51C-47026C59BEA4}"/>
               </a:ext>
             </a:extLst>
           </p:cNvPr>
@@ -12311,14 +12446,14 @@
           </a:ln>
           <a:extLst>
             <a:ext uri="{909E8E84-426E-40DD-AFC4-6F175D3DCCD1}">
-              <a14:hiddenFill xmlns:a14="http://schemas.microsoft.com/office/drawing/2010/main" xmlns="">
+              <a14:hiddenFill xmlns="" xmlns:a14="http://schemas.microsoft.com/office/drawing/2010/main">
                 <a:solidFill>
                   <a:srgbClr val="FFFFFF"/>
                 </a:solidFill>
               </a14:hiddenFill>
             </a:ext>
             <a:ext uri="{91240B29-F687-4F45-9708-019B960494DF}">
-              <a14:hiddenLine xmlns:a14="http://schemas.microsoft.com/office/drawing/2010/main" xmlns="" w="12700">
+              <a14:hiddenLine xmlns="" xmlns:a14="http://schemas.microsoft.com/office/drawing/2010/main" w="12700">
                 <a:solidFill>
                   <a:srgbClr val="000000"/>
                 </a:solidFill>
@@ -12464,7 +12599,7 @@
           <p:cNvPr id="27" name="Text Box 25">
             <a:extLst>
               <a:ext uri="{FF2B5EF4-FFF2-40B4-BE49-F238E27FC236}">
-                <a16:creationId xmlns:a16="http://schemas.microsoft.com/office/drawing/2014/main" xmlns="" id="{4CD1848C-EEA1-4F81-98BE-50D6ABC6FD6A}"/>
+                <a16:creationId xmlns="" xmlns:a16="http://schemas.microsoft.com/office/drawing/2014/main" id="{4CD1848C-EEA1-4F81-98BE-50D6ABC6FD6A}"/>
               </a:ext>
             </a:extLst>
           </p:cNvPr>
@@ -12487,14 +12622,14 @@
           </a:ln>
           <a:extLst>
             <a:ext uri="{909E8E84-426E-40DD-AFC4-6F175D3DCCD1}">
-              <a14:hiddenFill xmlns:a14="http://schemas.microsoft.com/office/drawing/2010/main" xmlns="">
+              <a14:hiddenFill xmlns="" xmlns:a14="http://schemas.microsoft.com/office/drawing/2010/main">
                 <a:solidFill>
                   <a:srgbClr val="FFFFFF"/>
                 </a:solidFill>
               </a14:hiddenFill>
             </a:ext>
             <a:ext uri="{91240B29-F687-4F45-9708-019B960494DF}">
-              <a14:hiddenLine xmlns:a14="http://schemas.microsoft.com/office/drawing/2010/main" xmlns="" w="12700">
+              <a14:hiddenLine xmlns="" xmlns:a14="http://schemas.microsoft.com/office/drawing/2010/main" w="12700">
                 <a:solidFill>
                   <a:srgbClr val="000000"/>
                 </a:solidFill>
@@ -12640,7 +12775,7 @@
           <p:cNvPr id="28" name="Text Box 26">
             <a:extLst>
               <a:ext uri="{FF2B5EF4-FFF2-40B4-BE49-F238E27FC236}">
-                <a16:creationId xmlns:a16="http://schemas.microsoft.com/office/drawing/2014/main" xmlns="" id="{C8243E26-3131-479D-9DA6-0D8ED7BBAA8E}"/>
+                <a16:creationId xmlns="" xmlns:a16="http://schemas.microsoft.com/office/drawing/2014/main" id="{C8243E26-3131-479D-9DA6-0D8ED7BBAA8E}"/>
               </a:ext>
             </a:extLst>
           </p:cNvPr>
@@ -12663,14 +12798,14 @@
           </a:ln>
           <a:extLst>
             <a:ext uri="{909E8E84-426E-40DD-AFC4-6F175D3DCCD1}">
-              <a14:hiddenFill xmlns:a14="http://schemas.microsoft.com/office/drawing/2010/main" xmlns="">
+              <a14:hiddenFill xmlns="" xmlns:a14="http://schemas.microsoft.com/office/drawing/2010/main">
                 <a:solidFill>
                   <a:srgbClr val="FFFFFF"/>
                 </a:solidFill>
               </a14:hiddenFill>
             </a:ext>
             <a:ext uri="{91240B29-F687-4F45-9708-019B960494DF}">
-              <a14:hiddenLine xmlns:a14="http://schemas.microsoft.com/office/drawing/2010/main" xmlns="" w="12700">
+              <a14:hiddenLine xmlns="" xmlns:a14="http://schemas.microsoft.com/office/drawing/2010/main" w="12700">
                 <a:solidFill>
                   <a:srgbClr val="000000"/>
                 </a:solidFill>
@@ -12816,7 +12951,7 @@
           <p:cNvPr id="29" name="Text Box 27">
             <a:extLst>
               <a:ext uri="{FF2B5EF4-FFF2-40B4-BE49-F238E27FC236}">
-                <a16:creationId xmlns:a16="http://schemas.microsoft.com/office/drawing/2014/main" xmlns="" id="{D563EFBA-F5A1-423B-86FE-C86752765CAE}"/>
+                <a16:creationId xmlns="" xmlns:a16="http://schemas.microsoft.com/office/drawing/2014/main" id="{D563EFBA-F5A1-423B-86FE-C86752765CAE}"/>
               </a:ext>
             </a:extLst>
           </p:cNvPr>
@@ -12839,14 +12974,14 @@
           </a:ln>
           <a:extLst>
             <a:ext uri="{909E8E84-426E-40DD-AFC4-6F175D3DCCD1}">
-              <a14:hiddenFill xmlns:a14="http://schemas.microsoft.com/office/drawing/2010/main" xmlns="">
+              <a14:hiddenFill xmlns="" xmlns:a14="http://schemas.microsoft.com/office/drawing/2010/main">
                 <a:solidFill>
                   <a:srgbClr val="FFFFFF"/>
                 </a:solidFill>
               </a14:hiddenFill>
             </a:ext>
             <a:ext uri="{91240B29-F687-4F45-9708-019B960494DF}">
-              <a14:hiddenLine xmlns:a14="http://schemas.microsoft.com/office/drawing/2010/main" xmlns="" w="12700">
+              <a14:hiddenLine xmlns="" xmlns:a14="http://schemas.microsoft.com/office/drawing/2010/main" w="12700">
                 <a:solidFill>
                   <a:srgbClr val="000000"/>
                 </a:solidFill>
@@ -12992,7 +13127,7 @@
           <p:cNvPr id="30" name="Text Box 28">
             <a:extLst>
               <a:ext uri="{FF2B5EF4-FFF2-40B4-BE49-F238E27FC236}">
-                <a16:creationId xmlns:a16="http://schemas.microsoft.com/office/drawing/2014/main" xmlns="" id="{6F99472F-B517-48F8-BF77-810A1400E7B2}"/>
+                <a16:creationId xmlns="" xmlns:a16="http://schemas.microsoft.com/office/drawing/2014/main" id="{6F99472F-B517-48F8-BF77-810A1400E7B2}"/>
               </a:ext>
             </a:extLst>
           </p:cNvPr>
@@ -13015,14 +13150,14 @@
           </a:ln>
           <a:extLst>
             <a:ext uri="{909E8E84-426E-40DD-AFC4-6F175D3DCCD1}">
-              <a14:hiddenFill xmlns:a14="http://schemas.microsoft.com/office/drawing/2010/main" xmlns="">
+              <a14:hiddenFill xmlns="" xmlns:a14="http://schemas.microsoft.com/office/drawing/2010/main">
                 <a:solidFill>
                   <a:srgbClr val="FFFFFF"/>
                 </a:solidFill>
               </a14:hiddenFill>
             </a:ext>
             <a:ext uri="{91240B29-F687-4F45-9708-019B960494DF}">
-              <a14:hiddenLine xmlns:a14="http://schemas.microsoft.com/office/drawing/2010/main" xmlns="" w="12700">
+              <a14:hiddenLine xmlns="" xmlns:a14="http://schemas.microsoft.com/office/drawing/2010/main" w="12700">
                 <a:solidFill>
                   <a:srgbClr val="000000"/>
                 </a:solidFill>
@@ -13168,7 +13303,7 @@
           <p:cNvPr id="31" name="Picture 29">
             <a:extLst>
               <a:ext uri="{FF2B5EF4-FFF2-40B4-BE49-F238E27FC236}">
-                <a16:creationId xmlns:a16="http://schemas.microsoft.com/office/drawing/2014/main" xmlns="" id="{C4402147-693D-4180-9A64-D9E6D5B34475}"/>
+                <a16:creationId xmlns="" xmlns:a16="http://schemas.microsoft.com/office/drawing/2014/main" id="{C4402147-693D-4180-9A64-D9E6D5B34475}"/>
               </a:ext>
             </a:extLst>
           </p:cNvPr>
@@ -13181,7 +13316,7 @@
           <a:blip r:embed="rId7">
             <a:extLst>
               <a:ext uri="{28A0092B-C50C-407E-A947-70E740481C1C}">
-                <a14:useLocalDpi xmlns:a14="http://schemas.microsoft.com/office/drawing/2010/main" xmlns="" val="0"/>
+                <a14:useLocalDpi xmlns="" xmlns:a14="http://schemas.microsoft.com/office/drawing/2010/main" val="0"/>
               </a:ext>
             </a:extLst>
           </a:blip>
@@ -13204,14 +13339,14 @@
           </a:ln>
           <a:extLst>
             <a:ext uri="{909E8E84-426E-40DD-AFC4-6F175D3DCCD1}">
-              <a14:hiddenFill xmlns:a14="http://schemas.microsoft.com/office/drawing/2010/main" xmlns="">
+              <a14:hiddenFill xmlns="" xmlns:a14="http://schemas.microsoft.com/office/drawing/2010/main">
                 <a:solidFill>
                   <a:srgbClr val="FFFFFF"/>
                 </a:solidFill>
               </a14:hiddenFill>
             </a:ext>
             <a:ext uri="{91240B29-F687-4F45-9708-019B960494DF}">
-              <a14:hiddenLine xmlns:a14="http://schemas.microsoft.com/office/drawing/2010/main" xmlns="" w="12700">
+              <a14:hiddenLine xmlns="" xmlns:a14="http://schemas.microsoft.com/office/drawing/2010/main" w="12700">
                 <a:solidFill>
                   <a:srgbClr val="000000"/>
                 </a:solidFill>
@@ -13226,7 +13361,7 @@
     </p:spTree>
     <p:extLst>
       <p:ext uri="{BB962C8B-B14F-4D97-AF65-F5344CB8AC3E}">
-        <p14:creationId xmlns:p14="http://schemas.microsoft.com/office/powerpoint/2010/main" xmlns="" val="668752758"/>
+        <p14:creationId xmlns="" xmlns:p14="http://schemas.microsoft.com/office/powerpoint/2010/main" val="668752758"/>
       </p:ext>
     </p:extLst>
   </p:cSld>
@@ -14168,7 +14303,7 @@
     </p:spTree>
     <p:extLst>
       <p:ext uri="{BB962C8B-B14F-4D97-AF65-F5344CB8AC3E}">
-        <p14:creationId xmlns:p14="http://schemas.microsoft.com/office/powerpoint/2010/main" xmlns="" val="132232297"/>
+        <p14:creationId xmlns="" xmlns:p14="http://schemas.microsoft.com/office/powerpoint/2010/main" val="132232297"/>
       </p:ext>
     </p:extLst>
   </p:cSld>
@@ -15320,7 +15455,7 @@
           <p:cNvPr id="7" name="Content Placeholder 2">
             <a:extLst>
               <a:ext uri="{FF2B5EF4-FFF2-40B4-BE49-F238E27FC236}">
-                <a16:creationId xmlns:a16="http://schemas.microsoft.com/office/drawing/2014/main" xmlns="" id="{2A634A49-03AC-4A5B-B518-E76A1840FE84}"/>
+                <a16:creationId xmlns="" xmlns:a16="http://schemas.microsoft.com/office/drawing/2014/main" id="{2A634A49-03AC-4A5B-B518-E76A1840FE84}"/>
               </a:ext>
             </a:extLst>
           </p:cNvPr>
@@ -15886,7 +16021,7 @@
     </p:spTree>
     <p:extLst>
       <p:ext uri="{BB962C8B-B14F-4D97-AF65-F5344CB8AC3E}">
-        <p14:creationId xmlns:p14="http://schemas.microsoft.com/office/powerpoint/2010/main" xmlns="" val="2778576912"/>
+        <p14:creationId xmlns="" xmlns:p14="http://schemas.microsoft.com/office/powerpoint/2010/main" val="2778576912"/>
       </p:ext>
     </p:extLst>
   </p:cSld>
@@ -17143,7 +17278,7 @@
           <p:cNvPr id="7" name="Content Placeholder 2">
             <a:extLst>
               <a:ext uri="{FF2B5EF4-FFF2-40B4-BE49-F238E27FC236}">
-                <a16:creationId xmlns:a16="http://schemas.microsoft.com/office/drawing/2014/main" xmlns="" id="{2A634A49-03AC-4A5B-B518-E76A1840FE84}"/>
+                <a16:creationId xmlns="" xmlns:a16="http://schemas.microsoft.com/office/drawing/2014/main" id="{2A634A49-03AC-4A5B-B518-E76A1840FE84}"/>
               </a:ext>
             </a:extLst>
           </p:cNvPr>
@@ -18284,7 +18419,7 @@
     </p:spTree>
     <p:extLst>
       <p:ext uri="{BB962C8B-B14F-4D97-AF65-F5344CB8AC3E}">
-        <p14:creationId xmlns:p14="http://schemas.microsoft.com/office/powerpoint/2010/main" xmlns="" val="1510885566"/>
+        <p14:creationId xmlns="" xmlns:p14="http://schemas.microsoft.com/office/powerpoint/2010/main" val="1510885566"/>
       </p:ext>
     </p:extLst>
   </p:cSld>
@@ -18852,10 +18987,10 @@
                 <a:ea typeface="ＭＳ Ｐゴシック" panose="020B0600070205080204" pitchFamily="34" charset="-128"/>
                 <a:cs typeface="+mn-cs"/>
               </a:rPr>
-              <a:t>	Prof p = new Prof("</a:t>
-            </a:r>
-            <a:r>
-              <a:rPr kumimoji="0" lang="en-US" altLang="en-US" sz="1600" b="1" i="0" u="none" strike="noStrike" kern="0" cap="none" spc="0" normalizeH="0" baseline="0" noProof="0" dirty="0" err="1">
+              <a:t>	Prof p = new Prof</a:t>
+            </a:r>
+            <a:r>
+              <a:rPr kumimoji="0" lang="en-US" altLang="en-US" sz="1600" b="1" i="0" u="none" strike="noStrike" kern="0" cap="none" spc="0" normalizeH="0" baseline="0" noProof="0" dirty="0" smtClean="0">
                 <a:ln>
                   <a:noFill/>
                 </a:ln>
@@ -18869,25 +19004,22 @@
                 <a:ea typeface="ＭＳ Ｐゴシック" panose="020B0600070205080204" pitchFamily="34" charset="-128"/>
                 <a:cs typeface="+mn-cs"/>
               </a:rPr>
-              <a:t>DZimitri</a:t>
-            </a:r>
-            <a:r>
-              <a:rPr kumimoji="0" lang="en-US" altLang="en-US" sz="1600" b="1" i="0" u="none" strike="noStrike" kern="0" cap="none" spc="0" normalizeH="0" baseline="0" noProof="0" dirty="0">
-                <a:ln>
-                  <a:noFill/>
-                </a:ln>
-                <a:solidFill>
-                  <a:srgbClr val="02030E"/>
-                </a:solidFill>
-                <a:effectLst/>
-                <a:uLnTx/>
-                <a:uFillTx/>
-                <a:latin typeface="Optimum"/>
-                <a:ea typeface="ＭＳ Ｐゴシック" panose="020B0600070205080204" pitchFamily="34" charset="-128"/>
-                <a:cs typeface="+mn-cs"/>
-              </a:rPr>
-              <a:t>");</a:t>
-            </a:r>
+              <a:t>(“GM");</a:t>
+            </a:r>
+            <a:endParaRPr kumimoji="0" lang="en-US" altLang="en-US" sz="1600" b="1" i="0" u="none" strike="noStrike" kern="0" cap="none" spc="0" normalizeH="0" baseline="0" noProof="0" dirty="0">
+              <a:ln>
+                <a:noFill/>
+              </a:ln>
+              <a:solidFill>
+                <a:srgbClr val="02030E"/>
+              </a:solidFill>
+              <a:effectLst/>
+              <a:uLnTx/>
+              <a:uFillTx/>
+              <a:latin typeface="Optimum"/>
+              <a:ea typeface="ＭＳ Ｐゴシック" panose="020B0600070205080204" pitchFamily="34" charset="-128"/>
+              <a:cs typeface="+mn-cs"/>
+            </a:endParaRPr>
           </a:p>
           <a:p>
             <a:pPr marL="285750" marR="0" lvl="0" indent="-285750" algn="l" defTabSz="914400" rtl="0" eaLnBrk="0" fontAlgn="base" latinLnBrk="0" hangingPunct="0">
@@ -19306,7 +19438,7 @@
           <p:cNvPr id="7" name="Content Placeholder 2">
             <a:extLst>
               <a:ext uri="{FF2B5EF4-FFF2-40B4-BE49-F238E27FC236}">
-                <a16:creationId xmlns:a16="http://schemas.microsoft.com/office/drawing/2014/main" xmlns="" id="{2A634A49-03AC-4A5B-B518-E76A1840FE84}"/>
+                <a16:creationId xmlns="" xmlns:a16="http://schemas.microsoft.com/office/drawing/2014/main" id="{2A634A49-03AC-4A5B-B518-E76A1840FE84}"/>
               </a:ext>
             </a:extLst>
           </p:cNvPr>
@@ -20027,7 +20159,7 @@
     </p:spTree>
     <p:extLst>
       <p:ext uri="{BB962C8B-B14F-4D97-AF65-F5344CB8AC3E}">
-        <p14:creationId xmlns:p14="http://schemas.microsoft.com/office/powerpoint/2010/main" xmlns="" val="2023073094"/>
+        <p14:creationId xmlns="" xmlns:p14="http://schemas.microsoft.com/office/powerpoint/2010/main" val="2023073094"/>
       </p:ext>
     </p:extLst>
   </p:cSld>
@@ -20295,7 +20427,7 @@
               <a:t>the </a:t>
             </a:r>
             <a:r>
-              <a:rPr kumimoji="0" lang="en-US" altLang="en-US" sz="2400" b="1" i="0" u="none" strike="noStrike" kern="0" cap="none" spc="0" normalizeH="0" baseline="0" noProof="0" dirty="0" err="1">
+              <a:rPr kumimoji="0" lang="en-US" altLang="en-US" sz="2400" b="1" i="0" u="none" strike="noStrike" kern="0" cap="none" spc="0" normalizeH="0" baseline="0" noProof="0" dirty="0" err="1" smtClean="0">
                 <a:ln>
                   <a:noFill/>
                 </a:ln>
@@ -20309,7 +20441,41 @@
                 <a:ea typeface="ＭＳ Ｐゴシック" panose="020B0600070205080204" pitchFamily="34" charset="-128"/>
                 <a:cs typeface="+mn-cs"/>
               </a:rPr>
-              <a:t>ConcreteObserver</a:t>
+              <a:t>ConcreteObservable</a:t>
+            </a:r>
+            <a:r>
+              <a:rPr kumimoji="0" lang="en-US" altLang="en-US" sz="2400" b="1" i="0" u="none" strike="noStrike" kern="0" cap="none" spc="0" normalizeH="0" baseline="0" noProof="0" dirty="0" smtClean="0">
+                <a:ln>
+                  <a:noFill/>
+                </a:ln>
+                <a:solidFill>
+                  <a:srgbClr val="02030E"/>
+                </a:solidFill>
+                <a:effectLst/>
+                <a:uLnTx/>
+                <a:uFillTx/>
+                <a:latin typeface="Optimum"/>
+                <a:ea typeface="ＭＳ Ｐゴシック" panose="020B0600070205080204" pitchFamily="34" charset="-128"/>
+                <a:cs typeface="+mn-cs"/>
+              </a:rPr>
+              <a:t> </a:t>
+            </a:r>
+            <a:r>
+              <a:rPr kumimoji="0" lang="en-US" altLang="en-US" sz="2400" b="1" i="1" u="none" strike="noStrike" kern="0" cap="none" spc="0" normalizeH="0" baseline="0" noProof="0" dirty="0">
+                <a:ln>
+                  <a:noFill/>
+                </a:ln>
+                <a:solidFill>
+                  <a:srgbClr val="02030E"/>
+                </a:solidFill>
+                <a:effectLst/>
+                <a:uLnTx/>
+                <a:uFillTx/>
+                <a:latin typeface="Optimum"/>
+                <a:ea typeface="ＭＳ Ｐゴシック" panose="020B0600070205080204" pitchFamily="34" charset="-128"/>
+                <a:cs typeface="+mn-cs"/>
+              </a:rPr>
+              <a:t>has to</a:t>
             </a:r>
             <a:r>
               <a:rPr kumimoji="0" lang="en-US" altLang="en-US" sz="2400" b="1" i="0" u="none" strike="noStrike" kern="0" cap="none" spc="0" normalizeH="0" baseline="0" noProof="0" dirty="0">
@@ -20326,10 +20492,10 @@
                 <a:ea typeface="ＭＳ Ｐゴシック" panose="020B0600070205080204" pitchFamily="34" charset="-128"/>
                 <a:cs typeface="+mn-cs"/>
               </a:rPr>
-              <a:t> </a:t>
-            </a:r>
-            <a:r>
-              <a:rPr kumimoji="0" lang="en-US" altLang="en-US" sz="2400" b="1" i="1" u="none" strike="noStrike" kern="0" cap="none" spc="0" normalizeH="0" baseline="0" noProof="0" dirty="0">
+              <a:t> extend </a:t>
+            </a:r>
+            <a:r>
+              <a:rPr kumimoji="0" lang="en-US" altLang="en-US" sz="2400" b="1" i="0" u="none" strike="noStrike" kern="0" cap="none" spc="0" normalizeH="0" baseline="0" noProof="0">
                 <a:ln>
                   <a:noFill/>
                 </a:ln>
@@ -20343,7 +20509,24 @@
                 <a:ea typeface="ＭＳ Ｐゴシック" panose="020B0600070205080204" pitchFamily="34" charset="-128"/>
                 <a:cs typeface="+mn-cs"/>
               </a:rPr>
-              <a:t>has to</a:t>
+              <a:t>the </a:t>
+            </a:r>
+            <a:r>
+              <a:rPr kumimoji="0" lang="en-US" altLang="en-US" sz="2400" b="1" i="0" u="none" strike="noStrike" kern="0" cap="none" spc="0" normalizeH="0" baseline="0" noProof="0" smtClean="0">
+                <a:ln>
+                  <a:noFill/>
+                </a:ln>
+                <a:solidFill>
+                  <a:srgbClr val="02030E"/>
+                </a:solidFill>
+                <a:effectLst/>
+                <a:uLnTx/>
+                <a:uFillTx/>
+                <a:latin typeface="Optimum"/>
+                <a:ea typeface="ＭＳ Ｐゴシック" panose="020B0600070205080204" pitchFamily="34" charset="-128"/>
+                <a:cs typeface="+mn-cs"/>
+              </a:rPr>
+              <a:t>Observable: </a:t>
             </a:r>
             <a:r>
               <a:rPr kumimoji="0" lang="en-US" altLang="en-US" sz="2400" b="1" i="0" u="none" strike="noStrike" kern="0" cap="none" spc="0" normalizeH="0" baseline="0" noProof="0" dirty="0">
@@ -20360,7 +20543,7 @@
                 <a:ea typeface="ＭＳ Ｐゴシック" panose="020B0600070205080204" pitchFamily="34" charset="-128"/>
                 <a:cs typeface="+mn-cs"/>
               </a:rPr>
-              <a:t> extend the Observer: but what if we want to subclass something else?</a:t>
+              <a:t>but what if we want to subclass something else?</a:t>
             </a:r>
           </a:p>
           <a:p>
@@ -20520,7 +20703,7 @@
     </p:spTree>
     <p:extLst>
       <p:ext uri="{BB962C8B-B14F-4D97-AF65-F5344CB8AC3E}">
-        <p14:creationId xmlns:p14="http://schemas.microsoft.com/office/powerpoint/2010/main" xmlns="" val="3963229193"/>
+        <p14:creationId xmlns="" xmlns:p14="http://schemas.microsoft.com/office/powerpoint/2010/main" val="3963229193"/>
       </p:ext>
     </p:extLst>
   </p:cSld>
@@ -21029,7 +21212,7 @@
     </p:spTree>
     <p:extLst>
       <p:ext uri="{BB962C8B-B14F-4D97-AF65-F5344CB8AC3E}">
-        <p14:creationId xmlns:p14="http://schemas.microsoft.com/office/powerpoint/2010/main" xmlns="" val="127963713"/>
+        <p14:creationId xmlns="" xmlns:p14="http://schemas.microsoft.com/office/powerpoint/2010/main" val="127963713"/>
       </p:ext>
     </p:extLst>
   </p:cSld>
@@ -21164,7 +21347,7 @@
           <p:cNvPr id="7" name="Picture 4">
             <a:extLst>
               <a:ext uri="{FF2B5EF4-FFF2-40B4-BE49-F238E27FC236}">
-                <a16:creationId xmlns:a16="http://schemas.microsoft.com/office/drawing/2014/main" xmlns="" id="{B5657A0B-BD91-4E9C-8311-4ED2AB6FF9B9}"/>
+                <a16:creationId xmlns="" xmlns:a16="http://schemas.microsoft.com/office/drawing/2014/main" id="{B5657A0B-BD91-4E9C-8311-4ED2AB6FF9B9}"/>
               </a:ext>
             </a:extLst>
           </p:cNvPr>
@@ -21177,7 +21360,7 @@
           <a:blip r:embed="rId2">
             <a:extLst>
               <a:ext uri="{28A0092B-C50C-407E-A947-70E740481C1C}">
-                <a14:useLocalDpi xmlns:a14="http://schemas.microsoft.com/office/drawing/2010/main" xmlns="" val="0"/>
+                <a14:useLocalDpi xmlns="" xmlns:a14="http://schemas.microsoft.com/office/drawing/2010/main" val="0"/>
               </a:ext>
             </a:extLst>
           </a:blip>
@@ -21200,14 +21383,14 @@
           </a:ln>
           <a:extLst>
             <a:ext uri="{909E8E84-426E-40DD-AFC4-6F175D3DCCD1}">
-              <a14:hiddenFill xmlns:a14="http://schemas.microsoft.com/office/drawing/2010/main" xmlns="">
+              <a14:hiddenFill xmlns="" xmlns:a14="http://schemas.microsoft.com/office/drawing/2010/main">
                 <a:solidFill>
                   <a:srgbClr val="FFFFFF"/>
                 </a:solidFill>
               </a14:hiddenFill>
             </a:ext>
             <a:ext uri="{91240B29-F687-4F45-9708-019B960494DF}">
-              <a14:hiddenLine xmlns:a14="http://schemas.microsoft.com/office/drawing/2010/main" xmlns="" w="12700">
+              <a14:hiddenLine xmlns="" xmlns:a14="http://schemas.microsoft.com/office/drawing/2010/main" w="12700">
                 <a:solidFill>
                   <a:srgbClr val="000000"/>
                 </a:solidFill>
@@ -21222,7 +21405,7 @@
     </p:spTree>
     <p:extLst>
       <p:ext uri="{BB962C8B-B14F-4D97-AF65-F5344CB8AC3E}">
-        <p14:creationId xmlns:p14="http://schemas.microsoft.com/office/powerpoint/2010/main" xmlns="" val="2986053279"/>
+        <p14:creationId xmlns="" xmlns:p14="http://schemas.microsoft.com/office/powerpoint/2010/main" val="2986053279"/>
       </p:ext>
     </p:extLst>
   </p:cSld>
@@ -21591,7 +21774,7 @@
     </p:spTree>
     <p:extLst>
       <p:ext uri="{BB962C8B-B14F-4D97-AF65-F5344CB8AC3E}">
-        <p14:creationId xmlns:p14="http://schemas.microsoft.com/office/powerpoint/2010/main" xmlns="" val="1140825873"/>
+        <p14:creationId xmlns="" xmlns:p14="http://schemas.microsoft.com/office/powerpoint/2010/main" val="1140825873"/>
       </p:ext>
     </p:extLst>
   </p:cSld>
@@ -22011,7 +22194,7 @@
     </p:spTree>
     <p:extLst>
       <p:ext uri="{BB962C8B-B14F-4D97-AF65-F5344CB8AC3E}">
-        <p14:creationId xmlns:p14="http://schemas.microsoft.com/office/powerpoint/2010/main" xmlns="" val="951659939"/>
+        <p14:creationId xmlns="" xmlns:p14="http://schemas.microsoft.com/office/powerpoint/2010/main" val="951659939"/>
       </p:ext>
     </p:extLst>
   </p:cSld>
@@ -22714,7 +22897,7 @@
     </p:spTree>
     <p:extLst>
       <p:ext uri="{BB962C8B-B14F-4D97-AF65-F5344CB8AC3E}">
-        <p14:creationId xmlns:p14="http://schemas.microsoft.com/office/powerpoint/2010/main" xmlns="" val="1435777542"/>
+        <p14:creationId xmlns="" xmlns:p14="http://schemas.microsoft.com/office/powerpoint/2010/main" val="1435777542"/>
       </p:ext>
     </p:extLst>
   </p:cSld>
@@ -23118,7 +23301,7 @@
     </p:spTree>
     <p:extLst>
       <p:ext uri="{BB962C8B-B14F-4D97-AF65-F5344CB8AC3E}">
-        <p14:creationId xmlns:p14="http://schemas.microsoft.com/office/powerpoint/2010/main" xmlns="" val="997206608"/>
+        <p14:creationId xmlns="" xmlns:p14="http://schemas.microsoft.com/office/powerpoint/2010/main" val="997206608"/>
       </p:ext>
     </p:extLst>
   </p:cSld>
@@ -23256,7 +23439,7 @@
           <p:cNvPr id="7" name="Group 3">
             <a:extLst>
               <a:ext uri="{FF2B5EF4-FFF2-40B4-BE49-F238E27FC236}">
-                <a16:creationId xmlns:a16="http://schemas.microsoft.com/office/drawing/2014/main" xmlns="" id="{F63981DA-B0FD-4D16-AEC7-26AE78C90425}"/>
+                <a16:creationId xmlns="" xmlns:a16="http://schemas.microsoft.com/office/drawing/2014/main" id="{F63981DA-B0FD-4D16-AEC7-26AE78C90425}"/>
               </a:ext>
             </a:extLst>
           </p:cNvPr>
@@ -23278,7 +23461,7 @@
             <p:cNvPr id="8" name="Rectangle 4">
               <a:extLst>
                 <a:ext uri="{FF2B5EF4-FFF2-40B4-BE49-F238E27FC236}">
-                  <a16:creationId xmlns:a16="http://schemas.microsoft.com/office/drawing/2014/main" xmlns="" id="{58629EBC-8A52-4C5B-AFDD-F80ACA18CA32}"/>
+                  <a16:creationId xmlns="" xmlns:a16="http://schemas.microsoft.com/office/drawing/2014/main" id="{58629EBC-8A52-4C5B-AFDD-F80ACA18CA32}"/>
                 </a:ext>
               </a:extLst>
             </p:cNvPr>
@@ -23303,7 +23486,7 @@
             </a:ln>
             <a:extLst>
               <a:ext uri="{91240B29-F687-4F45-9708-019B960494DF}">
-                <a14:hiddenLine xmlns:a14="http://schemas.microsoft.com/office/drawing/2010/main" xmlns="" w="9525">
+                <a14:hiddenLine xmlns="" xmlns:a14="http://schemas.microsoft.com/office/drawing/2010/main" w="9525">
                   <a:solidFill>
                     <a:srgbClr val="000000"/>
                   </a:solidFill>
@@ -23433,7 +23616,7 @@
             <p:cNvPr id="9" name="Rectangle 5">
               <a:extLst>
                 <a:ext uri="{FF2B5EF4-FFF2-40B4-BE49-F238E27FC236}">
-                  <a16:creationId xmlns:a16="http://schemas.microsoft.com/office/drawing/2014/main" xmlns="" id="{F8C203E3-0C2B-4383-9B2C-C69C08F43C46}"/>
+                  <a16:creationId xmlns="" xmlns:a16="http://schemas.microsoft.com/office/drawing/2014/main" id="{F8C203E3-0C2B-4383-9B2C-C69C08F43C46}"/>
                 </a:ext>
               </a:extLst>
             </p:cNvPr>
@@ -23458,7 +23641,7 @@
             </a:ln>
             <a:extLst>
               <a:ext uri="{91240B29-F687-4F45-9708-019B960494DF}">
-                <a14:hiddenLine xmlns:a14="http://schemas.microsoft.com/office/drawing/2010/main" xmlns="" w="9525">
+                <a14:hiddenLine xmlns="" xmlns:a14="http://schemas.microsoft.com/office/drawing/2010/main" w="9525">
                   <a:solidFill>
                     <a:srgbClr val="000000"/>
                   </a:solidFill>
@@ -23588,7 +23771,7 @@
             <p:cNvPr id="11" name="Rectangle 6">
               <a:extLst>
                 <a:ext uri="{FF2B5EF4-FFF2-40B4-BE49-F238E27FC236}">
-                  <a16:creationId xmlns:a16="http://schemas.microsoft.com/office/drawing/2014/main" xmlns="" id="{D4183463-C4A9-41DB-93F2-49023D9A8C52}"/>
+                  <a16:creationId xmlns="" xmlns:a16="http://schemas.microsoft.com/office/drawing/2014/main" id="{D4183463-C4A9-41DB-93F2-49023D9A8C52}"/>
                 </a:ext>
               </a:extLst>
             </p:cNvPr>
@@ -23613,7 +23796,7 @@
             </a:ln>
             <a:extLst>
               <a:ext uri="{91240B29-F687-4F45-9708-019B960494DF}">
-                <a14:hiddenLine xmlns:a14="http://schemas.microsoft.com/office/drawing/2010/main" xmlns="" w="9525">
+                <a14:hiddenLine xmlns="" xmlns:a14="http://schemas.microsoft.com/office/drawing/2010/main" w="9525">
                   <a:solidFill>
                     <a:srgbClr val="000000"/>
                   </a:solidFill>
@@ -23743,7 +23926,7 @@
             <p:cNvPr id="13" name="Rectangle 7">
               <a:extLst>
                 <a:ext uri="{FF2B5EF4-FFF2-40B4-BE49-F238E27FC236}">
-                  <a16:creationId xmlns:a16="http://schemas.microsoft.com/office/drawing/2014/main" xmlns="" id="{6A0160FF-2351-4434-A32F-A319554EA4B0}"/>
+                  <a16:creationId xmlns="" xmlns:a16="http://schemas.microsoft.com/office/drawing/2014/main" id="{6A0160FF-2351-4434-A32F-A319554EA4B0}"/>
                 </a:ext>
               </a:extLst>
             </p:cNvPr>
@@ -23768,7 +23951,7 @@
             </a:ln>
             <a:extLst>
               <a:ext uri="{91240B29-F687-4F45-9708-019B960494DF}">
-                <a14:hiddenLine xmlns:a14="http://schemas.microsoft.com/office/drawing/2010/main" xmlns="" w="9525">
+                <a14:hiddenLine xmlns="" xmlns:a14="http://schemas.microsoft.com/office/drawing/2010/main" w="9525">
                   <a:solidFill>
                     <a:srgbClr val="000000"/>
                   </a:solidFill>
@@ -23898,7 +24081,7 @@
             <p:cNvPr id="14" name="Freeform 8">
               <a:extLst>
                 <a:ext uri="{FF2B5EF4-FFF2-40B4-BE49-F238E27FC236}">
-                  <a16:creationId xmlns:a16="http://schemas.microsoft.com/office/drawing/2014/main" xmlns="" id="{67F3F5EB-624E-47FB-975D-273A13702156}"/>
+                  <a16:creationId xmlns="" xmlns:a16="http://schemas.microsoft.com/office/drawing/2014/main" id="{67F3F5EB-624E-47FB-975D-273A13702156}"/>
                 </a:ext>
               </a:extLst>
             </p:cNvPr>
@@ -23991,7 +24174,7 @@
             </a:ln>
             <a:extLst>
               <a:ext uri="{909E8E84-426E-40DD-AFC4-6F175D3DCCD1}">
-                <a14:hiddenFill xmlns:a14="http://schemas.microsoft.com/office/drawing/2010/main" xmlns="">
+                <a14:hiddenFill xmlns="" xmlns:a14="http://schemas.microsoft.com/office/drawing/2010/main">
                   <a:solidFill>
                     <a:srgbClr val="FFFFFF"/>
                   </a:solidFill>
@@ -24118,7 +24301,7 @@
             <p:cNvPr id="15" name="Line 9">
               <a:extLst>
                 <a:ext uri="{FF2B5EF4-FFF2-40B4-BE49-F238E27FC236}">
-                  <a16:creationId xmlns:a16="http://schemas.microsoft.com/office/drawing/2014/main" xmlns="" id="{698913D4-B4CD-4D99-8BD8-8B262DB221CD}"/>
+                  <a16:creationId xmlns="" xmlns:a16="http://schemas.microsoft.com/office/drawing/2014/main" id="{698913D4-B4CD-4D99-8BD8-8B262DB221CD}"/>
                 </a:ext>
               </a:extLst>
             </p:cNvPr>
@@ -24146,7 +24329,7 @@
             </a:ln>
             <a:extLst>
               <a:ext uri="{909E8E84-426E-40DD-AFC4-6F175D3DCCD1}">
-                <a14:hiddenFill xmlns:a14="http://schemas.microsoft.com/office/drawing/2010/main" xmlns="">
+                <a14:hiddenFill xmlns="" xmlns:a14="http://schemas.microsoft.com/office/drawing/2010/main">
                   <a:noFill/>
                 </a14:hiddenFill>
               </a:ext>
@@ -24165,7 +24348,7 @@
             <p:cNvPr id="16" name="Line 10">
               <a:extLst>
                 <a:ext uri="{FF2B5EF4-FFF2-40B4-BE49-F238E27FC236}">
-                  <a16:creationId xmlns:a16="http://schemas.microsoft.com/office/drawing/2014/main" xmlns="" id="{C96C1CE3-7C2F-41D5-9130-541A41985A0E}"/>
+                  <a16:creationId xmlns="" xmlns:a16="http://schemas.microsoft.com/office/drawing/2014/main" id="{C96C1CE3-7C2F-41D5-9130-541A41985A0E}"/>
                 </a:ext>
               </a:extLst>
             </p:cNvPr>
@@ -24193,7 +24376,7 @@
             </a:ln>
             <a:extLst>
               <a:ext uri="{909E8E84-426E-40DD-AFC4-6F175D3DCCD1}">
-                <a14:hiddenFill xmlns:a14="http://schemas.microsoft.com/office/drawing/2010/main" xmlns="">
+                <a14:hiddenFill xmlns="" xmlns:a14="http://schemas.microsoft.com/office/drawing/2010/main">
                   <a:noFill/>
                 </a14:hiddenFill>
               </a:ext>
@@ -24212,7 +24395,7 @@
             <p:cNvPr id="17" name="Rectangle 11">
               <a:extLst>
                 <a:ext uri="{FF2B5EF4-FFF2-40B4-BE49-F238E27FC236}">
-                  <a16:creationId xmlns:a16="http://schemas.microsoft.com/office/drawing/2014/main" xmlns="" id="{170CD915-2C1F-4417-9E8B-C14A4C9CD92E}"/>
+                  <a16:creationId xmlns="" xmlns:a16="http://schemas.microsoft.com/office/drawing/2014/main" id="{170CD915-2C1F-4417-9E8B-C14A4C9CD92E}"/>
                 </a:ext>
               </a:extLst>
             </p:cNvPr>
@@ -24237,7 +24420,7 @@
             </a:ln>
             <a:extLst>
               <a:ext uri="{91240B29-F687-4F45-9708-019B960494DF}">
-                <a14:hiddenLine xmlns:a14="http://schemas.microsoft.com/office/drawing/2010/main" xmlns="" w="9525">
+                <a14:hiddenLine xmlns="" xmlns:a14="http://schemas.microsoft.com/office/drawing/2010/main" w="9525">
                   <a:solidFill>
                     <a:srgbClr val="000000"/>
                   </a:solidFill>
@@ -24367,7 +24550,7 @@
             <p:cNvPr id="18" name="Picture 12">
               <a:extLst>
                 <a:ext uri="{FF2B5EF4-FFF2-40B4-BE49-F238E27FC236}">
-                  <a16:creationId xmlns:a16="http://schemas.microsoft.com/office/drawing/2014/main" xmlns="" id="{C58ABCB0-B54A-4FEF-A0F6-1313B495AD92}"/>
+                  <a16:creationId xmlns="" xmlns:a16="http://schemas.microsoft.com/office/drawing/2014/main" id="{C58ABCB0-B54A-4FEF-A0F6-1313B495AD92}"/>
                 </a:ext>
               </a:extLst>
             </p:cNvPr>
@@ -24390,14 +24573,14 @@
             </a:ln>
             <a:extLst>
               <a:ext uri="{909E8E84-426E-40DD-AFC4-6F175D3DCCD1}">
-                <a14:hiddenFill xmlns:a14="http://schemas.microsoft.com/office/drawing/2010/main" xmlns="">
+                <a14:hiddenFill xmlns="" xmlns:a14="http://schemas.microsoft.com/office/drawing/2010/main">
                   <a:solidFill>
                     <a:srgbClr val="FFFFFF"/>
                   </a:solidFill>
                 </a14:hiddenFill>
               </a:ext>
               <a:ext uri="{91240B29-F687-4F45-9708-019B960494DF}">
-                <a14:hiddenLine xmlns:a14="http://schemas.microsoft.com/office/drawing/2010/main" xmlns="" w="9525">
+                <a14:hiddenLine xmlns="" xmlns:a14="http://schemas.microsoft.com/office/drawing/2010/main" w="9525">
                   <a:solidFill>
                     <a:srgbClr val="000000"/>
                   </a:solidFill>
@@ -24421,7 +24604,7 @@
             <p:cNvPr id="19" name="Rectangle 13">
               <a:extLst>
                 <a:ext uri="{FF2B5EF4-FFF2-40B4-BE49-F238E27FC236}">
-                  <a16:creationId xmlns:a16="http://schemas.microsoft.com/office/drawing/2014/main" xmlns="" id="{B3376E65-EE43-4904-9294-22D353A53654}"/>
+                  <a16:creationId xmlns="" xmlns:a16="http://schemas.microsoft.com/office/drawing/2014/main" id="{B3376E65-EE43-4904-9294-22D353A53654}"/>
                 </a:ext>
               </a:extLst>
             </p:cNvPr>
@@ -24444,14 +24627,14 @@
             </a:ln>
             <a:extLst>
               <a:ext uri="{909E8E84-426E-40DD-AFC4-6F175D3DCCD1}">
-                <a14:hiddenFill xmlns:a14="http://schemas.microsoft.com/office/drawing/2010/main" xmlns="">
+                <a14:hiddenFill xmlns="" xmlns:a14="http://schemas.microsoft.com/office/drawing/2010/main">
                   <a:solidFill>
                     <a:srgbClr val="FFFFFF"/>
                   </a:solidFill>
                 </a14:hiddenFill>
               </a:ext>
               <a:ext uri="{91240B29-F687-4F45-9708-019B960494DF}">
-                <a14:hiddenLine xmlns:a14="http://schemas.microsoft.com/office/drawing/2010/main" xmlns="" w="9525">
+                <a14:hiddenLine xmlns="" xmlns:a14="http://schemas.microsoft.com/office/drawing/2010/main" w="9525">
                   <a:solidFill>
                     <a:srgbClr val="000000"/>
                   </a:solidFill>
@@ -24606,7 +24789,7 @@
             <p:cNvPr id="20" name="Rectangle 14">
               <a:extLst>
                 <a:ext uri="{FF2B5EF4-FFF2-40B4-BE49-F238E27FC236}">
-                  <a16:creationId xmlns:a16="http://schemas.microsoft.com/office/drawing/2014/main" xmlns="" id="{F67A6079-A70C-4B42-A8DF-845186F7B472}"/>
+                  <a16:creationId xmlns="" xmlns:a16="http://schemas.microsoft.com/office/drawing/2014/main" id="{F67A6079-A70C-4B42-A8DF-845186F7B472}"/>
                 </a:ext>
               </a:extLst>
             </p:cNvPr>
@@ -24631,7 +24814,7 @@
             </a:ln>
             <a:extLst>
               <a:ext uri="{91240B29-F687-4F45-9708-019B960494DF}">
-                <a14:hiddenLine xmlns:a14="http://schemas.microsoft.com/office/drawing/2010/main" xmlns="" w="9525">
+                <a14:hiddenLine xmlns="" xmlns:a14="http://schemas.microsoft.com/office/drawing/2010/main" w="9525">
                   <a:solidFill>
                     <a:srgbClr val="000000"/>
                   </a:solidFill>
@@ -24761,7 +24944,7 @@
             <p:cNvPr id="21" name="Picture 15">
               <a:extLst>
                 <a:ext uri="{FF2B5EF4-FFF2-40B4-BE49-F238E27FC236}">
-                  <a16:creationId xmlns:a16="http://schemas.microsoft.com/office/drawing/2014/main" xmlns="" id="{2DE769DC-A518-4CBA-B4BB-A320B53D758D}"/>
+                  <a16:creationId xmlns="" xmlns:a16="http://schemas.microsoft.com/office/drawing/2014/main" id="{2DE769DC-A518-4CBA-B4BB-A320B53D758D}"/>
                 </a:ext>
               </a:extLst>
             </p:cNvPr>
@@ -24784,14 +24967,14 @@
             </a:ln>
             <a:extLst>
               <a:ext uri="{909E8E84-426E-40DD-AFC4-6F175D3DCCD1}">
-                <a14:hiddenFill xmlns:a14="http://schemas.microsoft.com/office/drawing/2010/main" xmlns="">
+                <a14:hiddenFill xmlns="" xmlns:a14="http://schemas.microsoft.com/office/drawing/2010/main">
                   <a:solidFill>
                     <a:srgbClr val="FFFFFF"/>
                   </a:solidFill>
                 </a14:hiddenFill>
               </a:ext>
               <a:ext uri="{91240B29-F687-4F45-9708-019B960494DF}">
-                <a14:hiddenLine xmlns:a14="http://schemas.microsoft.com/office/drawing/2010/main" xmlns="" w="9525">
+                <a14:hiddenLine xmlns="" xmlns:a14="http://schemas.microsoft.com/office/drawing/2010/main" w="9525">
                   <a:solidFill>
                     <a:srgbClr val="000000"/>
                   </a:solidFill>
@@ -24815,7 +24998,7 @@
             <p:cNvPr id="22" name="Rectangle 16">
               <a:extLst>
                 <a:ext uri="{FF2B5EF4-FFF2-40B4-BE49-F238E27FC236}">
-                  <a16:creationId xmlns:a16="http://schemas.microsoft.com/office/drawing/2014/main" xmlns="" id="{D1E63BEB-12BC-49B1-A1BC-78A6E98526BF}"/>
+                  <a16:creationId xmlns="" xmlns:a16="http://schemas.microsoft.com/office/drawing/2014/main" id="{D1E63BEB-12BC-49B1-A1BC-78A6E98526BF}"/>
                 </a:ext>
               </a:extLst>
             </p:cNvPr>
@@ -24838,14 +25021,14 @@
             </a:ln>
             <a:extLst>
               <a:ext uri="{909E8E84-426E-40DD-AFC4-6F175D3DCCD1}">
-                <a14:hiddenFill xmlns:a14="http://schemas.microsoft.com/office/drawing/2010/main" xmlns="">
+                <a14:hiddenFill xmlns="" xmlns:a14="http://schemas.microsoft.com/office/drawing/2010/main">
                   <a:solidFill>
                     <a:srgbClr val="FFFFFF"/>
                   </a:solidFill>
                 </a14:hiddenFill>
               </a:ext>
               <a:ext uri="{91240B29-F687-4F45-9708-019B960494DF}">
-                <a14:hiddenLine xmlns:a14="http://schemas.microsoft.com/office/drawing/2010/main" xmlns="" w="9525">
+                <a14:hiddenLine xmlns="" xmlns:a14="http://schemas.microsoft.com/office/drawing/2010/main" w="9525">
                   <a:solidFill>
                     <a:srgbClr val="000000"/>
                   </a:solidFill>
@@ -25000,7 +25183,7 @@
             <p:cNvPr id="23" name="Rectangle 17">
               <a:extLst>
                 <a:ext uri="{FF2B5EF4-FFF2-40B4-BE49-F238E27FC236}">
-                  <a16:creationId xmlns:a16="http://schemas.microsoft.com/office/drawing/2014/main" xmlns="" id="{6CFA5C27-B41A-4E38-8217-66938CBE3A1C}"/>
+                  <a16:creationId xmlns="" xmlns:a16="http://schemas.microsoft.com/office/drawing/2014/main" id="{6CFA5C27-B41A-4E38-8217-66938CBE3A1C}"/>
                 </a:ext>
               </a:extLst>
             </p:cNvPr>
@@ -25025,7 +25208,7 @@
             </a:ln>
             <a:extLst>
               <a:ext uri="{91240B29-F687-4F45-9708-019B960494DF}">
-                <a14:hiddenLine xmlns:a14="http://schemas.microsoft.com/office/drawing/2010/main" xmlns="" w="9525">
+                <a14:hiddenLine xmlns="" xmlns:a14="http://schemas.microsoft.com/office/drawing/2010/main" w="9525">
                   <a:solidFill>
                     <a:srgbClr val="000000"/>
                   </a:solidFill>
@@ -25155,7 +25338,7 @@
             <p:cNvPr id="24" name="Picture 18">
               <a:extLst>
                 <a:ext uri="{FF2B5EF4-FFF2-40B4-BE49-F238E27FC236}">
-                  <a16:creationId xmlns:a16="http://schemas.microsoft.com/office/drawing/2014/main" xmlns="" id="{EA463BF3-1661-42D1-BD46-EF6503B45B01}"/>
+                  <a16:creationId xmlns="" xmlns:a16="http://schemas.microsoft.com/office/drawing/2014/main" id="{EA463BF3-1661-42D1-BD46-EF6503B45B01}"/>
                 </a:ext>
               </a:extLst>
             </p:cNvPr>
@@ -25178,14 +25361,14 @@
             </a:ln>
             <a:extLst>
               <a:ext uri="{909E8E84-426E-40DD-AFC4-6F175D3DCCD1}">
-                <a14:hiddenFill xmlns:a14="http://schemas.microsoft.com/office/drawing/2010/main" xmlns="">
+                <a14:hiddenFill xmlns="" xmlns:a14="http://schemas.microsoft.com/office/drawing/2010/main">
                   <a:solidFill>
                     <a:srgbClr val="FFFFFF"/>
                   </a:solidFill>
                 </a14:hiddenFill>
               </a:ext>
               <a:ext uri="{91240B29-F687-4F45-9708-019B960494DF}">
-                <a14:hiddenLine xmlns:a14="http://schemas.microsoft.com/office/drawing/2010/main" xmlns="" w="9525">
+                <a14:hiddenLine xmlns="" xmlns:a14="http://schemas.microsoft.com/office/drawing/2010/main" w="9525">
                   <a:solidFill>
                     <a:srgbClr val="000000"/>
                   </a:solidFill>
@@ -25209,7 +25392,7 @@
             <p:cNvPr id="25" name="Rectangle 19">
               <a:extLst>
                 <a:ext uri="{FF2B5EF4-FFF2-40B4-BE49-F238E27FC236}">
-                  <a16:creationId xmlns:a16="http://schemas.microsoft.com/office/drawing/2014/main" xmlns="" id="{11EF7D23-C970-4483-9701-A9A14D3F9D93}"/>
+                  <a16:creationId xmlns="" xmlns:a16="http://schemas.microsoft.com/office/drawing/2014/main" id="{11EF7D23-C970-4483-9701-A9A14D3F9D93}"/>
                 </a:ext>
               </a:extLst>
             </p:cNvPr>
@@ -25232,14 +25415,14 @@
             </a:ln>
             <a:extLst>
               <a:ext uri="{909E8E84-426E-40DD-AFC4-6F175D3DCCD1}">
-                <a14:hiddenFill xmlns:a14="http://schemas.microsoft.com/office/drawing/2010/main" xmlns="">
+                <a14:hiddenFill xmlns="" xmlns:a14="http://schemas.microsoft.com/office/drawing/2010/main">
                   <a:solidFill>
                     <a:srgbClr val="FFFFFF"/>
                   </a:solidFill>
                 </a14:hiddenFill>
               </a:ext>
               <a:ext uri="{91240B29-F687-4F45-9708-019B960494DF}">
-                <a14:hiddenLine xmlns:a14="http://schemas.microsoft.com/office/drawing/2010/main" xmlns="" w="9525">
+                <a14:hiddenLine xmlns="" xmlns:a14="http://schemas.microsoft.com/office/drawing/2010/main" w="9525">
                   <a:solidFill>
                     <a:srgbClr val="000000"/>
                   </a:solidFill>
@@ -25394,7 +25577,7 @@
             <p:cNvPr id="26" name="Picture 20">
               <a:extLst>
                 <a:ext uri="{FF2B5EF4-FFF2-40B4-BE49-F238E27FC236}">
-                  <a16:creationId xmlns:a16="http://schemas.microsoft.com/office/drawing/2014/main" xmlns="" id="{18E19E17-DBB0-492F-B980-595A8B2B3EBA}"/>
+                  <a16:creationId xmlns="" xmlns:a16="http://schemas.microsoft.com/office/drawing/2014/main" id="{18E19E17-DBB0-492F-B980-595A8B2B3EBA}"/>
                 </a:ext>
               </a:extLst>
             </p:cNvPr>
@@ -25417,14 +25600,14 @@
             </a:ln>
             <a:extLst>
               <a:ext uri="{909E8E84-426E-40DD-AFC4-6F175D3DCCD1}">
-                <a14:hiddenFill xmlns:a14="http://schemas.microsoft.com/office/drawing/2010/main" xmlns="">
+                <a14:hiddenFill xmlns="" xmlns:a14="http://schemas.microsoft.com/office/drawing/2010/main">
                   <a:solidFill>
                     <a:srgbClr val="FFFFFF"/>
                   </a:solidFill>
                 </a14:hiddenFill>
               </a:ext>
               <a:ext uri="{91240B29-F687-4F45-9708-019B960494DF}">
-                <a14:hiddenLine xmlns:a14="http://schemas.microsoft.com/office/drawing/2010/main" xmlns="" w="9525">
+                <a14:hiddenLine xmlns="" xmlns:a14="http://schemas.microsoft.com/office/drawing/2010/main" w="9525">
                   <a:solidFill>
                     <a:srgbClr val="000000"/>
                   </a:solidFill>
@@ -25448,7 +25631,7 @@
             <p:cNvPr id="27" name="Rectangle 21">
               <a:extLst>
                 <a:ext uri="{FF2B5EF4-FFF2-40B4-BE49-F238E27FC236}">
-                  <a16:creationId xmlns:a16="http://schemas.microsoft.com/office/drawing/2014/main" xmlns="" id="{30488693-D83F-4D9E-A376-F294A5EF0E99}"/>
+                  <a16:creationId xmlns="" xmlns:a16="http://schemas.microsoft.com/office/drawing/2014/main" id="{30488693-D83F-4D9E-A376-F294A5EF0E99}"/>
                 </a:ext>
               </a:extLst>
             </p:cNvPr>
@@ -25471,14 +25654,14 @@
             </a:ln>
             <a:extLst>
               <a:ext uri="{909E8E84-426E-40DD-AFC4-6F175D3DCCD1}">
-                <a14:hiddenFill xmlns:a14="http://schemas.microsoft.com/office/drawing/2010/main" xmlns="">
+                <a14:hiddenFill xmlns="" xmlns:a14="http://schemas.microsoft.com/office/drawing/2010/main">
                   <a:solidFill>
                     <a:srgbClr val="FFFFFF"/>
                   </a:solidFill>
                 </a14:hiddenFill>
               </a:ext>
               <a:ext uri="{91240B29-F687-4F45-9708-019B960494DF}">
-                <a14:hiddenLine xmlns:a14="http://schemas.microsoft.com/office/drawing/2010/main" xmlns="" w="9525">
+                <a14:hiddenLine xmlns="" xmlns:a14="http://schemas.microsoft.com/office/drawing/2010/main" w="9525">
                   <a:solidFill>
                     <a:srgbClr val="000000"/>
                   </a:solidFill>
@@ -25623,7 +25806,7 @@
             <p:cNvPr id="28" name="Rectangle 22">
               <a:extLst>
                 <a:ext uri="{FF2B5EF4-FFF2-40B4-BE49-F238E27FC236}">
-                  <a16:creationId xmlns:a16="http://schemas.microsoft.com/office/drawing/2014/main" xmlns="" id="{D405628F-AB7E-4C8A-B6BB-F1D108908A4B}"/>
+                  <a16:creationId xmlns="" xmlns:a16="http://schemas.microsoft.com/office/drawing/2014/main" id="{D405628F-AB7E-4C8A-B6BB-F1D108908A4B}"/>
                 </a:ext>
               </a:extLst>
             </p:cNvPr>
@@ -25648,7 +25831,7 @@
             </a:ln>
             <a:extLst>
               <a:ext uri="{91240B29-F687-4F45-9708-019B960494DF}">
-                <a14:hiddenLine xmlns:a14="http://schemas.microsoft.com/office/drawing/2010/main" xmlns="" w="9525">
+                <a14:hiddenLine xmlns="" xmlns:a14="http://schemas.microsoft.com/office/drawing/2010/main" w="9525">
                   <a:solidFill>
                     <a:srgbClr val="000000"/>
                   </a:solidFill>
@@ -25778,7 +25961,7 @@
             <p:cNvPr id="29" name="Rectangle 23">
               <a:extLst>
                 <a:ext uri="{FF2B5EF4-FFF2-40B4-BE49-F238E27FC236}">
-                  <a16:creationId xmlns:a16="http://schemas.microsoft.com/office/drawing/2014/main" xmlns="" id="{44DA1086-2F83-41DD-88C4-D5A3A7FD7716}"/>
+                  <a16:creationId xmlns="" xmlns:a16="http://schemas.microsoft.com/office/drawing/2014/main" id="{44DA1086-2F83-41DD-88C4-D5A3A7FD7716}"/>
                 </a:ext>
               </a:extLst>
             </p:cNvPr>
@@ -25803,7 +25986,7 @@
             </a:ln>
             <a:extLst>
               <a:ext uri="{91240B29-F687-4F45-9708-019B960494DF}">
-                <a14:hiddenLine xmlns:a14="http://schemas.microsoft.com/office/drawing/2010/main" xmlns="" w="9525">
+                <a14:hiddenLine xmlns="" xmlns:a14="http://schemas.microsoft.com/office/drawing/2010/main" w="9525">
                   <a:solidFill>
                     <a:srgbClr val="000000"/>
                   </a:solidFill>
@@ -25933,7 +26116,7 @@
             <p:cNvPr id="30" name="Rectangle 24">
               <a:extLst>
                 <a:ext uri="{FF2B5EF4-FFF2-40B4-BE49-F238E27FC236}">
-                  <a16:creationId xmlns:a16="http://schemas.microsoft.com/office/drawing/2014/main" xmlns="" id="{E38C6E9D-76C4-4472-8B06-44449E3095D5}"/>
+                  <a16:creationId xmlns="" xmlns:a16="http://schemas.microsoft.com/office/drawing/2014/main" id="{E38C6E9D-76C4-4472-8B06-44449E3095D5}"/>
                 </a:ext>
               </a:extLst>
             </p:cNvPr>
@@ -25958,7 +26141,7 @@
             </a:ln>
             <a:extLst>
               <a:ext uri="{91240B29-F687-4F45-9708-019B960494DF}">
-                <a14:hiddenLine xmlns:a14="http://schemas.microsoft.com/office/drawing/2010/main" xmlns="" w="9525">
+                <a14:hiddenLine xmlns="" xmlns:a14="http://schemas.microsoft.com/office/drawing/2010/main" w="9525">
                   <a:solidFill>
                     <a:srgbClr val="000000"/>
                   </a:solidFill>
@@ -26088,7 +26271,7 @@
             <p:cNvPr id="31" name="Rectangle 25">
               <a:extLst>
                 <a:ext uri="{FF2B5EF4-FFF2-40B4-BE49-F238E27FC236}">
-                  <a16:creationId xmlns:a16="http://schemas.microsoft.com/office/drawing/2014/main" xmlns="" id="{0EF064B9-1E7D-4B34-A0B0-5370F498B730}"/>
+                  <a16:creationId xmlns="" xmlns:a16="http://schemas.microsoft.com/office/drawing/2014/main" id="{0EF064B9-1E7D-4B34-A0B0-5370F498B730}"/>
                 </a:ext>
               </a:extLst>
             </p:cNvPr>
@@ -26113,7 +26296,7 @@
             </a:ln>
             <a:extLst>
               <a:ext uri="{91240B29-F687-4F45-9708-019B960494DF}">
-                <a14:hiddenLine xmlns:a14="http://schemas.microsoft.com/office/drawing/2010/main" xmlns="" w="9525">
+                <a14:hiddenLine xmlns="" xmlns:a14="http://schemas.microsoft.com/office/drawing/2010/main" w="9525">
                   <a:solidFill>
                     <a:srgbClr val="000000"/>
                   </a:solidFill>
@@ -26243,7 +26426,7 @@
             <p:cNvPr id="32" name="Freeform 26">
               <a:extLst>
                 <a:ext uri="{FF2B5EF4-FFF2-40B4-BE49-F238E27FC236}">
-                  <a16:creationId xmlns:a16="http://schemas.microsoft.com/office/drawing/2014/main" xmlns="" id="{56826608-C179-4D58-BBAD-8A01718D8900}"/>
+                  <a16:creationId xmlns="" xmlns:a16="http://schemas.microsoft.com/office/drawing/2014/main" id="{56826608-C179-4D58-BBAD-8A01718D8900}"/>
                 </a:ext>
               </a:extLst>
             </p:cNvPr>
@@ -26336,7 +26519,7 @@
             </a:ln>
             <a:extLst>
               <a:ext uri="{909E8E84-426E-40DD-AFC4-6F175D3DCCD1}">
-                <a14:hiddenFill xmlns:a14="http://schemas.microsoft.com/office/drawing/2010/main" xmlns="">
+                <a14:hiddenFill xmlns="" xmlns:a14="http://schemas.microsoft.com/office/drawing/2010/main">
                   <a:solidFill>
                     <a:srgbClr val="FFFFFF"/>
                   </a:solidFill>
@@ -26463,7 +26646,7 @@
             <p:cNvPr id="33" name="Line 27">
               <a:extLst>
                 <a:ext uri="{FF2B5EF4-FFF2-40B4-BE49-F238E27FC236}">
-                  <a16:creationId xmlns:a16="http://schemas.microsoft.com/office/drawing/2014/main" xmlns="" id="{0CF9CCE4-DAB5-4A33-A114-B5AA2CADC846}"/>
+                  <a16:creationId xmlns="" xmlns:a16="http://schemas.microsoft.com/office/drawing/2014/main" id="{0CF9CCE4-DAB5-4A33-A114-B5AA2CADC846}"/>
                 </a:ext>
               </a:extLst>
             </p:cNvPr>
@@ -26491,7 +26674,7 @@
             </a:ln>
             <a:extLst>
               <a:ext uri="{909E8E84-426E-40DD-AFC4-6F175D3DCCD1}">
-                <a14:hiddenFill xmlns:a14="http://schemas.microsoft.com/office/drawing/2010/main" xmlns="">
+                <a14:hiddenFill xmlns="" xmlns:a14="http://schemas.microsoft.com/office/drawing/2010/main">
                   <a:noFill/>
                 </a14:hiddenFill>
               </a:ext>
@@ -26510,7 +26693,7 @@
             <p:cNvPr id="34" name="Line 28">
               <a:extLst>
                 <a:ext uri="{FF2B5EF4-FFF2-40B4-BE49-F238E27FC236}">
-                  <a16:creationId xmlns:a16="http://schemas.microsoft.com/office/drawing/2014/main" xmlns="" id="{BFC9548B-C380-4706-B461-073C00CEFE15}"/>
+                  <a16:creationId xmlns="" xmlns:a16="http://schemas.microsoft.com/office/drawing/2014/main" id="{BFC9548B-C380-4706-B461-073C00CEFE15}"/>
                 </a:ext>
               </a:extLst>
             </p:cNvPr>
@@ -26538,7 +26721,7 @@
             </a:ln>
             <a:extLst>
               <a:ext uri="{909E8E84-426E-40DD-AFC4-6F175D3DCCD1}">
-                <a14:hiddenFill xmlns:a14="http://schemas.microsoft.com/office/drawing/2010/main" xmlns="">
+                <a14:hiddenFill xmlns="" xmlns:a14="http://schemas.microsoft.com/office/drawing/2010/main">
                   <a:noFill/>
                 </a14:hiddenFill>
               </a:ext>
@@ -26557,7 +26740,7 @@
             <p:cNvPr id="35" name="Rectangle 29">
               <a:extLst>
                 <a:ext uri="{FF2B5EF4-FFF2-40B4-BE49-F238E27FC236}">
-                  <a16:creationId xmlns:a16="http://schemas.microsoft.com/office/drawing/2014/main" xmlns="" id="{7B70BE1C-715F-4F43-96CD-1893A0A5D4CB}"/>
+                  <a16:creationId xmlns="" xmlns:a16="http://schemas.microsoft.com/office/drawing/2014/main" id="{7B70BE1C-715F-4F43-96CD-1893A0A5D4CB}"/>
                 </a:ext>
               </a:extLst>
             </p:cNvPr>
@@ -26582,7 +26765,7 @@
             </a:ln>
             <a:extLst>
               <a:ext uri="{91240B29-F687-4F45-9708-019B960494DF}">
-                <a14:hiddenLine xmlns:a14="http://schemas.microsoft.com/office/drawing/2010/main" xmlns="" w="9525">
+                <a14:hiddenLine xmlns="" xmlns:a14="http://schemas.microsoft.com/office/drawing/2010/main" w="9525">
                   <a:solidFill>
                     <a:srgbClr val="000000"/>
                   </a:solidFill>
@@ -26712,7 +26895,7 @@
             <p:cNvPr id="36" name="Picture 30">
               <a:extLst>
                 <a:ext uri="{FF2B5EF4-FFF2-40B4-BE49-F238E27FC236}">
-                  <a16:creationId xmlns:a16="http://schemas.microsoft.com/office/drawing/2014/main" xmlns="" id="{16B82C14-9CA8-43B0-B6E8-C4D0A3E08AE2}"/>
+                  <a16:creationId xmlns="" xmlns:a16="http://schemas.microsoft.com/office/drawing/2014/main" id="{16B82C14-9CA8-43B0-B6E8-C4D0A3E08AE2}"/>
                 </a:ext>
               </a:extLst>
             </p:cNvPr>
@@ -26735,14 +26918,14 @@
             </a:ln>
             <a:extLst>
               <a:ext uri="{909E8E84-426E-40DD-AFC4-6F175D3DCCD1}">
-                <a14:hiddenFill xmlns:a14="http://schemas.microsoft.com/office/drawing/2010/main" xmlns="">
+                <a14:hiddenFill xmlns="" xmlns:a14="http://schemas.microsoft.com/office/drawing/2010/main">
                   <a:solidFill>
                     <a:srgbClr val="FFFFFF"/>
                   </a:solidFill>
                 </a14:hiddenFill>
               </a:ext>
               <a:ext uri="{91240B29-F687-4F45-9708-019B960494DF}">
-                <a14:hiddenLine xmlns:a14="http://schemas.microsoft.com/office/drawing/2010/main" xmlns="" w="9525">
+                <a14:hiddenLine xmlns="" xmlns:a14="http://schemas.microsoft.com/office/drawing/2010/main" w="9525">
                   <a:solidFill>
                     <a:srgbClr val="000000"/>
                   </a:solidFill>
@@ -26766,7 +26949,7 @@
             <p:cNvPr id="37" name="Rectangle 31">
               <a:extLst>
                 <a:ext uri="{FF2B5EF4-FFF2-40B4-BE49-F238E27FC236}">
-                  <a16:creationId xmlns:a16="http://schemas.microsoft.com/office/drawing/2014/main" xmlns="" id="{F8F69776-EF90-4503-B028-2C3286FB7C42}"/>
+                  <a16:creationId xmlns="" xmlns:a16="http://schemas.microsoft.com/office/drawing/2014/main" id="{F8F69776-EF90-4503-B028-2C3286FB7C42}"/>
                 </a:ext>
               </a:extLst>
             </p:cNvPr>
@@ -26789,14 +26972,14 @@
             </a:ln>
             <a:extLst>
               <a:ext uri="{909E8E84-426E-40DD-AFC4-6F175D3DCCD1}">
-                <a14:hiddenFill xmlns:a14="http://schemas.microsoft.com/office/drawing/2010/main" xmlns="">
+                <a14:hiddenFill xmlns="" xmlns:a14="http://schemas.microsoft.com/office/drawing/2010/main">
                   <a:solidFill>
                     <a:srgbClr val="FFFFFF"/>
                   </a:solidFill>
                 </a14:hiddenFill>
               </a:ext>
               <a:ext uri="{91240B29-F687-4F45-9708-019B960494DF}">
-                <a14:hiddenLine xmlns:a14="http://schemas.microsoft.com/office/drawing/2010/main" xmlns="" w="9525">
+                <a14:hiddenLine xmlns="" xmlns:a14="http://schemas.microsoft.com/office/drawing/2010/main" w="9525">
                   <a:solidFill>
                     <a:srgbClr val="000000"/>
                   </a:solidFill>
@@ -26951,7 +27134,7 @@
             <p:cNvPr id="38" name="Picture 32">
               <a:extLst>
                 <a:ext uri="{FF2B5EF4-FFF2-40B4-BE49-F238E27FC236}">
-                  <a16:creationId xmlns:a16="http://schemas.microsoft.com/office/drawing/2014/main" xmlns="" id="{E0047056-815A-4FC0-AF7E-44BFE48F16B8}"/>
+                  <a16:creationId xmlns="" xmlns:a16="http://schemas.microsoft.com/office/drawing/2014/main" id="{E0047056-815A-4FC0-AF7E-44BFE48F16B8}"/>
                 </a:ext>
               </a:extLst>
             </p:cNvPr>
@@ -26974,14 +27157,14 @@
             </a:ln>
             <a:extLst>
               <a:ext uri="{909E8E84-426E-40DD-AFC4-6F175D3DCCD1}">
-                <a14:hiddenFill xmlns:a14="http://schemas.microsoft.com/office/drawing/2010/main" xmlns="">
+                <a14:hiddenFill xmlns="" xmlns:a14="http://schemas.microsoft.com/office/drawing/2010/main">
                   <a:solidFill>
                     <a:srgbClr val="FFFFFF"/>
                   </a:solidFill>
                 </a14:hiddenFill>
               </a:ext>
               <a:ext uri="{91240B29-F687-4F45-9708-019B960494DF}">
-                <a14:hiddenLine xmlns:a14="http://schemas.microsoft.com/office/drawing/2010/main" xmlns="" w="9525">
+                <a14:hiddenLine xmlns="" xmlns:a14="http://schemas.microsoft.com/office/drawing/2010/main" w="9525">
                   <a:solidFill>
                     <a:srgbClr val="000000"/>
                   </a:solidFill>
@@ -27005,7 +27188,7 @@
             <p:cNvPr id="39" name="Rectangle 33">
               <a:extLst>
                 <a:ext uri="{FF2B5EF4-FFF2-40B4-BE49-F238E27FC236}">
-                  <a16:creationId xmlns:a16="http://schemas.microsoft.com/office/drawing/2014/main" xmlns="" id="{D7DFF6F9-60FB-4956-A5E7-E58A97C90101}"/>
+                  <a16:creationId xmlns="" xmlns:a16="http://schemas.microsoft.com/office/drawing/2014/main" id="{D7DFF6F9-60FB-4956-A5E7-E58A97C90101}"/>
                 </a:ext>
               </a:extLst>
             </p:cNvPr>
@@ -27028,14 +27211,14 @@
             </a:ln>
             <a:extLst>
               <a:ext uri="{909E8E84-426E-40DD-AFC4-6F175D3DCCD1}">
-                <a14:hiddenFill xmlns:a14="http://schemas.microsoft.com/office/drawing/2010/main" xmlns="">
+                <a14:hiddenFill xmlns="" xmlns:a14="http://schemas.microsoft.com/office/drawing/2010/main">
                   <a:solidFill>
                     <a:srgbClr val="FFFFFF"/>
                   </a:solidFill>
                 </a14:hiddenFill>
               </a:ext>
               <a:ext uri="{91240B29-F687-4F45-9708-019B960494DF}">
-                <a14:hiddenLine xmlns:a14="http://schemas.microsoft.com/office/drawing/2010/main" xmlns="" w="9525">
+                <a14:hiddenLine xmlns="" xmlns:a14="http://schemas.microsoft.com/office/drawing/2010/main" w="9525">
                   <a:solidFill>
                     <a:srgbClr val="000000"/>
                   </a:solidFill>
@@ -27180,7 +27363,7 @@
             <p:cNvPr id="40" name="Rectangle 34">
               <a:extLst>
                 <a:ext uri="{FF2B5EF4-FFF2-40B4-BE49-F238E27FC236}">
-                  <a16:creationId xmlns:a16="http://schemas.microsoft.com/office/drawing/2014/main" xmlns="" id="{152916C2-DDD0-435D-BA0E-71EB638D2C7F}"/>
+                  <a16:creationId xmlns="" xmlns:a16="http://schemas.microsoft.com/office/drawing/2014/main" id="{152916C2-DDD0-435D-BA0E-71EB638D2C7F}"/>
                 </a:ext>
               </a:extLst>
             </p:cNvPr>
@@ -27205,7 +27388,7 @@
             </a:ln>
             <a:extLst>
               <a:ext uri="{91240B29-F687-4F45-9708-019B960494DF}">
-                <a14:hiddenLine xmlns:a14="http://schemas.microsoft.com/office/drawing/2010/main" xmlns="" w="9525">
+                <a14:hiddenLine xmlns="" xmlns:a14="http://schemas.microsoft.com/office/drawing/2010/main" w="9525">
                   <a:solidFill>
                     <a:srgbClr val="000000"/>
                   </a:solidFill>
@@ -27335,7 +27518,7 @@
             <p:cNvPr id="41" name="Rectangle 35">
               <a:extLst>
                 <a:ext uri="{FF2B5EF4-FFF2-40B4-BE49-F238E27FC236}">
-                  <a16:creationId xmlns:a16="http://schemas.microsoft.com/office/drawing/2014/main" xmlns="" id="{5092A7B2-0D82-4EF8-BD2C-F696259F2541}"/>
+                  <a16:creationId xmlns="" xmlns:a16="http://schemas.microsoft.com/office/drawing/2014/main" id="{5092A7B2-0D82-4EF8-BD2C-F696259F2541}"/>
                 </a:ext>
               </a:extLst>
             </p:cNvPr>
@@ -27360,7 +27543,7 @@
             </a:ln>
             <a:extLst>
               <a:ext uri="{91240B29-F687-4F45-9708-019B960494DF}">
-                <a14:hiddenLine xmlns:a14="http://schemas.microsoft.com/office/drawing/2010/main" xmlns="" w="9525">
+                <a14:hiddenLine xmlns="" xmlns:a14="http://schemas.microsoft.com/office/drawing/2010/main" w="9525">
                   <a:solidFill>
                     <a:srgbClr val="000000"/>
                   </a:solidFill>
@@ -27490,7 +27673,7 @@
             <p:cNvPr id="42" name="Rectangle 36">
               <a:extLst>
                 <a:ext uri="{FF2B5EF4-FFF2-40B4-BE49-F238E27FC236}">
-                  <a16:creationId xmlns:a16="http://schemas.microsoft.com/office/drawing/2014/main" xmlns="" id="{428F2109-2F94-4B2E-977B-F0715407D1B1}"/>
+                  <a16:creationId xmlns="" xmlns:a16="http://schemas.microsoft.com/office/drawing/2014/main" id="{428F2109-2F94-4B2E-977B-F0715407D1B1}"/>
                 </a:ext>
               </a:extLst>
             </p:cNvPr>
@@ -27515,7 +27698,7 @@
             </a:ln>
             <a:extLst>
               <a:ext uri="{91240B29-F687-4F45-9708-019B960494DF}">
-                <a14:hiddenLine xmlns:a14="http://schemas.microsoft.com/office/drawing/2010/main" xmlns="" w="9525">
+                <a14:hiddenLine xmlns="" xmlns:a14="http://schemas.microsoft.com/office/drawing/2010/main" w="9525">
                   <a:solidFill>
                     <a:srgbClr val="000000"/>
                   </a:solidFill>
@@ -27645,7 +27828,7 @@
             <p:cNvPr id="43" name="Rectangle 37">
               <a:extLst>
                 <a:ext uri="{FF2B5EF4-FFF2-40B4-BE49-F238E27FC236}">
-                  <a16:creationId xmlns:a16="http://schemas.microsoft.com/office/drawing/2014/main" xmlns="" id="{145FD96E-2A9A-4D6B-8349-9EFFA981489B}"/>
+                  <a16:creationId xmlns="" xmlns:a16="http://schemas.microsoft.com/office/drawing/2014/main" id="{145FD96E-2A9A-4D6B-8349-9EFFA981489B}"/>
                 </a:ext>
               </a:extLst>
             </p:cNvPr>
@@ -27670,7 +27853,7 @@
             </a:ln>
             <a:extLst>
               <a:ext uri="{91240B29-F687-4F45-9708-019B960494DF}">
-                <a14:hiddenLine xmlns:a14="http://schemas.microsoft.com/office/drawing/2010/main" xmlns="" w="9525">
+                <a14:hiddenLine xmlns="" xmlns:a14="http://schemas.microsoft.com/office/drawing/2010/main" w="9525">
                   <a:solidFill>
                     <a:srgbClr val="000000"/>
                   </a:solidFill>
@@ -27800,7 +27983,7 @@
             <p:cNvPr id="44" name="Freeform 38">
               <a:extLst>
                 <a:ext uri="{FF2B5EF4-FFF2-40B4-BE49-F238E27FC236}">
-                  <a16:creationId xmlns:a16="http://schemas.microsoft.com/office/drawing/2014/main" xmlns="" id="{ECEF07E6-AB3C-4F77-8DEA-259A5050DA24}"/>
+                  <a16:creationId xmlns="" xmlns:a16="http://schemas.microsoft.com/office/drawing/2014/main" id="{ECEF07E6-AB3C-4F77-8DEA-259A5050DA24}"/>
                 </a:ext>
               </a:extLst>
             </p:cNvPr>
@@ -27893,7 +28076,7 @@
             </a:ln>
             <a:extLst>
               <a:ext uri="{909E8E84-426E-40DD-AFC4-6F175D3DCCD1}">
-                <a14:hiddenFill xmlns:a14="http://schemas.microsoft.com/office/drawing/2010/main" xmlns="">
+                <a14:hiddenFill xmlns="" xmlns:a14="http://schemas.microsoft.com/office/drawing/2010/main">
                   <a:solidFill>
                     <a:srgbClr val="FFFFFF"/>
                   </a:solidFill>
@@ -28020,7 +28203,7 @@
             <p:cNvPr id="45" name="Line 39">
               <a:extLst>
                 <a:ext uri="{FF2B5EF4-FFF2-40B4-BE49-F238E27FC236}">
-                  <a16:creationId xmlns:a16="http://schemas.microsoft.com/office/drawing/2014/main" xmlns="" id="{E9A28729-8FE0-4983-80AE-AD7D0B15D144}"/>
+                  <a16:creationId xmlns="" xmlns:a16="http://schemas.microsoft.com/office/drawing/2014/main" id="{E9A28729-8FE0-4983-80AE-AD7D0B15D144}"/>
                 </a:ext>
               </a:extLst>
             </p:cNvPr>
@@ -28048,7 +28231,7 @@
             </a:ln>
             <a:extLst>
               <a:ext uri="{909E8E84-426E-40DD-AFC4-6F175D3DCCD1}">
-                <a14:hiddenFill xmlns:a14="http://schemas.microsoft.com/office/drawing/2010/main" xmlns="">
+                <a14:hiddenFill xmlns="" xmlns:a14="http://schemas.microsoft.com/office/drawing/2010/main">
                   <a:noFill/>
                 </a14:hiddenFill>
               </a:ext>
@@ -28067,7 +28250,7 @@
             <p:cNvPr id="46" name="Line 40">
               <a:extLst>
                 <a:ext uri="{FF2B5EF4-FFF2-40B4-BE49-F238E27FC236}">
-                  <a16:creationId xmlns:a16="http://schemas.microsoft.com/office/drawing/2014/main" xmlns="" id="{31F6C475-414B-4F40-8778-A019C2CBC8C1}"/>
+                  <a16:creationId xmlns="" xmlns:a16="http://schemas.microsoft.com/office/drawing/2014/main" id="{31F6C475-414B-4F40-8778-A019C2CBC8C1}"/>
                 </a:ext>
               </a:extLst>
             </p:cNvPr>
@@ -28095,7 +28278,7 @@
             </a:ln>
             <a:extLst>
               <a:ext uri="{909E8E84-426E-40DD-AFC4-6F175D3DCCD1}">
-                <a14:hiddenFill xmlns:a14="http://schemas.microsoft.com/office/drawing/2010/main" xmlns="">
+                <a14:hiddenFill xmlns="" xmlns:a14="http://schemas.microsoft.com/office/drawing/2010/main">
                   <a:noFill/>
                 </a14:hiddenFill>
               </a:ext>
@@ -28114,7 +28297,7 @@
             <p:cNvPr id="47" name="Rectangle 41">
               <a:extLst>
                 <a:ext uri="{FF2B5EF4-FFF2-40B4-BE49-F238E27FC236}">
-                  <a16:creationId xmlns:a16="http://schemas.microsoft.com/office/drawing/2014/main" xmlns="" id="{53EB3EBD-9495-43BC-839F-9349B071CE3A}"/>
+                  <a16:creationId xmlns="" xmlns:a16="http://schemas.microsoft.com/office/drawing/2014/main" id="{53EB3EBD-9495-43BC-839F-9349B071CE3A}"/>
                 </a:ext>
               </a:extLst>
             </p:cNvPr>
@@ -28139,7 +28322,7 @@
             </a:ln>
             <a:extLst>
               <a:ext uri="{91240B29-F687-4F45-9708-019B960494DF}">
-                <a14:hiddenLine xmlns:a14="http://schemas.microsoft.com/office/drawing/2010/main" xmlns="" w="9525">
+                <a14:hiddenLine xmlns="" xmlns:a14="http://schemas.microsoft.com/office/drawing/2010/main" w="9525">
                   <a:solidFill>
                     <a:srgbClr val="000000"/>
                   </a:solidFill>
@@ -28269,7 +28452,7 @@
             <p:cNvPr id="48" name="Picture 42">
               <a:extLst>
                 <a:ext uri="{FF2B5EF4-FFF2-40B4-BE49-F238E27FC236}">
-                  <a16:creationId xmlns:a16="http://schemas.microsoft.com/office/drawing/2014/main" xmlns="" id="{993D6064-11F2-41AB-9765-DB6EF24CD3CF}"/>
+                  <a16:creationId xmlns="" xmlns:a16="http://schemas.microsoft.com/office/drawing/2014/main" id="{993D6064-11F2-41AB-9765-DB6EF24CD3CF}"/>
                 </a:ext>
               </a:extLst>
             </p:cNvPr>
@@ -28292,14 +28475,14 @@
             </a:ln>
             <a:extLst>
               <a:ext uri="{909E8E84-426E-40DD-AFC4-6F175D3DCCD1}">
-                <a14:hiddenFill xmlns:a14="http://schemas.microsoft.com/office/drawing/2010/main" xmlns="">
+                <a14:hiddenFill xmlns="" xmlns:a14="http://schemas.microsoft.com/office/drawing/2010/main">
                   <a:solidFill>
                     <a:srgbClr val="FFFFFF"/>
                   </a:solidFill>
                 </a14:hiddenFill>
               </a:ext>
               <a:ext uri="{91240B29-F687-4F45-9708-019B960494DF}">
-                <a14:hiddenLine xmlns:a14="http://schemas.microsoft.com/office/drawing/2010/main" xmlns="" w="9525">
+                <a14:hiddenLine xmlns="" xmlns:a14="http://schemas.microsoft.com/office/drawing/2010/main" w="9525">
                   <a:solidFill>
                     <a:srgbClr val="000000"/>
                   </a:solidFill>
@@ -28323,7 +28506,7 @@
             <p:cNvPr id="49" name="Rectangle 43">
               <a:extLst>
                 <a:ext uri="{FF2B5EF4-FFF2-40B4-BE49-F238E27FC236}">
-                  <a16:creationId xmlns:a16="http://schemas.microsoft.com/office/drawing/2014/main" xmlns="" id="{B1723EAC-A8CB-45CA-B8A1-0FDB3D3E10C3}"/>
+                  <a16:creationId xmlns="" xmlns:a16="http://schemas.microsoft.com/office/drawing/2014/main" id="{B1723EAC-A8CB-45CA-B8A1-0FDB3D3E10C3}"/>
                 </a:ext>
               </a:extLst>
             </p:cNvPr>
@@ -28346,14 +28529,14 @@
             </a:ln>
             <a:extLst>
               <a:ext uri="{909E8E84-426E-40DD-AFC4-6F175D3DCCD1}">
-                <a14:hiddenFill xmlns:a14="http://schemas.microsoft.com/office/drawing/2010/main" xmlns="">
+                <a14:hiddenFill xmlns="" xmlns:a14="http://schemas.microsoft.com/office/drawing/2010/main">
                   <a:solidFill>
                     <a:srgbClr val="FFFFFF"/>
                   </a:solidFill>
                 </a14:hiddenFill>
               </a:ext>
               <a:ext uri="{91240B29-F687-4F45-9708-019B960494DF}">
-                <a14:hiddenLine xmlns:a14="http://schemas.microsoft.com/office/drawing/2010/main" xmlns="" w="9525">
+                <a14:hiddenLine xmlns="" xmlns:a14="http://schemas.microsoft.com/office/drawing/2010/main" w="9525">
                   <a:solidFill>
                     <a:srgbClr val="000000"/>
                   </a:solidFill>
@@ -28508,7 +28691,7 @@
             <p:cNvPr id="50" name="Rectangle 44">
               <a:extLst>
                 <a:ext uri="{FF2B5EF4-FFF2-40B4-BE49-F238E27FC236}">
-                  <a16:creationId xmlns:a16="http://schemas.microsoft.com/office/drawing/2014/main" xmlns="" id="{DF38D274-1CB8-427C-BC42-8C5AE9A18C97}"/>
+                  <a16:creationId xmlns="" xmlns:a16="http://schemas.microsoft.com/office/drawing/2014/main" id="{DF38D274-1CB8-427C-BC42-8C5AE9A18C97}"/>
                 </a:ext>
               </a:extLst>
             </p:cNvPr>
@@ -28533,7 +28716,7 @@
             </a:ln>
             <a:extLst>
               <a:ext uri="{91240B29-F687-4F45-9708-019B960494DF}">
-                <a14:hiddenLine xmlns:a14="http://schemas.microsoft.com/office/drawing/2010/main" xmlns="" w="9525">
+                <a14:hiddenLine xmlns="" xmlns:a14="http://schemas.microsoft.com/office/drawing/2010/main" w="9525">
                   <a:solidFill>
                     <a:srgbClr val="000000"/>
                   </a:solidFill>
@@ -28663,7 +28846,7 @@
             <p:cNvPr id="51" name="Picture 45">
               <a:extLst>
                 <a:ext uri="{FF2B5EF4-FFF2-40B4-BE49-F238E27FC236}">
-                  <a16:creationId xmlns:a16="http://schemas.microsoft.com/office/drawing/2014/main" xmlns="" id="{D13F918D-A267-4371-8563-82D79E28C58B}"/>
+                  <a16:creationId xmlns="" xmlns:a16="http://schemas.microsoft.com/office/drawing/2014/main" id="{D13F918D-A267-4371-8563-82D79E28C58B}"/>
                 </a:ext>
               </a:extLst>
             </p:cNvPr>
@@ -28686,14 +28869,14 @@
             </a:ln>
             <a:extLst>
               <a:ext uri="{909E8E84-426E-40DD-AFC4-6F175D3DCCD1}">
-                <a14:hiddenFill xmlns:a14="http://schemas.microsoft.com/office/drawing/2010/main" xmlns="">
+                <a14:hiddenFill xmlns="" xmlns:a14="http://schemas.microsoft.com/office/drawing/2010/main">
                   <a:solidFill>
                     <a:srgbClr val="FFFFFF"/>
                   </a:solidFill>
                 </a14:hiddenFill>
               </a:ext>
               <a:ext uri="{91240B29-F687-4F45-9708-019B960494DF}">
-                <a14:hiddenLine xmlns:a14="http://schemas.microsoft.com/office/drawing/2010/main" xmlns="" w="9525">
+                <a14:hiddenLine xmlns="" xmlns:a14="http://schemas.microsoft.com/office/drawing/2010/main" w="9525">
                   <a:solidFill>
                     <a:srgbClr val="000000"/>
                   </a:solidFill>
@@ -28717,7 +28900,7 @@
             <p:cNvPr id="52" name="Rectangle 46">
               <a:extLst>
                 <a:ext uri="{FF2B5EF4-FFF2-40B4-BE49-F238E27FC236}">
-                  <a16:creationId xmlns:a16="http://schemas.microsoft.com/office/drawing/2014/main" xmlns="" id="{A2EFA408-A84A-4966-A7C8-4051CB1362A3}"/>
+                  <a16:creationId xmlns="" xmlns:a16="http://schemas.microsoft.com/office/drawing/2014/main" id="{A2EFA408-A84A-4966-A7C8-4051CB1362A3}"/>
                 </a:ext>
               </a:extLst>
             </p:cNvPr>
@@ -28740,14 +28923,14 @@
             </a:ln>
             <a:extLst>
               <a:ext uri="{909E8E84-426E-40DD-AFC4-6F175D3DCCD1}">
-                <a14:hiddenFill xmlns:a14="http://schemas.microsoft.com/office/drawing/2010/main" xmlns="">
+                <a14:hiddenFill xmlns="" xmlns:a14="http://schemas.microsoft.com/office/drawing/2010/main">
                   <a:solidFill>
                     <a:srgbClr val="FFFFFF"/>
                   </a:solidFill>
                 </a14:hiddenFill>
               </a:ext>
               <a:ext uri="{91240B29-F687-4F45-9708-019B960494DF}">
-                <a14:hiddenLine xmlns:a14="http://schemas.microsoft.com/office/drawing/2010/main" xmlns="" w="9525">
+                <a14:hiddenLine xmlns="" xmlns:a14="http://schemas.microsoft.com/office/drawing/2010/main" w="9525">
                   <a:solidFill>
                     <a:srgbClr val="000000"/>
                   </a:solidFill>
@@ -28902,7 +29085,7 @@
             <p:cNvPr id="53" name="Picture 47">
               <a:extLst>
                 <a:ext uri="{FF2B5EF4-FFF2-40B4-BE49-F238E27FC236}">
-                  <a16:creationId xmlns:a16="http://schemas.microsoft.com/office/drawing/2014/main" xmlns="" id="{4B038928-5558-4FE1-94E2-4C0F952115E4}"/>
+                  <a16:creationId xmlns="" xmlns:a16="http://schemas.microsoft.com/office/drawing/2014/main" id="{4B038928-5558-4FE1-94E2-4C0F952115E4}"/>
                 </a:ext>
               </a:extLst>
             </p:cNvPr>
@@ -28925,14 +29108,14 @@
             </a:ln>
             <a:extLst>
               <a:ext uri="{909E8E84-426E-40DD-AFC4-6F175D3DCCD1}">
-                <a14:hiddenFill xmlns:a14="http://schemas.microsoft.com/office/drawing/2010/main" xmlns="">
+                <a14:hiddenFill xmlns="" xmlns:a14="http://schemas.microsoft.com/office/drawing/2010/main">
                   <a:solidFill>
                     <a:srgbClr val="FFFFFF"/>
                   </a:solidFill>
                 </a14:hiddenFill>
               </a:ext>
               <a:ext uri="{91240B29-F687-4F45-9708-019B960494DF}">
-                <a14:hiddenLine xmlns:a14="http://schemas.microsoft.com/office/drawing/2010/main" xmlns="" w="9525">
+                <a14:hiddenLine xmlns="" xmlns:a14="http://schemas.microsoft.com/office/drawing/2010/main" w="9525">
                   <a:solidFill>
                     <a:srgbClr val="000000"/>
                   </a:solidFill>
@@ -28956,7 +29139,7 @@
             <p:cNvPr id="54" name="Rectangle 48">
               <a:extLst>
                 <a:ext uri="{FF2B5EF4-FFF2-40B4-BE49-F238E27FC236}">
-                  <a16:creationId xmlns:a16="http://schemas.microsoft.com/office/drawing/2014/main" xmlns="" id="{665AC574-3455-4427-9CD9-1F25F3CD4CC8}"/>
+                  <a16:creationId xmlns="" xmlns:a16="http://schemas.microsoft.com/office/drawing/2014/main" id="{665AC574-3455-4427-9CD9-1F25F3CD4CC8}"/>
                 </a:ext>
               </a:extLst>
             </p:cNvPr>
@@ -28979,14 +29162,14 @@
             </a:ln>
             <a:extLst>
               <a:ext uri="{909E8E84-426E-40DD-AFC4-6F175D3DCCD1}">
-                <a14:hiddenFill xmlns:a14="http://schemas.microsoft.com/office/drawing/2010/main" xmlns="">
+                <a14:hiddenFill xmlns="" xmlns:a14="http://schemas.microsoft.com/office/drawing/2010/main">
                   <a:solidFill>
                     <a:srgbClr val="FFFFFF"/>
                   </a:solidFill>
                 </a14:hiddenFill>
               </a:ext>
               <a:ext uri="{91240B29-F687-4F45-9708-019B960494DF}">
-                <a14:hiddenLine xmlns:a14="http://schemas.microsoft.com/office/drawing/2010/main" xmlns="" w="9525">
+                <a14:hiddenLine xmlns="" xmlns:a14="http://schemas.microsoft.com/office/drawing/2010/main" w="9525">
                   <a:solidFill>
                     <a:srgbClr val="000000"/>
                   </a:solidFill>
@@ -29131,7 +29314,7 @@
             <p:cNvPr id="55" name="Rectangle 49">
               <a:extLst>
                 <a:ext uri="{FF2B5EF4-FFF2-40B4-BE49-F238E27FC236}">
-                  <a16:creationId xmlns:a16="http://schemas.microsoft.com/office/drawing/2014/main" xmlns="" id="{52D1C7AB-5B5C-430C-97B3-4DCF8CEF9A92}"/>
+                  <a16:creationId xmlns="" xmlns:a16="http://schemas.microsoft.com/office/drawing/2014/main" id="{52D1C7AB-5B5C-430C-97B3-4DCF8CEF9A92}"/>
                 </a:ext>
               </a:extLst>
             </p:cNvPr>
@@ -29156,7 +29339,7 @@
             </a:ln>
             <a:extLst>
               <a:ext uri="{91240B29-F687-4F45-9708-019B960494DF}">
-                <a14:hiddenLine xmlns:a14="http://schemas.microsoft.com/office/drawing/2010/main" xmlns="" w="9525">
+                <a14:hiddenLine xmlns="" xmlns:a14="http://schemas.microsoft.com/office/drawing/2010/main" w="9525">
                   <a:solidFill>
                     <a:srgbClr val="000000"/>
                   </a:solidFill>
@@ -29286,7 +29469,7 @@
             <p:cNvPr id="56" name="Rectangle 50">
               <a:extLst>
                 <a:ext uri="{FF2B5EF4-FFF2-40B4-BE49-F238E27FC236}">
-                  <a16:creationId xmlns:a16="http://schemas.microsoft.com/office/drawing/2014/main" xmlns="" id="{2BB3F176-5419-4BAE-884F-B2693548B145}"/>
+                  <a16:creationId xmlns="" xmlns:a16="http://schemas.microsoft.com/office/drawing/2014/main" id="{2BB3F176-5419-4BAE-884F-B2693548B145}"/>
                 </a:ext>
               </a:extLst>
             </p:cNvPr>
@@ -29311,7 +29494,7 @@
             </a:ln>
             <a:extLst>
               <a:ext uri="{91240B29-F687-4F45-9708-019B960494DF}">
-                <a14:hiddenLine xmlns:a14="http://schemas.microsoft.com/office/drawing/2010/main" xmlns="" w="9525">
+                <a14:hiddenLine xmlns="" xmlns:a14="http://schemas.microsoft.com/office/drawing/2010/main" w="9525">
                   <a:solidFill>
                     <a:srgbClr val="000000"/>
                   </a:solidFill>
@@ -29441,7 +29624,7 @@
             <p:cNvPr id="57" name="Rectangle 51">
               <a:extLst>
                 <a:ext uri="{FF2B5EF4-FFF2-40B4-BE49-F238E27FC236}">
-                  <a16:creationId xmlns:a16="http://schemas.microsoft.com/office/drawing/2014/main" xmlns="" id="{00FC2EA0-2567-4911-9369-08AE0BE87539}"/>
+                  <a16:creationId xmlns="" xmlns:a16="http://schemas.microsoft.com/office/drawing/2014/main" id="{00FC2EA0-2567-4911-9369-08AE0BE87539}"/>
                 </a:ext>
               </a:extLst>
             </p:cNvPr>
@@ -29466,7 +29649,7 @@
             </a:ln>
             <a:extLst>
               <a:ext uri="{91240B29-F687-4F45-9708-019B960494DF}">
-                <a14:hiddenLine xmlns:a14="http://schemas.microsoft.com/office/drawing/2010/main" xmlns="" w="9525">
+                <a14:hiddenLine xmlns="" xmlns:a14="http://schemas.microsoft.com/office/drawing/2010/main" w="9525">
                   <a:solidFill>
                     <a:srgbClr val="000000"/>
                   </a:solidFill>
@@ -29596,7 +29779,7 @@
             <p:cNvPr id="58" name="Rectangle 52">
               <a:extLst>
                 <a:ext uri="{FF2B5EF4-FFF2-40B4-BE49-F238E27FC236}">
-                  <a16:creationId xmlns:a16="http://schemas.microsoft.com/office/drawing/2014/main" xmlns="" id="{0B73B8B0-456C-41F6-B943-BBFB9890E6D3}"/>
+                  <a16:creationId xmlns="" xmlns:a16="http://schemas.microsoft.com/office/drawing/2014/main" id="{0B73B8B0-456C-41F6-B943-BBFB9890E6D3}"/>
                 </a:ext>
               </a:extLst>
             </p:cNvPr>
@@ -29621,7 +29804,7 @@
             </a:ln>
             <a:extLst>
               <a:ext uri="{91240B29-F687-4F45-9708-019B960494DF}">
-                <a14:hiddenLine xmlns:a14="http://schemas.microsoft.com/office/drawing/2010/main" xmlns="" w="9525">
+                <a14:hiddenLine xmlns="" xmlns:a14="http://schemas.microsoft.com/office/drawing/2010/main" w="9525">
                   <a:solidFill>
                     <a:srgbClr val="000000"/>
                   </a:solidFill>
@@ -29751,7 +29934,7 @@
             <p:cNvPr id="59" name="Freeform 53">
               <a:extLst>
                 <a:ext uri="{FF2B5EF4-FFF2-40B4-BE49-F238E27FC236}">
-                  <a16:creationId xmlns:a16="http://schemas.microsoft.com/office/drawing/2014/main" xmlns="" id="{7E2ACC0B-7843-4F24-8378-63418965FE92}"/>
+                  <a16:creationId xmlns="" xmlns:a16="http://schemas.microsoft.com/office/drawing/2014/main" id="{7E2ACC0B-7843-4F24-8378-63418965FE92}"/>
                 </a:ext>
               </a:extLst>
             </p:cNvPr>
@@ -29844,7 +30027,7 @@
             </a:ln>
             <a:extLst>
               <a:ext uri="{909E8E84-426E-40DD-AFC4-6F175D3DCCD1}">
-                <a14:hiddenFill xmlns:a14="http://schemas.microsoft.com/office/drawing/2010/main" xmlns="">
+                <a14:hiddenFill xmlns="" xmlns:a14="http://schemas.microsoft.com/office/drawing/2010/main">
                   <a:solidFill>
                     <a:srgbClr val="FFFFFF"/>
                   </a:solidFill>
@@ -29971,7 +30154,7 @@
             <p:cNvPr id="60" name="Line 54">
               <a:extLst>
                 <a:ext uri="{FF2B5EF4-FFF2-40B4-BE49-F238E27FC236}">
-                  <a16:creationId xmlns:a16="http://schemas.microsoft.com/office/drawing/2014/main" xmlns="" id="{C47E78E7-E632-45B0-AF10-342B23449CB2}"/>
+                  <a16:creationId xmlns="" xmlns:a16="http://schemas.microsoft.com/office/drawing/2014/main" id="{C47E78E7-E632-45B0-AF10-342B23449CB2}"/>
                 </a:ext>
               </a:extLst>
             </p:cNvPr>
@@ -29999,7 +30182,7 @@
             </a:ln>
             <a:extLst>
               <a:ext uri="{909E8E84-426E-40DD-AFC4-6F175D3DCCD1}">
-                <a14:hiddenFill xmlns:a14="http://schemas.microsoft.com/office/drawing/2010/main" xmlns="">
+                <a14:hiddenFill xmlns="" xmlns:a14="http://schemas.microsoft.com/office/drawing/2010/main">
                   <a:noFill/>
                 </a14:hiddenFill>
               </a:ext>
@@ -30018,7 +30201,7 @@
             <p:cNvPr id="61" name="Line 55">
               <a:extLst>
                 <a:ext uri="{FF2B5EF4-FFF2-40B4-BE49-F238E27FC236}">
-                  <a16:creationId xmlns:a16="http://schemas.microsoft.com/office/drawing/2014/main" xmlns="" id="{4EA93AD1-DD96-4619-B4C6-37940CB77946}"/>
+                  <a16:creationId xmlns="" xmlns:a16="http://schemas.microsoft.com/office/drawing/2014/main" id="{4EA93AD1-DD96-4619-B4C6-37940CB77946}"/>
                 </a:ext>
               </a:extLst>
             </p:cNvPr>
@@ -30046,7 +30229,7 @@
             </a:ln>
             <a:extLst>
               <a:ext uri="{909E8E84-426E-40DD-AFC4-6F175D3DCCD1}">
-                <a14:hiddenFill xmlns:a14="http://schemas.microsoft.com/office/drawing/2010/main" xmlns="">
+                <a14:hiddenFill xmlns="" xmlns:a14="http://schemas.microsoft.com/office/drawing/2010/main">
                   <a:noFill/>
                 </a14:hiddenFill>
               </a:ext>
@@ -30065,7 +30248,7 @@
             <p:cNvPr id="62" name="Rectangle 56">
               <a:extLst>
                 <a:ext uri="{FF2B5EF4-FFF2-40B4-BE49-F238E27FC236}">
-                  <a16:creationId xmlns:a16="http://schemas.microsoft.com/office/drawing/2014/main" xmlns="" id="{2D7CA31A-37C5-4C26-87D2-BF4CB1AA81E1}"/>
+                  <a16:creationId xmlns="" xmlns:a16="http://schemas.microsoft.com/office/drawing/2014/main" id="{2D7CA31A-37C5-4C26-87D2-BF4CB1AA81E1}"/>
                 </a:ext>
               </a:extLst>
             </p:cNvPr>
@@ -30090,7 +30273,7 @@
             </a:ln>
             <a:extLst>
               <a:ext uri="{91240B29-F687-4F45-9708-019B960494DF}">
-                <a14:hiddenLine xmlns:a14="http://schemas.microsoft.com/office/drawing/2010/main" xmlns="" w="9525">
+                <a14:hiddenLine xmlns="" xmlns:a14="http://schemas.microsoft.com/office/drawing/2010/main" w="9525">
                   <a:solidFill>
                     <a:srgbClr val="000000"/>
                   </a:solidFill>
@@ -30220,7 +30403,7 @@
             <p:cNvPr id="63" name="Picture 57">
               <a:extLst>
                 <a:ext uri="{FF2B5EF4-FFF2-40B4-BE49-F238E27FC236}">
-                  <a16:creationId xmlns:a16="http://schemas.microsoft.com/office/drawing/2014/main" xmlns="" id="{8C16063D-4F9F-4AD5-9636-6FE9308B4CF8}"/>
+                  <a16:creationId xmlns="" xmlns:a16="http://schemas.microsoft.com/office/drawing/2014/main" id="{8C16063D-4F9F-4AD5-9636-6FE9308B4CF8}"/>
                 </a:ext>
               </a:extLst>
             </p:cNvPr>
@@ -30243,14 +30426,14 @@
             </a:ln>
             <a:extLst>
               <a:ext uri="{909E8E84-426E-40DD-AFC4-6F175D3DCCD1}">
-                <a14:hiddenFill xmlns:a14="http://schemas.microsoft.com/office/drawing/2010/main" xmlns="">
+                <a14:hiddenFill xmlns="" xmlns:a14="http://schemas.microsoft.com/office/drawing/2010/main">
                   <a:solidFill>
                     <a:srgbClr val="FFFFFF"/>
                   </a:solidFill>
                 </a14:hiddenFill>
               </a:ext>
               <a:ext uri="{91240B29-F687-4F45-9708-019B960494DF}">
-                <a14:hiddenLine xmlns:a14="http://schemas.microsoft.com/office/drawing/2010/main" xmlns="" w="9525">
+                <a14:hiddenLine xmlns="" xmlns:a14="http://schemas.microsoft.com/office/drawing/2010/main" w="9525">
                   <a:solidFill>
                     <a:srgbClr val="000000"/>
                   </a:solidFill>
@@ -30274,7 +30457,7 @@
             <p:cNvPr id="64" name="Rectangle 58">
               <a:extLst>
                 <a:ext uri="{FF2B5EF4-FFF2-40B4-BE49-F238E27FC236}">
-                  <a16:creationId xmlns:a16="http://schemas.microsoft.com/office/drawing/2014/main" xmlns="" id="{A162A79F-F87A-4C1D-83FA-B4170D0694FE}"/>
+                  <a16:creationId xmlns="" xmlns:a16="http://schemas.microsoft.com/office/drawing/2014/main" id="{A162A79F-F87A-4C1D-83FA-B4170D0694FE}"/>
                 </a:ext>
               </a:extLst>
             </p:cNvPr>
@@ -30297,14 +30480,14 @@
             </a:ln>
             <a:extLst>
               <a:ext uri="{909E8E84-426E-40DD-AFC4-6F175D3DCCD1}">
-                <a14:hiddenFill xmlns:a14="http://schemas.microsoft.com/office/drawing/2010/main" xmlns="">
+                <a14:hiddenFill xmlns="" xmlns:a14="http://schemas.microsoft.com/office/drawing/2010/main">
                   <a:solidFill>
                     <a:srgbClr val="FFFFFF"/>
                   </a:solidFill>
                 </a14:hiddenFill>
               </a:ext>
               <a:ext uri="{91240B29-F687-4F45-9708-019B960494DF}">
-                <a14:hiddenLine xmlns:a14="http://schemas.microsoft.com/office/drawing/2010/main" xmlns="" w="9525">
+                <a14:hiddenLine xmlns="" xmlns:a14="http://schemas.microsoft.com/office/drawing/2010/main" w="9525">
                   <a:solidFill>
                     <a:srgbClr val="000000"/>
                   </a:solidFill>
@@ -30459,7 +30642,7 @@
             <p:cNvPr id="65" name="Picture 59">
               <a:extLst>
                 <a:ext uri="{FF2B5EF4-FFF2-40B4-BE49-F238E27FC236}">
-                  <a16:creationId xmlns:a16="http://schemas.microsoft.com/office/drawing/2014/main" xmlns="" id="{26CCE083-8DA8-4F18-A8D2-297A51A9AB8A}"/>
+                  <a16:creationId xmlns="" xmlns:a16="http://schemas.microsoft.com/office/drawing/2014/main" id="{26CCE083-8DA8-4F18-A8D2-297A51A9AB8A}"/>
                 </a:ext>
               </a:extLst>
             </p:cNvPr>
@@ -30482,14 +30665,14 @@
             </a:ln>
             <a:extLst>
               <a:ext uri="{909E8E84-426E-40DD-AFC4-6F175D3DCCD1}">
-                <a14:hiddenFill xmlns:a14="http://schemas.microsoft.com/office/drawing/2010/main" xmlns="">
+                <a14:hiddenFill xmlns="" xmlns:a14="http://schemas.microsoft.com/office/drawing/2010/main">
                   <a:solidFill>
                     <a:srgbClr val="FFFFFF"/>
                   </a:solidFill>
                 </a14:hiddenFill>
               </a:ext>
               <a:ext uri="{91240B29-F687-4F45-9708-019B960494DF}">
-                <a14:hiddenLine xmlns:a14="http://schemas.microsoft.com/office/drawing/2010/main" xmlns="" w="9525">
+                <a14:hiddenLine xmlns="" xmlns:a14="http://schemas.microsoft.com/office/drawing/2010/main" w="9525">
                   <a:solidFill>
                     <a:srgbClr val="000000"/>
                   </a:solidFill>
@@ -30513,7 +30696,7 @@
             <p:cNvPr id="66" name="Rectangle 60">
               <a:extLst>
                 <a:ext uri="{FF2B5EF4-FFF2-40B4-BE49-F238E27FC236}">
-                  <a16:creationId xmlns:a16="http://schemas.microsoft.com/office/drawing/2014/main" xmlns="" id="{381285B1-6002-42C2-8AC6-C4372AB6EFC0}"/>
+                  <a16:creationId xmlns="" xmlns:a16="http://schemas.microsoft.com/office/drawing/2014/main" id="{381285B1-6002-42C2-8AC6-C4372AB6EFC0}"/>
                 </a:ext>
               </a:extLst>
             </p:cNvPr>
@@ -30536,14 +30719,14 @@
             </a:ln>
             <a:extLst>
               <a:ext uri="{909E8E84-426E-40DD-AFC4-6F175D3DCCD1}">
-                <a14:hiddenFill xmlns:a14="http://schemas.microsoft.com/office/drawing/2010/main" xmlns="">
+                <a14:hiddenFill xmlns="" xmlns:a14="http://schemas.microsoft.com/office/drawing/2010/main">
                   <a:solidFill>
                     <a:srgbClr val="FFFFFF"/>
                   </a:solidFill>
                 </a14:hiddenFill>
               </a:ext>
               <a:ext uri="{91240B29-F687-4F45-9708-019B960494DF}">
-                <a14:hiddenLine xmlns:a14="http://schemas.microsoft.com/office/drawing/2010/main" xmlns="" w="9525">
+                <a14:hiddenLine xmlns="" xmlns:a14="http://schemas.microsoft.com/office/drawing/2010/main" w="9525">
                   <a:solidFill>
                     <a:srgbClr val="000000"/>
                   </a:solidFill>
@@ -30688,7 +30871,7 @@
             <p:cNvPr id="67" name="Freeform 61">
               <a:extLst>
                 <a:ext uri="{FF2B5EF4-FFF2-40B4-BE49-F238E27FC236}">
-                  <a16:creationId xmlns:a16="http://schemas.microsoft.com/office/drawing/2014/main" xmlns="" id="{7D4B072E-77A0-46C3-BDEC-321D2F354FFE}"/>
+                  <a16:creationId xmlns="" xmlns:a16="http://schemas.microsoft.com/office/drawing/2014/main" id="{7D4B072E-77A0-46C3-BDEC-321D2F354FFE}"/>
                 </a:ext>
               </a:extLst>
             </p:cNvPr>
@@ -30782,7 +30965,7 @@
             </a:ln>
             <a:extLst>
               <a:ext uri="{91240B29-F687-4F45-9708-019B960494DF}">
-                <a14:hiddenLine xmlns:a14="http://schemas.microsoft.com/office/drawing/2010/main" xmlns="" w="9525">
+                <a14:hiddenLine xmlns="" xmlns:a14="http://schemas.microsoft.com/office/drawing/2010/main" w="9525">
                   <a:solidFill>
                     <a:srgbClr val="000000"/>
                   </a:solidFill>
@@ -30912,7 +31095,7 @@
             <p:cNvPr id="68" name="Line 62">
               <a:extLst>
                 <a:ext uri="{FF2B5EF4-FFF2-40B4-BE49-F238E27FC236}">
-                  <a16:creationId xmlns:a16="http://schemas.microsoft.com/office/drawing/2014/main" xmlns="" id="{BA63C904-5B63-4EBD-80FA-4DE6B82D69E1}"/>
+                  <a16:creationId xmlns="" xmlns:a16="http://schemas.microsoft.com/office/drawing/2014/main" id="{BA63C904-5B63-4EBD-80FA-4DE6B82D69E1}"/>
                 </a:ext>
               </a:extLst>
             </p:cNvPr>
@@ -30940,7 +31123,7 @@
             </a:ln>
             <a:extLst>
               <a:ext uri="{909E8E84-426E-40DD-AFC4-6F175D3DCCD1}">
-                <a14:hiddenFill xmlns:a14="http://schemas.microsoft.com/office/drawing/2010/main" xmlns="">
+                <a14:hiddenFill xmlns="" xmlns:a14="http://schemas.microsoft.com/office/drawing/2010/main">
                   <a:noFill/>
                 </a14:hiddenFill>
               </a:ext>
@@ -30959,7 +31142,7 @@
             <p:cNvPr id="69" name="Line 63">
               <a:extLst>
                 <a:ext uri="{FF2B5EF4-FFF2-40B4-BE49-F238E27FC236}">
-                  <a16:creationId xmlns:a16="http://schemas.microsoft.com/office/drawing/2014/main" xmlns="" id="{EB09BB23-6F47-48C9-A0DA-8606A1C6FFDD}"/>
+                  <a16:creationId xmlns="" xmlns:a16="http://schemas.microsoft.com/office/drawing/2014/main" id="{EB09BB23-6F47-48C9-A0DA-8606A1C6FFDD}"/>
                 </a:ext>
               </a:extLst>
             </p:cNvPr>
@@ -30987,7 +31170,7 @@
             </a:ln>
             <a:extLst>
               <a:ext uri="{909E8E84-426E-40DD-AFC4-6F175D3DCCD1}">
-                <a14:hiddenFill xmlns:a14="http://schemas.microsoft.com/office/drawing/2010/main" xmlns="">
+                <a14:hiddenFill xmlns="" xmlns:a14="http://schemas.microsoft.com/office/drawing/2010/main">
                   <a:noFill/>
                 </a14:hiddenFill>
               </a:ext>
@@ -31006,7 +31189,7 @@
             <p:cNvPr id="70" name="Rectangle 64">
               <a:extLst>
                 <a:ext uri="{FF2B5EF4-FFF2-40B4-BE49-F238E27FC236}">
-                  <a16:creationId xmlns:a16="http://schemas.microsoft.com/office/drawing/2014/main" xmlns="" id="{5F73C487-30E6-40BB-8440-BCA004F6E0C9}"/>
+                  <a16:creationId xmlns="" xmlns:a16="http://schemas.microsoft.com/office/drawing/2014/main" id="{5F73C487-30E6-40BB-8440-BCA004F6E0C9}"/>
                 </a:ext>
               </a:extLst>
             </p:cNvPr>
@@ -31029,14 +31212,14 @@
             </a:ln>
             <a:extLst>
               <a:ext uri="{909E8E84-426E-40DD-AFC4-6F175D3DCCD1}">
-                <a14:hiddenFill xmlns:a14="http://schemas.microsoft.com/office/drawing/2010/main" xmlns="">
+                <a14:hiddenFill xmlns="" xmlns:a14="http://schemas.microsoft.com/office/drawing/2010/main">
                   <a:solidFill>
                     <a:srgbClr val="FFFFFF"/>
                   </a:solidFill>
                 </a14:hiddenFill>
               </a:ext>
               <a:ext uri="{91240B29-F687-4F45-9708-019B960494DF}">
-                <a14:hiddenLine xmlns:a14="http://schemas.microsoft.com/office/drawing/2010/main" xmlns="" w="9525">
+                <a14:hiddenLine xmlns="" xmlns:a14="http://schemas.microsoft.com/office/drawing/2010/main" w="9525">
                   <a:solidFill>
                     <a:srgbClr val="000000"/>
                   </a:solidFill>
@@ -31181,7 +31364,7 @@
             <p:cNvPr id="71" name="Rectangle 65">
               <a:extLst>
                 <a:ext uri="{FF2B5EF4-FFF2-40B4-BE49-F238E27FC236}">
-                  <a16:creationId xmlns:a16="http://schemas.microsoft.com/office/drawing/2014/main" xmlns="" id="{530EBF1B-24C2-490C-8EB8-7B25B33002CA}"/>
+                  <a16:creationId xmlns="" xmlns:a16="http://schemas.microsoft.com/office/drawing/2014/main" id="{530EBF1B-24C2-490C-8EB8-7B25B33002CA}"/>
                 </a:ext>
               </a:extLst>
             </p:cNvPr>
@@ -31204,14 +31387,14 @@
             </a:ln>
             <a:extLst>
               <a:ext uri="{909E8E84-426E-40DD-AFC4-6F175D3DCCD1}">
-                <a14:hiddenFill xmlns:a14="http://schemas.microsoft.com/office/drawing/2010/main" xmlns="">
+                <a14:hiddenFill xmlns="" xmlns:a14="http://schemas.microsoft.com/office/drawing/2010/main">
                   <a:solidFill>
                     <a:srgbClr val="FFFFFF"/>
                   </a:solidFill>
                 </a14:hiddenFill>
               </a:ext>
               <a:ext uri="{91240B29-F687-4F45-9708-019B960494DF}">
-                <a14:hiddenLine xmlns:a14="http://schemas.microsoft.com/office/drawing/2010/main" xmlns="" w="9525">
+                <a14:hiddenLine xmlns="" xmlns:a14="http://schemas.microsoft.com/office/drawing/2010/main" w="9525">
                   <a:solidFill>
                     <a:srgbClr val="000000"/>
                   </a:solidFill>
@@ -31366,7 +31549,7 @@
             <p:cNvPr id="72" name="Rectangle 66">
               <a:extLst>
                 <a:ext uri="{FF2B5EF4-FFF2-40B4-BE49-F238E27FC236}">
-                  <a16:creationId xmlns:a16="http://schemas.microsoft.com/office/drawing/2014/main" xmlns="" id="{7FC31FC1-7672-47D3-A8A0-35F52725F007}"/>
+                  <a16:creationId xmlns="" xmlns:a16="http://schemas.microsoft.com/office/drawing/2014/main" id="{7FC31FC1-7672-47D3-A8A0-35F52725F007}"/>
                 </a:ext>
               </a:extLst>
             </p:cNvPr>
@@ -31389,14 +31572,14 @@
             </a:ln>
             <a:extLst>
               <a:ext uri="{909E8E84-426E-40DD-AFC4-6F175D3DCCD1}">
-                <a14:hiddenFill xmlns:a14="http://schemas.microsoft.com/office/drawing/2010/main" xmlns="">
+                <a14:hiddenFill xmlns="" xmlns:a14="http://schemas.microsoft.com/office/drawing/2010/main">
                   <a:solidFill>
                     <a:srgbClr val="FFFFFF"/>
                   </a:solidFill>
                 </a14:hiddenFill>
               </a:ext>
               <a:ext uri="{91240B29-F687-4F45-9708-019B960494DF}">
-                <a14:hiddenLine xmlns:a14="http://schemas.microsoft.com/office/drawing/2010/main" xmlns="" w="9525">
+                <a14:hiddenLine xmlns="" xmlns:a14="http://schemas.microsoft.com/office/drawing/2010/main" w="9525">
                   <a:solidFill>
                     <a:srgbClr val="000000"/>
                   </a:solidFill>
@@ -31541,7 +31724,7 @@
             <p:cNvPr id="73" name="Freeform 67">
               <a:extLst>
                 <a:ext uri="{FF2B5EF4-FFF2-40B4-BE49-F238E27FC236}">
-                  <a16:creationId xmlns:a16="http://schemas.microsoft.com/office/drawing/2014/main" xmlns="" id="{21E0B936-C61D-4D2A-8D45-807BC73ECE3D}"/>
+                  <a16:creationId xmlns="" xmlns:a16="http://schemas.microsoft.com/office/drawing/2014/main" id="{21E0B936-C61D-4D2A-8D45-807BC73ECE3D}"/>
                 </a:ext>
               </a:extLst>
             </p:cNvPr>
@@ -31637,7 +31820,7 @@
             </a:ln>
             <a:extLst>
               <a:ext uri="{909E8E84-426E-40DD-AFC4-6F175D3DCCD1}">
-                <a14:hiddenFill xmlns:a14="http://schemas.microsoft.com/office/drawing/2010/main" xmlns="">
+                <a14:hiddenFill xmlns="" xmlns:a14="http://schemas.microsoft.com/office/drawing/2010/main">
                   <a:solidFill>
                     <a:srgbClr val="FFFFFF"/>
                   </a:solidFill>
@@ -31764,7 +31947,7 @@
             <p:cNvPr id="74" name="Line 68">
               <a:extLst>
                 <a:ext uri="{FF2B5EF4-FFF2-40B4-BE49-F238E27FC236}">
-                  <a16:creationId xmlns:a16="http://schemas.microsoft.com/office/drawing/2014/main" xmlns="" id="{601B6AE3-AE7D-4185-8060-34539AC2CD07}"/>
+                  <a16:creationId xmlns="" xmlns:a16="http://schemas.microsoft.com/office/drawing/2014/main" id="{601B6AE3-AE7D-4185-8060-34539AC2CD07}"/>
                 </a:ext>
               </a:extLst>
             </p:cNvPr>
@@ -31792,7 +31975,7 @@
             </a:ln>
             <a:extLst>
               <a:ext uri="{909E8E84-426E-40DD-AFC4-6F175D3DCCD1}">
-                <a14:hiddenFill xmlns:a14="http://schemas.microsoft.com/office/drawing/2010/main" xmlns="">
+                <a14:hiddenFill xmlns="" xmlns:a14="http://schemas.microsoft.com/office/drawing/2010/main">
                   <a:noFill/>
                 </a14:hiddenFill>
               </a:ext>
@@ -31811,7 +31994,7 @@
             <p:cNvPr id="75" name="Line 69">
               <a:extLst>
                 <a:ext uri="{FF2B5EF4-FFF2-40B4-BE49-F238E27FC236}">
-                  <a16:creationId xmlns:a16="http://schemas.microsoft.com/office/drawing/2014/main" xmlns="" id="{9FF99BDE-100C-4CD0-92A8-0196851916F2}"/>
+                  <a16:creationId xmlns="" xmlns:a16="http://schemas.microsoft.com/office/drawing/2014/main" id="{9FF99BDE-100C-4CD0-92A8-0196851916F2}"/>
                 </a:ext>
               </a:extLst>
             </p:cNvPr>
@@ -31839,7 +32022,7 @@
             </a:ln>
             <a:extLst>
               <a:ext uri="{909E8E84-426E-40DD-AFC4-6F175D3DCCD1}">
-                <a14:hiddenFill xmlns:a14="http://schemas.microsoft.com/office/drawing/2010/main" xmlns="">
+                <a14:hiddenFill xmlns="" xmlns:a14="http://schemas.microsoft.com/office/drawing/2010/main">
                   <a:noFill/>
                 </a14:hiddenFill>
               </a:ext>
@@ -31858,7 +32041,7 @@
             <p:cNvPr id="76" name="Freeform 70">
               <a:extLst>
                 <a:ext uri="{FF2B5EF4-FFF2-40B4-BE49-F238E27FC236}">
-                  <a16:creationId xmlns:a16="http://schemas.microsoft.com/office/drawing/2014/main" xmlns="" id="{B35F1851-EE14-41DE-9D50-35CA4A4FEE36}"/>
+                  <a16:creationId xmlns="" xmlns:a16="http://schemas.microsoft.com/office/drawing/2014/main" id="{B35F1851-EE14-41DE-9D50-35CA4A4FEE36}"/>
                 </a:ext>
               </a:extLst>
             </p:cNvPr>
@@ -31952,7 +32135,7 @@
             </a:ln>
             <a:extLst>
               <a:ext uri="{91240B29-F687-4F45-9708-019B960494DF}">
-                <a14:hiddenLine xmlns:a14="http://schemas.microsoft.com/office/drawing/2010/main" xmlns="" w="9525">
+                <a14:hiddenLine xmlns="" xmlns:a14="http://schemas.microsoft.com/office/drawing/2010/main" w="9525">
                   <a:solidFill>
                     <a:srgbClr val="000000"/>
                   </a:solidFill>
@@ -32082,7 +32265,7 @@
             <p:cNvPr id="77" name="Line 71">
               <a:extLst>
                 <a:ext uri="{FF2B5EF4-FFF2-40B4-BE49-F238E27FC236}">
-                  <a16:creationId xmlns:a16="http://schemas.microsoft.com/office/drawing/2014/main" xmlns="" id="{EC99A423-71C7-4D94-AC4C-FD3F8BD8CB80}"/>
+                  <a16:creationId xmlns="" xmlns:a16="http://schemas.microsoft.com/office/drawing/2014/main" id="{EC99A423-71C7-4D94-AC4C-FD3F8BD8CB80}"/>
                 </a:ext>
               </a:extLst>
             </p:cNvPr>
@@ -32110,7 +32293,7 @@
             </a:ln>
             <a:extLst>
               <a:ext uri="{909E8E84-426E-40DD-AFC4-6F175D3DCCD1}">
-                <a14:hiddenFill xmlns:a14="http://schemas.microsoft.com/office/drawing/2010/main" xmlns="">
+                <a14:hiddenFill xmlns="" xmlns:a14="http://schemas.microsoft.com/office/drawing/2010/main">
                   <a:noFill/>
                 </a14:hiddenFill>
               </a:ext>
@@ -32129,7 +32312,7 @@
             <p:cNvPr id="78" name="Line 72">
               <a:extLst>
                 <a:ext uri="{FF2B5EF4-FFF2-40B4-BE49-F238E27FC236}">
-                  <a16:creationId xmlns:a16="http://schemas.microsoft.com/office/drawing/2014/main" xmlns="" id="{566CFC43-FF3C-4613-A184-8A931A28E828}"/>
+                  <a16:creationId xmlns="" xmlns:a16="http://schemas.microsoft.com/office/drawing/2014/main" id="{566CFC43-FF3C-4613-A184-8A931A28E828}"/>
                 </a:ext>
               </a:extLst>
             </p:cNvPr>
@@ -32157,7 +32340,7 @@
             </a:ln>
             <a:extLst>
               <a:ext uri="{909E8E84-426E-40DD-AFC4-6F175D3DCCD1}">
-                <a14:hiddenFill xmlns:a14="http://schemas.microsoft.com/office/drawing/2010/main" xmlns="">
+                <a14:hiddenFill xmlns="" xmlns:a14="http://schemas.microsoft.com/office/drawing/2010/main">
                   <a:noFill/>
                 </a14:hiddenFill>
               </a:ext>
@@ -32176,7 +32359,7 @@
             <p:cNvPr id="79" name="Rectangle 73">
               <a:extLst>
                 <a:ext uri="{FF2B5EF4-FFF2-40B4-BE49-F238E27FC236}">
-                  <a16:creationId xmlns:a16="http://schemas.microsoft.com/office/drawing/2014/main" xmlns="" id="{B1B6BF7E-4BD1-4F8B-80B5-937F599A2032}"/>
+                  <a16:creationId xmlns="" xmlns:a16="http://schemas.microsoft.com/office/drawing/2014/main" id="{B1B6BF7E-4BD1-4F8B-80B5-937F599A2032}"/>
                 </a:ext>
               </a:extLst>
             </p:cNvPr>
@@ -32199,14 +32382,14 @@
             </a:ln>
             <a:extLst>
               <a:ext uri="{909E8E84-426E-40DD-AFC4-6F175D3DCCD1}">
-                <a14:hiddenFill xmlns:a14="http://schemas.microsoft.com/office/drawing/2010/main" xmlns="">
+                <a14:hiddenFill xmlns="" xmlns:a14="http://schemas.microsoft.com/office/drawing/2010/main">
                   <a:solidFill>
                     <a:srgbClr val="FFFFFF"/>
                   </a:solidFill>
                 </a14:hiddenFill>
               </a:ext>
               <a:ext uri="{91240B29-F687-4F45-9708-019B960494DF}">
-                <a14:hiddenLine xmlns:a14="http://schemas.microsoft.com/office/drawing/2010/main" xmlns="" w="9525">
+                <a14:hiddenLine xmlns="" xmlns:a14="http://schemas.microsoft.com/office/drawing/2010/main" w="9525">
                   <a:solidFill>
                     <a:srgbClr val="000000"/>
                   </a:solidFill>
@@ -32351,7 +32534,7 @@
             <p:cNvPr id="80" name="Rectangle 74">
               <a:extLst>
                 <a:ext uri="{FF2B5EF4-FFF2-40B4-BE49-F238E27FC236}">
-                  <a16:creationId xmlns:a16="http://schemas.microsoft.com/office/drawing/2014/main" xmlns="" id="{6804DA3C-443E-4E74-99DB-5E4DF05207F4}"/>
+                  <a16:creationId xmlns="" xmlns:a16="http://schemas.microsoft.com/office/drawing/2014/main" id="{6804DA3C-443E-4E74-99DB-5E4DF05207F4}"/>
                 </a:ext>
               </a:extLst>
             </p:cNvPr>
@@ -32374,14 +32557,14 @@
             </a:ln>
             <a:extLst>
               <a:ext uri="{909E8E84-426E-40DD-AFC4-6F175D3DCCD1}">
-                <a14:hiddenFill xmlns:a14="http://schemas.microsoft.com/office/drawing/2010/main" xmlns="">
+                <a14:hiddenFill xmlns="" xmlns:a14="http://schemas.microsoft.com/office/drawing/2010/main">
                   <a:solidFill>
                     <a:srgbClr val="FFFFFF"/>
                   </a:solidFill>
                 </a14:hiddenFill>
               </a:ext>
               <a:ext uri="{91240B29-F687-4F45-9708-019B960494DF}">
-                <a14:hiddenLine xmlns:a14="http://schemas.microsoft.com/office/drawing/2010/main" xmlns="" w="9525">
+                <a14:hiddenLine xmlns="" xmlns:a14="http://schemas.microsoft.com/office/drawing/2010/main" w="9525">
                   <a:solidFill>
                     <a:srgbClr val="000000"/>
                   </a:solidFill>
@@ -32536,7 +32719,7 @@
             <p:cNvPr id="81" name="Rectangle 75">
               <a:extLst>
                 <a:ext uri="{FF2B5EF4-FFF2-40B4-BE49-F238E27FC236}">
-                  <a16:creationId xmlns:a16="http://schemas.microsoft.com/office/drawing/2014/main" xmlns="" id="{8EB2884E-D5A7-462F-BD2C-6816DFBE32EA}"/>
+                  <a16:creationId xmlns="" xmlns:a16="http://schemas.microsoft.com/office/drawing/2014/main" id="{8EB2884E-D5A7-462F-BD2C-6816DFBE32EA}"/>
                 </a:ext>
               </a:extLst>
             </p:cNvPr>
@@ -32559,14 +32742,14 @@
             </a:ln>
             <a:extLst>
               <a:ext uri="{909E8E84-426E-40DD-AFC4-6F175D3DCCD1}">
-                <a14:hiddenFill xmlns:a14="http://schemas.microsoft.com/office/drawing/2010/main" xmlns="">
+                <a14:hiddenFill xmlns="" xmlns:a14="http://schemas.microsoft.com/office/drawing/2010/main">
                   <a:solidFill>
                     <a:srgbClr val="FFFFFF"/>
                   </a:solidFill>
                 </a14:hiddenFill>
               </a:ext>
               <a:ext uri="{91240B29-F687-4F45-9708-019B960494DF}">
-                <a14:hiddenLine xmlns:a14="http://schemas.microsoft.com/office/drawing/2010/main" xmlns="" w="9525">
+                <a14:hiddenLine xmlns="" xmlns:a14="http://schemas.microsoft.com/office/drawing/2010/main" w="9525">
                   <a:solidFill>
                     <a:srgbClr val="000000"/>
                   </a:solidFill>
@@ -32721,7 +32904,7 @@
             <p:cNvPr id="82" name="Rectangle 76">
               <a:extLst>
                 <a:ext uri="{FF2B5EF4-FFF2-40B4-BE49-F238E27FC236}">
-                  <a16:creationId xmlns:a16="http://schemas.microsoft.com/office/drawing/2014/main" xmlns="" id="{96701043-64A3-4BA4-8939-BEB78350F03B}"/>
+                  <a16:creationId xmlns="" xmlns:a16="http://schemas.microsoft.com/office/drawing/2014/main" id="{96701043-64A3-4BA4-8939-BEB78350F03B}"/>
                 </a:ext>
               </a:extLst>
             </p:cNvPr>
@@ -32744,14 +32927,14 @@
             </a:ln>
             <a:extLst>
               <a:ext uri="{909E8E84-426E-40DD-AFC4-6F175D3DCCD1}">
-                <a14:hiddenFill xmlns:a14="http://schemas.microsoft.com/office/drawing/2010/main" xmlns="">
+                <a14:hiddenFill xmlns="" xmlns:a14="http://schemas.microsoft.com/office/drawing/2010/main">
                   <a:solidFill>
                     <a:srgbClr val="FFFFFF"/>
                   </a:solidFill>
                 </a14:hiddenFill>
               </a:ext>
               <a:ext uri="{91240B29-F687-4F45-9708-019B960494DF}">
-                <a14:hiddenLine xmlns:a14="http://schemas.microsoft.com/office/drawing/2010/main" xmlns="" w="9525">
+                <a14:hiddenLine xmlns="" xmlns:a14="http://schemas.microsoft.com/office/drawing/2010/main" w="9525">
                   <a:solidFill>
                     <a:srgbClr val="000000"/>
                   </a:solidFill>
@@ -32896,7 +33079,7 @@
             <p:cNvPr id="83" name="Freeform 77">
               <a:extLst>
                 <a:ext uri="{FF2B5EF4-FFF2-40B4-BE49-F238E27FC236}">
-                  <a16:creationId xmlns:a16="http://schemas.microsoft.com/office/drawing/2014/main" xmlns="" id="{F5C262A3-DECB-4324-8D21-29F10ABA4A91}"/>
+                  <a16:creationId xmlns="" xmlns:a16="http://schemas.microsoft.com/office/drawing/2014/main" id="{F5C262A3-DECB-4324-8D21-29F10ABA4A91}"/>
                 </a:ext>
               </a:extLst>
             </p:cNvPr>
@@ -32992,7 +33175,7 @@
             </a:ln>
             <a:extLst>
               <a:ext uri="{909E8E84-426E-40DD-AFC4-6F175D3DCCD1}">
-                <a14:hiddenFill xmlns:a14="http://schemas.microsoft.com/office/drawing/2010/main" xmlns="">
+                <a14:hiddenFill xmlns="" xmlns:a14="http://schemas.microsoft.com/office/drawing/2010/main">
                   <a:solidFill>
                     <a:srgbClr val="FFFFFF"/>
                   </a:solidFill>
@@ -33119,7 +33302,7 @@
             <p:cNvPr id="84" name="Line 78">
               <a:extLst>
                 <a:ext uri="{FF2B5EF4-FFF2-40B4-BE49-F238E27FC236}">
-                  <a16:creationId xmlns:a16="http://schemas.microsoft.com/office/drawing/2014/main" xmlns="" id="{B4AEA951-255A-4739-B4F6-E657E88F0E2C}"/>
+                  <a16:creationId xmlns="" xmlns:a16="http://schemas.microsoft.com/office/drawing/2014/main" id="{B4AEA951-255A-4739-B4F6-E657E88F0E2C}"/>
                 </a:ext>
               </a:extLst>
             </p:cNvPr>
@@ -33147,7 +33330,7 @@
             </a:ln>
             <a:extLst>
               <a:ext uri="{909E8E84-426E-40DD-AFC4-6F175D3DCCD1}">
-                <a14:hiddenFill xmlns:a14="http://schemas.microsoft.com/office/drawing/2010/main" xmlns="">
+                <a14:hiddenFill xmlns="" xmlns:a14="http://schemas.microsoft.com/office/drawing/2010/main">
                   <a:noFill/>
                 </a14:hiddenFill>
               </a:ext>
@@ -33166,7 +33349,7 @@
             <p:cNvPr id="85" name="Line 79">
               <a:extLst>
                 <a:ext uri="{FF2B5EF4-FFF2-40B4-BE49-F238E27FC236}">
-                  <a16:creationId xmlns:a16="http://schemas.microsoft.com/office/drawing/2014/main" xmlns="" id="{57BBF4A6-5992-4905-A741-C2CBF507208E}"/>
+                  <a16:creationId xmlns="" xmlns:a16="http://schemas.microsoft.com/office/drawing/2014/main" id="{57BBF4A6-5992-4905-A741-C2CBF507208E}"/>
                 </a:ext>
               </a:extLst>
             </p:cNvPr>
@@ -33194,7 +33377,7 @@
             </a:ln>
             <a:extLst>
               <a:ext uri="{909E8E84-426E-40DD-AFC4-6F175D3DCCD1}">
-                <a14:hiddenFill xmlns:a14="http://schemas.microsoft.com/office/drawing/2010/main" xmlns="">
+                <a14:hiddenFill xmlns="" xmlns:a14="http://schemas.microsoft.com/office/drawing/2010/main">
                   <a:noFill/>
                 </a14:hiddenFill>
               </a:ext>
@@ -33213,7 +33396,7 @@
             <p:cNvPr id="86" name="Line 80">
               <a:extLst>
                 <a:ext uri="{FF2B5EF4-FFF2-40B4-BE49-F238E27FC236}">
-                  <a16:creationId xmlns:a16="http://schemas.microsoft.com/office/drawing/2014/main" xmlns="" id="{ECF3121E-F3B5-4116-AD81-61119FC77ADF}"/>
+                  <a16:creationId xmlns="" xmlns:a16="http://schemas.microsoft.com/office/drawing/2014/main" id="{ECF3121E-F3B5-4116-AD81-61119FC77ADF}"/>
                 </a:ext>
               </a:extLst>
             </p:cNvPr>
@@ -33241,7 +33424,7 @@
             </a:ln>
             <a:extLst>
               <a:ext uri="{909E8E84-426E-40DD-AFC4-6F175D3DCCD1}">
-                <a14:hiddenFill xmlns:a14="http://schemas.microsoft.com/office/drawing/2010/main" xmlns="">
+                <a14:hiddenFill xmlns="" xmlns:a14="http://schemas.microsoft.com/office/drawing/2010/main">
                   <a:noFill/>
                 </a14:hiddenFill>
               </a:ext>
@@ -33260,7 +33443,7 @@
             <p:cNvPr id="87" name="Freeform 81">
               <a:extLst>
                 <a:ext uri="{FF2B5EF4-FFF2-40B4-BE49-F238E27FC236}">
-                  <a16:creationId xmlns:a16="http://schemas.microsoft.com/office/drawing/2014/main" xmlns="" id="{CFC5B53B-82D8-42CC-B26C-B7BD9416BDA9}"/>
+                  <a16:creationId xmlns="" xmlns:a16="http://schemas.microsoft.com/office/drawing/2014/main" id="{CFC5B53B-82D8-42CC-B26C-B7BD9416BDA9}"/>
                 </a:ext>
               </a:extLst>
             </p:cNvPr>
@@ -33336,7 +33519,7 @@
             </a:ln>
             <a:extLst>
               <a:ext uri="{91240B29-F687-4F45-9708-019B960494DF}">
-                <a14:hiddenLine xmlns:a14="http://schemas.microsoft.com/office/drawing/2010/main" xmlns="" w="9525">
+                <a14:hiddenLine xmlns="" xmlns:a14="http://schemas.microsoft.com/office/drawing/2010/main" w="9525">
                   <a:solidFill>
                     <a:srgbClr val="000000"/>
                   </a:solidFill>
@@ -33466,7 +33649,7 @@
             <p:cNvPr id="88" name="Freeform 82">
               <a:extLst>
                 <a:ext uri="{FF2B5EF4-FFF2-40B4-BE49-F238E27FC236}">
-                  <a16:creationId xmlns:a16="http://schemas.microsoft.com/office/drawing/2014/main" xmlns="" id="{00EDFEBE-28EC-4D53-82BF-73CF2815F6E2}"/>
+                  <a16:creationId xmlns="" xmlns:a16="http://schemas.microsoft.com/office/drawing/2014/main" id="{00EDFEBE-28EC-4D53-82BF-73CF2815F6E2}"/>
                 </a:ext>
               </a:extLst>
             </p:cNvPr>
@@ -33544,7 +33727,7 @@
             </a:ln>
             <a:extLst>
               <a:ext uri="{909E8E84-426E-40DD-AFC4-6F175D3DCCD1}">
-                <a14:hiddenFill xmlns:a14="http://schemas.microsoft.com/office/drawing/2010/main" xmlns="">
+                <a14:hiddenFill xmlns="" xmlns:a14="http://schemas.microsoft.com/office/drawing/2010/main">
                   <a:solidFill>
                     <a:srgbClr val="FFFFFF"/>
                   </a:solidFill>
@@ -33671,7 +33854,7 @@
             <p:cNvPr id="89" name="Line 83">
               <a:extLst>
                 <a:ext uri="{FF2B5EF4-FFF2-40B4-BE49-F238E27FC236}">
-                  <a16:creationId xmlns:a16="http://schemas.microsoft.com/office/drawing/2014/main" xmlns="" id="{67675962-2273-471C-AF99-EE518718C37D}"/>
+                  <a16:creationId xmlns="" xmlns:a16="http://schemas.microsoft.com/office/drawing/2014/main" id="{67675962-2273-471C-AF99-EE518718C37D}"/>
                 </a:ext>
               </a:extLst>
             </p:cNvPr>
@@ -33699,7 +33882,7 @@
             </a:ln>
             <a:extLst>
               <a:ext uri="{909E8E84-426E-40DD-AFC4-6F175D3DCCD1}">
-                <a14:hiddenFill xmlns:a14="http://schemas.microsoft.com/office/drawing/2010/main" xmlns="">
+                <a14:hiddenFill xmlns="" xmlns:a14="http://schemas.microsoft.com/office/drawing/2010/main">
                   <a:noFill/>
                 </a14:hiddenFill>
               </a:ext>
@@ -33718,7 +33901,7 @@
             <p:cNvPr id="90" name="Freeform 84">
               <a:extLst>
                 <a:ext uri="{FF2B5EF4-FFF2-40B4-BE49-F238E27FC236}">
-                  <a16:creationId xmlns:a16="http://schemas.microsoft.com/office/drawing/2014/main" xmlns="" id="{ED344115-28AD-4794-BF13-736E5333AFA4}"/>
+                  <a16:creationId xmlns="" xmlns:a16="http://schemas.microsoft.com/office/drawing/2014/main" id="{ED344115-28AD-4794-BF13-736E5333AFA4}"/>
                 </a:ext>
               </a:extLst>
             </p:cNvPr>
@@ -33794,7 +33977,7 @@
             </a:ln>
             <a:extLst>
               <a:ext uri="{91240B29-F687-4F45-9708-019B960494DF}">
-                <a14:hiddenLine xmlns:a14="http://schemas.microsoft.com/office/drawing/2010/main" xmlns="" w="9525">
+                <a14:hiddenLine xmlns="" xmlns:a14="http://schemas.microsoft.com/office/drawing/2010/main" w="9525">
                   <a:solidFill>
                     <a:srgbClr val="000000"/>
                   </a:solidFill>
@@ -33924,7 +34107,7 @@
             <p:cNvPr id="91" name="Freeform 85">
               <a:extLst>
                 <a:ext uri="{FF2B5EF4-FFF2-40B4-BE49-F238E27FC236}">
-                  <a16:creationId xmlns:a16="http://schemas.microsoft.com/office/drawing/2014/main" xmlns="" id="{8BB7CE6A-8E77-4F0E-807E-27659571490F}"/>
+                  <a16:creationId xmlns="" xmlns:a16="http://schemas.microsoft.com/office/drawing/2014/main" id="{8BB7CE6A-8E77-4F0E-807E-27659571490F}"/>
                 </a:ext>
               </a:extLst>
             </p:cNvPr>
@@ -34002,7 +34185,7 @@
             </a:ln>
             <a:extLst>
               <a:ext uri="{909E8E84-426E-40DD-AFC4-6F175D3DCCD1}">
-                <a14:hiddenFill xmlns:a14="http://schemas.microsoft.com/office/drawing/2010/main" xmlns="">
+                <a14:hiddenFill xmlns="" xmlns:a14="http://schemas.microsoft.com/office/drawing/2010/main">
                   <a:solidFill>
                     <a:srgbClr val="FFFFFF"/>
                   </a:solidFill>
@@ -34129,7 +34312,7 @@
             <p:cNvPr id="92" name="Line 86">
               <a:extLst>
                 <a:ext uri="{FF2B5EF4-FFF2-40B4-BE49-F238E27FC236}">
-                  <a16:creationId xmlns:a16="http://schemas.microsoft.com/office/drawing/2014/main" xmlns="" id="{D3BED51B-6A0A-4623-8930-023F325E9876}"/>
+                  <a16:creationId xmlns="" xmlns:a16="http://schemas.microsoft.com/office/drawing/2014/main" id="{D3BED51B-6A0A-4623-8930-023F325E9876}"/>
                 </a:ext>
               </a:extLst>
             </p:cNvPr>
@@ -34157,7 +34340,7 @@
             </a:ln>
             <a:extLst>
               <a:ext uri="{909E8E84-426E-40DD-AFC4-6F175D3DCCD1}">
-                <a14:hiddenFill xmlns:a14="http://schemas.microsoft.com/office/drawing/2010/main" xmlns="">
+                <a14:hiddenFill xmlns="" xmlns:a14="http://schemas.microsoft.com/office/drawing/2010/main">
                   <a:noFill/>
                 </a14:hiddenFill>
               </a:ext>
@@ -34176,7 +34359,7 @@
             <p:cNvPr id="93" name="Rectangle 87">
               <a:extLst>
                 <a:ext uri="{FF2B5EF4-FFF2-40B4-BE49-F238E27FC236}">
-                  <a16:creationId xmlns:a16="http://schemas.microsoft.com/office/drawing/2014/main" xmlns="" id="{64B70BE9-9E85-4538-9CBE-C42F1B7BCFC7}"/>
+                  <a16:creationId xmlns="" xmlns:a16="http://schemas.microsoft.com/office/drawing/2014/main" id="{64B70BE9-9E85-4538-9CBE-C42F1B7BCFC7}"/>
                 </a:ext>
               </a:extLst>
             </p:cNvPr>
@@ -34199,14 +34382,14 @@
             </a:ln>
             <a:extLst>
               <a:ext uri="{909E8E84-426E-40DD-AFC4-6F175D3DCCD1}">
-                <a14:hiddenFill xmlns:a14="http://schemas.microsoft.com/office/drawing/2010/main" xmlns="">
+                <a14:hiddenFill xmlns="" xmlns:a14="http://schemas.microsoft.com/office/drawing/2010/main">
                   <a:solidFill>
                     <a:srgbClr val="FFFFFF"/>
                   </a:solidFill>
                 </a14:hiddenFill>
               </a:ext>
               <a:ext uri="{91240B29-F687-4F45-9708-019B960494DF}">
-                <a14:hiddenLine xmlns:a14="http://schemas.microsoft.com/office/drawing/2010/main" xmlns="" w="9525">
+                <a14:hiddenLine xmlns="" xmlns:a14="http://schemas.microsoft.com/office/drawing/2010/main" w="9525">
                   <a:solidFill>
                     <a:srgbClr val="000000"/>
                   </a:solidFill>
@@ -34351,7 +34534,7 @@
             <p:cNvPr id="94" name="Rectangle 88">
               <a:extLst>
                 <a:ext uri="{FF2B5EF4-FFF2-40B4-BE49-F238E27FC236}">
-                  <a16:creationId xmlns:a16="http://schemas.microsoft.com/office/drawing/2014/main" xmlns="" id="{A3B7261E-AFA0-418B-A0A8-BB9F17436508}"/>
+                  <a16:creationId xmlns="" xmlns:a16="http://schemas.microsoft.com/office/drawing/2014/main" id="{A3B7261E-AFA0-418B-A0A8-BB9F17436508}"/>
                 </a:ext>
               </a:extLst>
             </p:cNvPr>
@@ -34374,14 +34557,14 @@
             </a:ln>
             <a:extLst>
               <a:ext uri="{909E8E84-426E-40DD-AFC4-6F175D3DCCD1}">
-                <a14:hiddenFill xmlns:a14="http://schemas.microsoft.com/office/drawing/2010/main" xmlns="">
+                <a14:hiddenFill xmlns="" xmlns:a14="http://schemas.microsoft.com/office/drawing/2010/main">
                   <a:solidFill>
                     <a:srgbClr val="FFFFFF"/>
                   </a:solidFill>
                 </a14:hiddenFill>
               </a:ext>
               <a:ext uri="{91240B29-F687-4F45-9708-019B960494DF}">
-                <a14:hiddenLine xmlns:a14="http://schemas.microsoft.com/office/drawing/2010/main" xmlns="" w="9525">
+                <a14:hiddenLine xmlns="" xmlns:a14="http://schemas.microsoft.com/office/drawing/2010/main" w="9525">
                   <a:solidFill>
                     <a:srgbClr val="000000"/>
                   </a:solidFill>
@@ -34526,7 +34709,7 @@
             <p:cNvPr id="95" name="Freeform 89">
               <a:extLst>
                 <a:ext uri="{FF2B5EF4-FFF2-40B4-BE49-F238E27FC236}">
-                  <a16:creationId xmlns:a16="http://schemas.microsoft.com/office/drawing/2014/main" xmlns="" id="{9094BABF-61FA-403D-9519-843D85187E96}"/>
+                  <a16:creationId xmlns="" xmlns:a16="http://schemas.microsoft.com/office/drawing/2014/main" id="{9094BABF-61FA-403D-9519-843D85187E96}"/>
                 </a:ext>
               </a:extLst>
             </p:cNvPr>
@@ -34595,7 +34778,7 @@
             </a:ln>
             <a:extLst>
               <a:ext uri="{909E8E84-426E-40DD-AFC4-6F175D3DCCD1}">
-                <a14:hiddenFill xmlns:a14="http://schemas.microsoft.com/office/drawing/2010/main" xmlns="">
+                <a14:hiddenFill xmlns="" xmlns:a14="http://schemas.microsoft.com/office/drawing/2010/main">
                   <a:solidFill>
                     <a:srgbClr val="FFFFFF"/>
                   </a:solidFill>
@@ -34722,7 +34905,7 @@
             <p:cNvPr id="96" name="Freeform 90">
               <a:extLst>
                 <a:ext uri="{FF2B5EF4-FFF2-40B4-BE49-F238E27FC236}">
-                  <a16:creationId xmlns:a16="http://schemas.microsoft.com/office/drawing/2014/main" xmlns="" id="{E7E6A3DB-18E5-4BEA-B6BD-FFF12A997B3E}"/>
+                  <a16:creationId xmlns="" xmlns:a16="http://schemas.microsoft.com/office/drawing/2014/main" id="{E7E6A3DB-18E5-4BEA-B6BD-FFF12A997B3E}"/>
                 </a:ext>
               </a:extLst>
             </p:cNvPr>
@@ -34807,7 +34990,7 @@
             </a:ln>
             <a:extLst>
               <a:ext uri="{91240B29-F687-4F45-9708-019B960494DF}">
-                <a14:hiddenLine xmlns:a14="http://schemas.microsoft.com/office/drawing/2010/main" xmlns="" w="9525">
+                <a14:hiddenLine xmlns="" xmlns:a14="http://schemas.microsoft.com/office/drawing/2010/main" w="9525">
                   <a:solidFill>
                     <a:srgbClr val="000000"/>
                   </a:solidFill>
@@ -34937,7 +35120,7 @@
             <p:cNvPr id="97" name="Freeform 91">
               <a:extLst>
                 <a:ext uri="{FF2B5EF4-FFF2-40B4-BE49-F238E27FC236}">
-                  <a16:creationId xmlns:a16="http://schemas.microsoft.com/office/drawing/2014/main" xmlns="" id="{43971CB7-39AC-4B87-892D-257DE42CD5D4}"/>
+                  <a16:creationId xmlns="" xmlns:a16="http://schemas.microsoft.com/office/drawing/2014/main" id="{43971CB7-39AC-4B87-892D-257DE42CD5D4}"/>
                 </a:ext>
               </a:extLst>
             </p:cNvPr>
@@ -35024,7 +35207,7 @@
             </a:ln>
             <a:extLst>
               <a:ext uri="{909E8E84-426E-40DD-AFC4-6F175D3DCCD1}">
-                <a14:hiddenFill xmlns:a14="http://schemas.microsoft.com/office/drawing/2010/main" xmlns="">
+                <a14:hiddenFill xmlns="" xmlns:a14="http://schemas.microsoft.com/office/drawing/2010/main">
                   <a:solidFill>
                     <a:srgbClr val="FFFFFF"/>
                   </a:solidFill>
@@ -35151,7 +35334,7 @@
             <p:cNvPr id="98" name="Line 92">
               <a:extLst>
                 <a:ext uri="{FF2B5EF4-FFF2-40B4-BE49-F238E27FC236}">
-                  <a16:creationId xmlns:a16="http://schemas.microsoft.com/office/drawing/2014/main" xmlns="" id="{53B5FEAE-2B17-47AB-81CF-F02ACDC93752}"/>
+                  <a16:creationId xmlns="" xmlns:a16="http://schemas.microsoft.com/office/drawing/2014/main" id="{53B5FEAE-2B17-47AB-81CF-F02ACDC93752}"/>
                 </a:ext>
               </a:extLst>
             </p:cNvPr>
@@ -35179,7 +35362,7 @@
             </a:ln>
             <a:extLst>
               <a:ext uri="{909E8E84-426E-40DD-AFC4-6F175D3DCCD1}">
-                <a14:hiddenFill xmlns:a14="http://schemas.microsoft.com/office/drawing/2010/main" xmlns="">
+                <a14:hiddenFill xmlns="" xmlns:a14="http://schemas.microsoft.com/office/drawing/2010/main">
                   <a:noFill/>
                 </a14:hiddenFill>
               </a:ext>
@@ -35198,7 +35381,7 @@
             <p:cNvPr id="99" name="Rectangle 93">
               <a:extLst>
                 <a:ext uri="{FF2B5EF4-FFF2-40B4-BE49-F238E27FC236}">
-                  <a16:creationId xmlns:a16="http://schemas.microsoft.com/office/drawing/2014/main" xmlns="" id="{DB2E26A4-666A-44CD-9B2B-66FBF8F826B8}"/>
+                  <a16:creationId xmlns="" xmlns:a16="http://schemas.microsoft.com/office/drawing/2014/main" id="{DB2E26A4-666A-44CD-9B2B-66FBF8F826B8}"/>
                 </a:ext>
               </a:extLst>
             </p:cNvPr>
@@ -35221,14 +35404,14 @@
             </a:ln>
             <a:extLst>
               <a:ext uri="{909E8E84-426E-40DD-AFC4-6F175D3DCCD1}">
-                <a14:hiddenFill xmlns:a14="http://schemas.microsoft.com/office/drawing/2010/main" xmlns="">
+                <a14:hiddenFill xmlns="" xmlns:a14="http://schemas.microsoft.com/office/drawing/2010/main">
                   <a:solidFill>
                     <a:srgbClr val="FFFFFF"/>
                   </a:solidFill>
                 </a14:hiddenFill>
               </a:ext>
               <a:ext uri="{91240B29-F687-4F45-9708-019B960494DF}">
-                <a14:hiddenLine xmlns:a14="http://schemas.microsoft.com/office/drawing/2010/main" xmlns="" w="9525">
+                <a14:hiddenLine xmlns="" xmlns:a14="http://schemas.microsoft.com/office/drawing/2010/main" w="9525">
                   <a:solidFill>
                     <a:srgbClr val="000000"/>
                   </a:solidFill>
@@ -35373,7 +35556,7 @@
             <p:cNvPr id="100" name="Freeform 94">
               <a:extLst>
                 <a:ext uri="{FF2B5EF4-FFF2-40B4-BE49-F238E27FC236}">
-                  <a16:creationId xmlns:a16="http://schemas.microsoft.com/office/drawing/2014/main" xmlns="" id="{25F6945C-8175-4A10-90E7-B3423DB3C577}"/>
+                  <a16:creationId xmlns="" xmlns:a16="http://schemas.microsoft.com/office/drawing/2014/main" id="{25F6945C-8175-4A10-90E7-B3423DB3C577}"/>
                 </a:ext>
               </a:extLst>
             </p:cNvPr>
@@ -35442,7 +35625,7 @@
             </a:ln>
             <a:extLst>
               <a:ext uri="{909E8E84-426E-40DD-AFC4-6F175D3DCCD1}">
-                <a14:hiddenFill xmlns:a14="http://schemas.microsoft.com/office/drawing/2010/main" xmlns="">
+                <a14:hiddenFill xmlns="" xmlns:a14="http://schemas.microsoft.com/office/drawing/2010/main">
                   <a:solidFill>
                     <a:srgbClr val="FFFFFF"/>
                   </a:solidFill>
@@ -35569,7 +35752,7 @@
             <p:cNvPr id="101" name="Line 95">
               <a:extLst>
                 <a:ext uri="{FF2B5EF4-FFF2-40B4-BE49-F238E27FC236}">
-                  <a16:creationId xmlns:a16="http://schemas.microsoft.com/office/drawing/2014/main" xmlns="" id="{BB1B9C83-CEBD-4D08-AC89-7EFE0B619478}"/>
+                  <a16:creationId xmlns="" xmlns:a16="http://schemas.microsoft.com/office/drawing/2014/main" id="{BB1B9C83-CEBD-4D08-AC89-7EFE0B619478}"/>
                 </a:ext>
               </a:extLst>
             </p:cNvPr>
@@ -35598,7 +35781,7 @@
             </a:ln>
             <a:extLst>
               <a:ext uri="{909E8E84-426E-40DD-AFC4-6F175D3DCCD1}">
-                <a14:hiddenFill xmlns:a14="http://schemas.microsoft.com/office/drawing/2010/main" xmlns="">
+                <a14:hiddenFill xmlns="" xmlns:a14="http://schemas.microsoft.com/office/drawing/2010/main">
                   <a:noFill/>
                 </a14:hiddenFill>
               </a:ext>
@@ -35617,7 +35800,7 @@
             <p:cNvPr id="102" name="Line 96">
               <a:extLst>
                 <a:ext uri="{FF2B5EF4-FFF2-40B4-BE49-F238E27FC236}">
-                  <a16:creationId xmlns:a16="http://schemas.microsoft.com/office/drawing/2014/main" xmlns="" id="{9DDB484A-7C50-4492-8E7E-3F4CA7CBBCD6}"/>
+                  <a16:creationId xmlns="" xmlns:a16="http://schemas.microsoft.com/office/drawing/2014/main" id="{9DDB484A-7C50-4492-8E7E-3F4CA7CBBCD6}"/>
                 </a:ext>
               </a:extLst>
             </p:cNvPr>
@@ -35646,7 +35829,7 @@
             </a:ln>
             <a:extLst>
               <a:ext uri="{909E8E84-426E-40DD-AFC4-6F175D3DCCD1}">
-                <a14:hiddenFill xmlns:a14="http://schemas.microsoft.com/office/drawing/2010/main" xmlns="">
+                <a14:hiddenFill xmlns="" xmlns:a14="http://schemas.microsoft.com/office/drawing/2010/main">
                   <a:noFill/>
                 </a14:hiddenFill>
               </a:ext>
@@ -35664,7 +35847,7 @@
     </p:spTree>
     <p:extLst>
       <p:ext uri="{BB962C8B-B14F-4D97-AF65-F5344CB8AC3E}">
-        <p14:creationId xmlns:p14="http://schemas.microsoft.com/office/powerpoint/2010/main" xmlns="" val="1364115844"/>
+        <p14:creationId xmlns="" xmlns:p14="http://schemas.microsoft.com/office/powerpoint/2010/main" val="1364115844"/>
       </p:ext>
     </p:extLst>
   </p:cSld>
@@ -35800,7 +35983,7 @@
           <p:cNvPr id="7" name="Text Box 3">
             <a:extLst>
               <a:ext uri="{FF2B5EF4-FFF2-40B4-BE49-F238E27FC236}">
-                <a16:creationId xmlns:a16="http://schemas.microsoft.com/office/drawing/2014/main" xmlns="" id="{052635B8-FF04-4AAD-BA70-E013E23F118C}"/>
+                <a16:creationId xmlns="" xmlns:a16="http://schemas.microsoft.com/office/drawing/2014/main" id="{052635B8-FF04-4AAD-BA70-E013E23F118C}"/>
               </a:ext>
             </a:extLst>
           </p:cNvPr>
@@ -35823,14 +36006,14 @@
           </a:ln>
           <a:extLst>
             <a:ext uri="{909E8E84-426E-40DD-AFC4-6F175D3DCCD1}">
-              <a14:hiddenFill xmlns:a14="http://schemas.microsoft.com/office/drawing/2010/main" xmlns="">
+              <a14:hiddenFill xmlns="" xmlns:a14="http://schemas.microsoft.com/office/drawing/2010/main">
                 <a:solidFill>
                   <a:srgbClr val="FFFFFF"/>
                 </a:solidFill>
               </a14:hiddenFill>
             </a:ext>
             <a:ext uri="{91240B29-F687-4F45-9708-019B960494DF}">
-              <a14:hiddenLine xmlns:a14="http://schemas.microsoft.com/office/drawing/2010/main" xmlns="" w="9525">
+              <a14:hiddenLine xmlns="" xmlns:a14="http://schemas.microsoft.com/office/drawing/2010/main" w="9525">
                 <a:solidFill>
                   <a:srgbClr val="000000"/>
                 </a:solidFill>
@@ -35965,7 +36148,7 @@
           <p:cNvPr id="8" name="Text Box 4">
             <a:extLst>
               <a:ext uri="{FF2B5EF4-FFF2-40B4-BE49-F238E27FC236}">
-                <a16:creationId xmlns:a16="http://schemas.microsoft.com/office/drawing/2014/main" xmlns="" id="{87C9EA58-2C16-4FAE-AA8C-162ED67DD600}"/>
+                <a16:creationId xmlns="" xmlns:a16="http://schemas.microsoft.com/office/drawing/2014/main" id="{87C9EA58-2C16-4FAE-AA8C-162ED67DD600}"/>
               </a:ext>
             </a:extLst>
           </p:cNvPr>
@@ -35988,14 +36171,14 @@
           </a:ln>
           <a:extLst>
             <a:ext uri="{909E8E84-426E-40DD-AFC4-6F175D3DCCD1}">
-              <a14:hiddenFill xmlns:a14="http://schemas.microsoft.com/office/drawing/2010/main" xmlns="">
+              <a14:hiddenFill xmlns="" xmlns:a14="http://schemas.microsoft.com/office/drawing/2010/main">
                 <a:solidFill>
                   <a:srgbClr val="FFFFFF"/>
                 </a:solidFill>
               </a14:hiddenFill>
             </a:ext>
             <a:ext uri="{91240B29-F687-4F45-9708-019B960494DF}">
-              <a14:hiddenLine xmlns:a14="http://schemas.microsoft.com/office/drawing/2010/main" xmlns="" w="9525">
+              <a14:hiddenLine xmlns="" xmlns:a14="http://schemas.microsoft.com/office/drawing/2010/main" w="9525">
                 <a:solidFill>
                   <a:srgbClr val="000000"/>
                 </a:solidFill>
@@ -36130,7 +36313,7 @@
           <p:cNvPr id="9" name="Line 5">
             <a:extLst>
               <a:ext uri="{FF2B5EF4-FFF2-40B4-BE49-F238E27FC236}">
-                <a16:creationId xmlns:a16="http://schemas.microsoft.com/office/drawing/2014/main" xmlns="" id="{B876D5F7-86B6-4181-9727-8A43B24854C1}"/>
+                <a16:creationId xmlns="" xmlns:a16="http://schemas.microsoft.com/office/drawing/2014/main" id="{B876D5F7-86B6-4181-9727-8A43B24854C1}"/>
               </a:ext>
             </a:extLst>
           </p:cNvPr>
@@ -36158,7 +36341,7 @@
           </a:ln>
           <a:extLst>
             <a:ext uri="{909E8E84-426E-40DD-AFC4-6F175D3DCCD1}">
-              <a14:hiddenFill xmlns:a14="http://schemas.microsoft.com/office/drawing/2010/main" xmlns="">
+              <a14:hiddenFill xmlns="" xmlns:a14="http://schemas.microsoft.com/office/drawing/2010/main">
                 <a:noFill/>
               </a14:hiddenFill>
             </a:ext>
@@ -36177,7 +36360,7 @@
           <p:cNvPr id="11" name="Rectangle 6">
             <a:extLst>
               <a:ext uri="{FF2B5EF4-FFF2-40B4-BE49-F238E27FC236}">
-                <a16:creationId xmlns:a16="http://schemas.microsoft.com/office/drawing/2014/main" xmlns="" id="{CEA89B5E-7190-4C11-AA89-5BE0D770D2E1}"/>
+                <a16:creationId xmlns="" xmlns:a16="http://schemas.microsoft.com/office/drawing/2014/main" id="{CEA89B5E-7190-4C11-AA89-5BE0D770D2E1}"/>
               </a:ext>
             </a:extLst>
           </p:cNvPr>
@@ -36205,7 +36388,7 @@
           </a:ln>
           <a:extLst>
             <a:ext uri="{909E8E84-426E-40DD-AFC4-6F175D3DCCD1}">
-              <a14:hiddenFill xmlns:a14="http://schemas.microsoft.com/office/drawing/2010/main" xmlns="">
+              <a14:hiddenFill xmlns="" xmlns:a14="http://schemas.microsoft.com/office/drawing/2010/main">
                 <a:solidFill>
                   <a:srgbClr val="FFFFFF"/>
                 </a:solidFill>
@@ -36333,7 +36516,7 @@
           <p:cNvPr id="13" name="Line 7">
             <a:extLst>
               <a:ext uri="{FF2B5EF4-FFF2-40B4-BE49-F238E27FC236}">
-                <a16:creationId xmlns:a16="http://schemas.microsoft.com/office/drawing/2014/main" xmlns="" id="{CEDF6C6F-6A27-4C62-835D-32D55474CC3C}"/>
+                <a16:creationId xmlns="" xmlns:a16="http://schemas.microsoft.com/office/drawing/2014/main" id="{CEDF6C6F-6A27-4C62-835D-32D55474CC3C}"/>
               </a:ext>
             </a:extLst>
           </p:cNvPr>
@@ -36361,7 +36544,7 @@
           </a:ln>
           <a:extLst>
             <a:ext uri="{909E8E84-426E-40DD-AFC4-6F175D3DCCD1}">
-              <a14:hiddenFill xmlns:a14="http://schemas.microsoft.com/office/drawing/2010/main" xmlns="">
+              <a14:hiddenFill xmlns="" xmlns:a14="http://schemas.microsoft.com/office/drawing/2010/main">
                 <a:noFill/>
               </a14:hiddenFill>
             </a:ext>
@@ -36380,7 +36563,7 @@
           <p:cNvPr id="14" name="Text Box 8">
             <a:extLst>
               <a:ext uri="{FF2B5EF4-FFF2-40B4-BE49-F238E27FC236}">
-                <a16:creationId xmlns:a16="http://schemas.microsoft.com/office/drawing/2014/main" xmlns="" id="{BDC3F89D-B787-4804-B787-5400B77F33B0}"/>
+                <a16:creationId xmlns="" xmlns:a16="http://schemas.microsoft.com/office/drawing/2014/main" id="{BDC3F89D-B787-4804-B787-5400B77F33B0}"/>
               </a:ext>
             </a:extLst>
           </p:cNvPr>
@@ -36403,14 +36586,14 @@
           </a:ln>
           <a:extLst>
             <a:ext uri="{909E8E84-426E-40DD-AFC4-6F175D3DCCD1}">
-              <a14:hiddenFill xmlns:a14="http://schemas.microsoft.com/office/drawing/2010/main" xmlns="">
+              <a14:hiddenFill xmlns="" xmlns:a14="http://schemas.microsoft.com/office/drawing/2010/main">
                 <a:solidFill>
                   <a:srgbClr val="FFFFFF"/>
                 </a:solidFill>
               </a14:hiddenFill>
             </a:ext>
             <a:ext uri="{91240B29-F687-4F45-9708-019B960494DF}">
-              <a14:hiddenLine xmlns:a14="http://schemas.microsoft.com/office/drawing/2010/main" xmlns="" w="9525">
+              <a14:hiddenLine xmlns="" xmlns:a14="http://schemas.microsoft.com/office/drawing/2010/main" w="9525">
                 <a:solidFill>
                   <a:srgbClr val="000000"/>
                 </a:solidFill>
@@ -36548,7 +36731,7 @@
           <p:cNvPr id="15" name="Group 9">
             <a:extLst>
               <a:ext uri="{FF2B5EF4-FFF2-40B4-BE49-F238E27FC236}">
-                <a16:creationId xmlns:a16="http://schemas.microsoft.com/office/drawing/2014/main" xmlns="" id="{A1946DA3-8E85-4A9A-BE29-302DD40D6C26}"/>
+                <a16:creationId xmlns="" xmlns:a16="http://schemas.microsoft.com/office/drawing/2014/main" id="{A1946DA3-8E85-4A9A-BE29-302DD40D6C26}"/>
               </a:ext>
             </a:extLst>
           </p:cNvPr>
@@ -36570,7 +36753,7 @@
             <p:cNvPr id="16" name="Rectangle 10">
               <a:extLst>
                 <a:ext uri="{FF2B5EF4-FFF2-40B4-BE49-F238E27FC236}">
-                  <a16:creationId xmlns:a16="http://schemas.microsoft.com/office/drawing/2014/main" xmlns="" id="{D54B7F98-293F-43BC-B354-95C6816D606D}"/>
+                  <a16:creationId xmlns="" xmlns:a16="http://schemas.microsoft.com/office/drawing/2014/main" id="{D54B7F98-293F-43BC-B354-95C6816D606D}"/>
                 </a:ext>
               </a:extLst>
             </p:cNvPr>
@@ -36598,7 +36781,7 @@
             </a:ln>
             <a:extLst>
               <a:ext uri="{909E8E84-426E-40DD-AFC4-6F175D3DCCD1}">
-                <a14:hiddenFill xmlns:a14="http://schemas.microsoft.com/office/drawing/2010/main" xmlns="">
+                <a14:hiddenFill xmlns="" xmlns:a14="http://schemas.microsoft.com/office/drawing/2010/main">
                   <a:solidFill>
                     <a:srgbClr val="FFFFFF"/>
                   </a:solidFill>
@@ -36725,7 +36908,7 @@
             <p:cNvPr id="17" name="Text Box 11">
               <a:extLst>
                 <a:ext uri="{FF2B5EF4-FFF2-40B4-BE49-F238E27FC236}">
-                  <a16:creationId xmlns:a16="http://schemas.microsoft.com/office/drawing/2014/main" xmlns="" id="{C2134652-7E84-4454-B6C4-F5200AFECE91}"/>
+                  <a16:creationId xmlns="" xmlns:a16="http://schemas.microsoft.com/office/drawing/2014/main" id="{C2134652-7E84-4454-B6C4-F5200AFECE91}"/>
                 </a:ext>
               </a:extLst>
             </p:cNvPr>
@@ -36748,14 +36931,14 @@
             </a:ln>
             <a:extLst>
               <a:ext uri="{909E8E84-426E-40DD-AFC4-6F175D3DCCD1}">
-                <a14:hiddenFill xmlns:a14="http://schemas.microsoft.com/office/drawing/2010/main" xmlns="">
+                <a14:hiddenFill xmlns="" xmlns:a14="http://schemas.microsoft.com/office/drawing/2010/main">
                   <a:solidFill>
                     <a:srgbClr val="FFFFFF"/>
                   </a:solidFill>
                 </a14:hiddenFill>
               </a:ext>
               <a:ext uri="{91240B29-F687-4F45-9708-019B960494DF}">
-                <a14:hiddenLine xmlns:a14="http://schemas.microsoft.com/office/drawing/2010/main" xmlns="" w="9525">
+                <a14:hiddenLine xmlns="" xmlns:a14="http://schemas.microsoft.com/office/drawing/2010/main" w="9525">
                   <a:solidFill>
                     <a:srgbClr val="000000"/>
                   </a:solidFill>
@@ -36893,7 +37076,7 @@
             <p:cNvPr id="18" name="Line 12">
               <a:extLst>
                 <a:ext uri="{FF2B5EF4-FFF2-40B4-BE49-F238E27FC236}">
-                  <a16:creationId xmlns:a16="http://schemas.microsoft.com/office/drawing/2014/main" xmlns="" id="{44935ACE-9505-451B-8847-098B6414303C}"/>
+                  <a16:creationId xmlns="" xmlns:a16="http://schemas.microsoft.com/office/drawing/2014/main" id="{44935ACE-9505-451B-8847-098B6414303C}"/>
                 </a:ext>
               </a:extLst>
             </p:cNvPr>
@@ -36921,7 +37104,7 @@
             </a:ln>
             <a:extLst>
               <a:ext uri="{909E8E84-426E-40DD-AFC4-6F175D3DCCD1}">
-                <a14:hiddenFill xmlns:a14="http://schemas.microsoft.com/office/drawing/2010/main" xmlns="">
+                <a14:hiddenFill xmlns="" xmlns:a14="http://schemas.microsoft.com/office/drawing/2010/main">
                   <a:noFill/>
                 </a14:hiddenFill>
               </a:ext>
@@ -36940,7 +37123,7 @@
             <p:cNvPr id="19" name="Text Box 13">
               <a:extLst>
                 <a:ext uri="{FF2B5EF4-FFF2-40B4-BE49-F238E27FC236}">
-                  <a16:creationId xmlns:a16="http://schemas.microsoft.com/office/drawing/2014/main" xmlns="" id="{C2DB3080-7B77-49D6-B1EA-F9971C46D486}"/>
+                  <a16:creationId xmlns="" xmlns:a16="http://schemas.microsoft.com/office/drawing/2014/main" id="{C2DB3080-7B77-49D6-B1EA-F9971C46D486}"/>
                 </a:ext>
               </a:extLst>
             </p:cNvPr>
@@ -36963,14 +37146,14 @@
             </a:ln>
             <a:extLst>
               <a:ext uri="{909E8E84-426E-40DD-AFC4-6F175D3DCCD1}">
-                <a14:hiddenFill xmlns:a14="http://schemas.microsoft.com/office/drawing/2010/main" xmlns="">
+                <a14:hiddenFill xmlns="" xmlns:a14="http://schemas.microsoft.com/office/drawing/2010/main">
                   <a:solidFill>
                     <a:srgbClr val="FFFFFF"/>
                   </a:solidFill>
                 </a14:hiddenFill>
               </a:ext>
               <a:ext uri="{91240B29-F687-4F45-9708-019B960494DF}">
-                <a14:hiddenLine xmlns:a14="http://schemas.microsoft.com/office/drawing/2010/main" xmlns="" w="9525">
+                <a14:hiddenLine xmlns="" xmlns:a14="http://schemas.microsoft.com/office/drawing/2010/main" w="9525">
                   <a:solidFill>
                     <a:srgbClr val="000000"/>
                   </a:solidFill>
@@ -37109,7 +37292,7 @@
           <p:cNvPr id="20" name="Line 14">
             <a:extLst>
               <a:ext uri="{FF2B5EF4-FFF2-40B4-BE49-F238E27FC236}">
-                <a16:creationId xmlns:a16="http://schemas.microsoft.com/office/drawing/2014/main" xmlns="" id="{99678679-07F6-4B16-B9B2-A6E4D2AF313F}"/>
+                <a16:creationId xmlns="" xmlns:a16="http://schemas.microsoft.com/office/drawing/2014/main" id="{99678679-07F6-4B16-B9B2-A6E4D2AF313F}"/>
               </a:ext>
             </a:extLst>
           </p:cNvPr>
@@ -37137,7 +37320,7 @@
           </a:ln>
           <a:extLst>
             <a:ext uri="{909E8E84-426E-40DD-AFC4-6F175D3DCCD1}">
-              <a14:hiddenFill xmlns:a14="http://schemas.microsoft.com/office/drawing/2010/main" xmlns="">
+              <a14:hiddenFill xmlns="" xmlns:a14="http://schemas.microsoft.com/office/drawing/2010/main">
                 <a:noFill/>
               </a14:hiddenFill>
             </a:ext>
@@ -37156,7 +37339,7 @@
           <p:cNvPr id="21" name="AutoShape 15">
             <a:extLst>
               <a:ext uri="{FF2B5EF4-FFF2-40B4-BE49-F238E27FC236}">
-                <a16:creationId xmlns:a16="http://schemas.microsoft.com/office/drawing/2014/main" xmlns="" id="{D48D1082-3CDC-4395-A845-164E79713AF1}"/>
+                <a16:creationId xmlns="" xmlns:a16="http://schemas.microsoft.com/office/drawing/2014/main" id="{D48D1082-3CDC-4395-A845-164E79713AF1}"/>
               </a:ext>
             </a:extLst>
           </p:cNvPr>
@@ -37186,7 +37369,7 @@
           </a:ln>
           <a:extLst>
             <a:ext uri="{909E8E84-426E-40DD-AFC4-6F175D3DCCD1}">
-              <a14:hiddenFill xmlns:a14="http://schemas.microsoft.com/office/drawing/2010/main" xmlns="">
+              <a14:hiddenFill xmlns="" xmlns:a14="http://schemas.microsoft.com/office/drawing/2010/main">
                 <a:solidFill>
                   <a:srgbClr val="FFFFFF"/>
                 </a:solidFill>
@@ -37313,7 +37496,7 @@
           <p:cNvPr id="22" name="Line 16">
             <a:extLst>
               <a:ext uri="{FF2B5EF4-FFF2-40B4-BE49-F238E27FC236}">
-                <a16:creationId xmlns:a16="http://schemas.microsoft.com/office/drawing/2014/main" xmlns="" id="{DB8E1B6F-D089-4AF9-A421-A46CE556CBAB}"/>
+                <a16:creationId xmlns="" xmlns:a16="http://schemas.microsoft.com/office/drawing/2014/main" id="{DB8E1B6F-D089-4AF9-A421-A46CE556CBAB}"/>
               </a:ext>
             </a:extLst>
           </p:cNvPr>
@@ -37341,7 +37524,7 @@
           </a:ln>
           <a:extLst>
             <a:ext uri="{909E8E84-426E-40DD-AFC4-6F175D3DCCD1}">
-              <a14:hiddenFill xmlns:a14="http://schemas.microsoft.com/office/drawing/2010/main" xmlns="">
+              <a14:hiddenFill xmlns="" xmlns:a14="http://schemas.microsoft.com/office/drawing/2010/main">
                 <a:noFill/>
               </a14:hiddenFill>
             </a:ext>
@@ -37360,7 +37543,7 @@
           <p:cNvPr id="23" name="Text Box 17">
             <a:extLst>
               <a:ext uri="{FF2B5EF4-FFF2-40B4-BE49-F238E27FC236}">
-                <a16:creationId xmlns:a16="http://schemas.microsoft.com/office/drawing/2014/main" xmlns="" id="{D62D4455-61CE-4FA4-A7A3-E324F7E011D2}"/>
+                <a16:creationId xmlns="" xmlns:a16="http://schemas.microsoft.com/office/drawing/2014/main" id="{D62D4455-61CE-4FA4-A7A3-E324F7E011D2}"/>
               </a:ext>
             </a:extLst>
           </p:cNvPr>
@@ -37383,14 +37566,14 @@
           </a:ln>
           <a:extLst>
             <a:ext uri="{909E8E84-426E-40DD-AFC4-6F175D3DCCD1}">
-              <a14:hiddenFill xmlns:a14="http://schemas.microsoft.com/office/drawing/2010/main" xmlns="">
+              <a14:hiddenFill xmlns="" xmlns:a14="http://schemas.microsoft.com/office/drawing/2010/main">
                 <a:solidFill>
                   <a:srgbClr val="FFFFFF"/>
                 </a:solidFill>
               </a14:hiddenFill>
             </a:ext>
             <a:ext uri="{91240B29-F687-4F45-9708-019B960494DF}">
-              <a14:hiddenLine xmlns:a14="http://schemas.microsoft.com/office/drawing/2010/main" xmlns="" w="9525">
+              <a14:hiddenLine xmlns="" xmlns:a14="http://schemas.microsoft.com/office/drawing/2010/main" w="9525">
                 <a:solidFill>
                   <a:srgbClr val="000000"/>
                 </a:solidFill>
@@ -37568,7 +37751,7 @@
           <p:cNvPr id="24" name="Rectangle 18">
             <a:extLst>
               <a:ext uri="{FF2B5EF4-FFF2-40B4-BE49-F238E27FC236}">
-                <a16:creationId xmlns:a16="http://schemas.microsoft.com/office/drawing/2014/main" xmlns="" id="{6FEF1AD7-B009-4A17-80C3-940BD659EDB3}"/>
+                <a16:creationId xmlns="" xmlns:a16="http://schemas.microsoft.com/office/drawing/2014/main" id="{6FEF1AD7-B009-4A17-80C3-940BD659EDB3}"/>
               </a:ext>
             </a:extLst>
           </p:cNvPr>
@@ -37596,7 +37779,7 @@
           </a:ln>
           <a:extLst>
             <a:ext uri="{909E8E84-426E-40DD-AFC4-6F175D3DCCD1}">
-              <a14:hiddenFill xmlns:a14="http://schemas.microsoft.com/office/drawing/2010/main" xmlns="">
+              <a14:hiddenFill xmlns="" xmlns:a14="http://schemas.microsoft.com/office/drawing/2010/main">
                 <a:solidFill>
                   <a:srgbClr val="FFFFFF"/>
                 </a:solidFill>
@@ -37776,7 +37959,7 @@
           <p:cNvPr id="25" name="AutoShape 19">
             <a:extLst>
               <a:ext uri="{FF2B5EF4-FFF2-40B4-BE49-F238E27FC236}">
-                <a16:creationId xmlns:a16="http://schemas.microsoft.com/office/drawing/2014/main" xmlns="" id="{9471DF71-D342-4EE1-BDA6-55BC8908B26E}"/>
+                <a16:creationId xmlns="" xmlns:a16="http://schemas.microsoft.com/office/drawing/2014/main" id="{9471DF71-D342-4EE1-BDA6-55BC8908B26E}"/>
               </a:ext>
             </a:extLst>
           </p:cNvPr>
@@ -37806,7 +37989,7 @@
           </a:ln>
           <a:extLst>
             <a:ext uri="{909E8E84-426E-40DD-AFC4-6F175D3DCCD1}">
-              <a14:hiddenFill xmlns:a14="http://schemas.microsoft.com/office/drawing/2010/main" xmlns="">
+              <a14:hiddenFill xmlns="" xmlns:a14="http://schemas.microsoft.com/office/drawing/2010/main">
                 <a:solidFill>
                   <a:srgbClr val="FFFFFF"/>
                 </a:solidFill>
@@ -37933,7 +38116,7 @@
           <p:cNvPr id="26" name="Line 20">
             <a:extLst>
               <a:ext uri="{FF2B5EF4-FFF2-40B4-BE49-F238E27FC236}">
-                <a16:creationId xmlns:a16="http://schemas.microsoft.com/office/drawing/2014/main" xmlns="" id="{3B44C30D-A008-44B8-B0D1-1009FD2E2916}"/>
+                <a16:creationId xmlns="" xmlns:a16="http://schemas.microsoft.com/office/drawing/2014/main" id="{3B44C30D-A008-44B8-B0D1-1009FD2E2916}"/>
               </a:ext>
             </a:extLst>
           </p:cNvPr>
@@ -37961,7 +38144,7 @@
           </a:ln>
           <a:extLst>
             <a:ext uri="{909E8E84-426E-40DD-AFC4-6F175D3DCCD1}">
-              <a14:hiddenFill xmlns:a14="http://schemas.microsoft.com/office/drawing/2010/main" xmlns="">
+              <a14:hiddenFill xmlns="" xmlns:a14="http://schemas.microsoft.com/office/drawing/2010/main">
                 <a:noFill/>
               </a14:hiddenFill>
             </a:ext>
@@ -37980,7 +38163,7 @@
           <p:cNvPr id="27" name="Line 21">
             <a:extLst>
               <a:ext uri="{FF2B5EF4-FFF2-40B4-BE49-F238E27FC236}">
-                <a16:creationId xmlns:a16="http://schemas.microsoft.com/office/drawing/2014/main" xmlns="" id="{83DCDBCD-D4EC-4F9E-A4CB-96980BBA8D4E}"/>
+                <a16:creationId xmlns="" xmlns:a16="http://schemas.microsoft.com/office/drawing/2014/main" id="{83DCDBCD-D4EC-4F9E-A4CB-96980BBA8D4E}"/>
               </a:ext>
             </a:extLst>
           </p:cNvPr>
@@ -38008,7 +38191,7 @@
           </a:ln>
           <a:extLst>
             <a:ext uri="{909E8E84-426E-40DD-AFC4-6F175D3DCCD1}">
-              <a14:hiddenFill xmlns:a14="http://schemas.microsoft.com/office/drawing/2010/main" xmlns="">
+              <a14:hiddenFill xmlns="" xmlns:a14="http://schemas.microsoft.com/office/drawing/2010/main">
                 <a:noFill/>
               </a14:hiddenFill>
             </a:ext>
@@ -38027,7 +38210,7 @@
           <p:cNvPr id="28" name="Oval 22">
             <a:extLst>
               <a:ext uri="{FF2B5EF4-FFF2-40B4-BE49-F238E27FC236}">
-                <a16:creationId xmlns:a16="http://schemas.microsoft.com/office/drawing/2014/main" xmlns="" id="{37F09700-3C11-40B6-BDB9-2F7B275A10E4}"/>
+                <a16:creationId xmlns="" xmlns:a16="http://schemas.microsoft.com/office/drawing/2014/main" id="{37F09700-3C11-40B6-BDB9-2F7B275A10E4}"/>
               </a:ext>
             </a:extLst>
           </p:cNvPr>
@@ -38055,7 +38238,7 @@
           </a:ln>
           <a:extLst>
             <a:ext uri="{909E8E84-426E-40DD-AFC4-6F175D3DCCD1}">
-              <a14:hiddenFill xmlns:a14="http://schemas.microsoft.com/office/drawing/2010/main" xmlns="">
+              <a14:hiddenFill xmlns="" xmlns:a14="http://schemas.microsoft.com/office/drawing/2010/main">
                 <a:solidFill>
                   <a:srgbClr val="FFFFFF"/>
                 </a:solidFill>
@@ -38182,7 +38365,7 @@
           <p:cNvPr id="29" name="Line 23">
             <a:extLst>
               <a:ext uri="{FF2B5EF4-FFF2-40B4-BE49-F238E27FC236}">
-                <a16:creationId xmlns:a16="http://schemas.microsoft.com/office/drawing/2014/main" xmlns="" id="{DE5B45BC-3E22-41FA-8AB8-627150FE76E4}"/>
+                <a16:creationId xmlns="" xmlns:a16="http://schemas.microsoft.com/office/drawing/2014/main" id="{DE5B45BC-3E22-41FA-8AB8-627150FE76E4}"/>
               </a:ext>
             </a:extLst>
           </p:cNvPr>
@@ -38210,7 +38393,7 @@
           </a:ln>
           <a:extLst>
             <a:ext uri="{909E8E84-426E-40DD-AFC4-6F175D3DCCD1}">
-              <a14:hiddenFill xmlns:a14="http://schemas.microsoft.com/office/drawing/2010/main" xmlns="">
+              <a14:hiddenFill xmlns="" xmlns:a14="http://schemas.microsoft.com/office/drawing/2010/main">
                 <a:noFill/>
               </a14:hiddenFill>
             </a:ext>
@@ -38229,7 +38412,7 @@
           <p:cNvPr id="30" name="AutoShape 24">
             <a:extLst>
               <a:ext uri="{FF2B5EF4-FFF2-40B4-BE49-F238E27FC236}">
-                <a16:creationId xmlns:a16="http://schemas.microsoft.com/office/drawing/2014/main" xmlns="" id="{E32C53D4-1CCD-4B66-9544-C46FA53C4253}"/>
+                <a16:creationId xmlns="" xmlns:a16="http://schemas.microsoft.com/office/drawing/2014/main" id="{E32C53D4-1CCD-4B66-9544-C46FA53C4253}"/>
               </a:ext>
             </a:extLst>
           </p:cNvPr>
@@ -38259,7 +38442,7 @@
           </a:ln>
           <a:extLst>
             <a:ext uri="{909E8E84-426E-40DD-AFC4-6F175D3DCCD1}">
-              <a14:hiddenFill xmlns:a14="http://schemas.microsoft.com/office/drawing/2010/main" xmlns="">
+              <a14:hiddenFill xmlns="" xmlns:a14="http://schemas.microsoft.com/office/drawing/2010/main">
                 <a:solidFill>
                   <a:srgbClr val="FFFFFF"/>
                 </a:solidFill>
@@ -38386,7 +38569,7 @@
           <p:cNvPr id="31" name="Text Box 25">
             <a:extLst>
               <a:ext uri="{FF2B5EF4-FFF2-40B4-BE49-F238E27FC236}">
-                <a16:creationId xmlns:a16="http://schemas.microsoft.com/office/drawing/2014/main" xmlns="" id="{1F9507D4-84C6-478D-B0B0-8A89E995D02B}"/>
+                <a16:creationId xmlns="" xmlns:a16="http://schemas.microsoft.com/office/drawing/2014/main" id="{1F9507D4-84C6-478D-B0B0-8A89E995D02B}"/>
               </a:ext>
             </a:extLst>
           </p:cNvPr>
@@ -38409,14 +38592,14 @@
           </a:ln>
           <a:extLst>
             <a:ext uri="{909E8E84-426E-40DD-AFC4-6F175D3DCCD1}">
-              <a14:hiddenFill xmlns:a14="http://schemas.microsoft.com/office/drawing/2010/main" xmlns="">
+              <a14:hiddenFill xmlns="" xmlns:a14="http://schemas.microsoft.com/office/drawing/2010/main">
                 <a:solidFill>
                   <a:srgbClr val="FFFFFF"/>
                 </a:solidFill>
               </a14:hiddenFill>
             </a:ext>
             <a:ext uri="{91240B29-F687-4F45-9708-019B960494DF}">
-              <a14:hiddenLine xmlns:a14="http://schemas.microsoft.com/office/drawing/2010/main" xmlns="" w="9525">
+              <a14:hiddenLine xmlns="" xmlns:a14="http://schemas.microsoft.com/office/drawing/2010/main" w="9525">
                 <a:solidFill>
                   <a:srgbClr val="000000"/>
                 </a:solidFill>
@@ -38574,7 +38757,7 @@
           <p:cNvPr id="32" name="Line 26">
             <a:extLst>
               <a:ext uri="{FF2B5EF4-FFF2-40B4-BE49-F238E27FC236}">
-                <a16:creationId xmlns:a16="http://schemas.microsoft.com/office/drawing/2014/main" xmlns="" id="{412804D5-7150-4C13-BAC9-55EBB682F21B}"/>
+                <a16:creationId xmlns="" xmlns:a16="http://schemas.microsoft.com/office/drawing/2014/main" id="{412804D5-7150-4C13-BAC9-55EBB682F21B}"/>
               </a:ext>
             </a:extLst>
           </p:cNvPr>
@@ -38602,7 +38785,7 @@
           </a:ln>
           <a:extLst>
             <a:ext uri="{909E8E84-426E-40DD-AFC4-6F175D3DCCD1}">
-              <a14:hiddenFill xmlns:a14="http://schemas.microsoft.com/office/drawing/2010/main" xmlns="">
+              <a14:hiddenFill xmlns="" xmlns:a14="http://schemas.microsoft.com/office/drawing/2010/main">
                 <a:noFill/>
               </a14:hiddenFill>
             </a:ext>
@@ -38619,7 +38802,7 @@
     </p:spTree>
     <p:extLst>
       <p:ext uri="{BB962C8B-B14F-4D97-AF65-F5344CB8AC3E}">
-        <p14:creationId xmlns:p14="http://schemas.microsoft.com/office/powerpoint/2010/main" xmlns="" val="831713103"/>
+        <p14:creationId xmlns="" xmlns:p14="http://schemas.microsoft.com/office/powerpoint/2010/main" val="831713103"/>
       </p:ext>
     </p:extLst>
   </p:cSld>
@@ -39427,7 +39610,7 @@
     </p:spTree>
     <p:extLst>
       <p:ext uri="{BB962C8B-B14F-4D97-AF65-F5344CB8AC3E}">
-        <p14:creationId xmlns:p14="http://schemas.microsoft.com/office/powerpoint/2010/main" xmlns="" val="3252093137"/>
+        <p14:creationId xmlns="" xmlns:p14="http://schemas.microsoft.com/office/powerpoint/2010/main" val="3252093137"/>
       </p:ext>
     </p:extLst>
   </p:cSld>
@@ -39726,7 +39909,7 @@
   <a:extraClrSchemeLst/>
   <a:extLst>
     <a:ext uri="{05A4C25C-085E-4340-85A3-A5531E510DB2}">
-      <thm15:themeFamily xmlns:thm15="http://schemas.microsoft.com/office/thememl/2012/main" xmlns="" name="eye_tracker_presentation" id="{00ED1D97-A04B-46A0-BB71-88655A6B057F}" vid="{F36189FA-3966-4852-951E-5734674D1C7B}"/>
+      <thm15:themeFamily xmlns="" xmlns:thm15="http://schemas.microsoft.com/office/thememl/2012/main" name="eye_tracker_presentation" id="{00ED1D97-A04B-46A0-BB71-88655A6B057F}" vid="{F36189FA-3966-4852-951E-5734674D1C7B}"/>
     </a:ext>
   </a:extLst>
 </a:theme>
@@ -40021,7 +40204,7 @@
   <a:extraClrSchemeLst/>
   <a:extLst>
     <a:ext uri="{05A4C25C-085E-4340-85A3-A5531E510DB2}">
-      <thm15:themeFamily xmlns:thm15="http://schemas.microsoft.com/office/thememl/2012/main" xmlns="" name="Office Theme" id="{62F939B6-93AF-4DB8-9C6B-D6C7DFDC589F}" vid="{4A3C46E8-61CC-4603-A589-7422A47A8E4A}"/>
+      <thm15:themeFamily xmlns="" xmlns:thm15="http://schemas.microsoft.com/office/thememl/2012/main" name="Office Theme" id="{62F939B6-93AF-4DB8-9C6B-D6C7DFDC589F}" vid="{4A3C46E8-61CC-4603-A589-7422A47A8E4A}"/>
     </a:ext>
   </a:extLst>
 </a:theme>

</xml_diff>